<commit_message>
Reorganized the schema so that reports are associated with game mod chapters. This introduces the new problem that general ratings and comments for entire mods is impossible.
</commit_message>
<xml_diff>
--- a/project/erd.pptx
+++ b/project/erd.pptx
@@ -6851,10 +6851,10 @@
         </p:nvGrpSpPr>
         <p:grpSpPr>
           <a:xfrm>
-            <a:off x="196703" y="289728"/>
-            <a:ext cx="9365665" cy="3001510"/>
-            <a:chOff x="287515" y="2073922"/>
-            <a:chExt cx="9365665" cy="3001510"/>
+            <a:off x="196703" y="0"/>
+            <a:ext cx="9365665" cy="1175357"/>
+            <a:chOff x="287515" y="1784194"/>
+            <a:chExt cx="9365665" cy="1175357"/>
           </a:xfrm>
         </p:grpSpPr>
         <p:sp>
@@ -6929,7 +6929,7 @@
           </p:nvSpPr>
           <p:spPr bwMode="auto">
             <a:xfrm>
-              <a:off x="6151705" y="3377631"/>
+              <a:off x="6223200" y="2294463"/>
               <a:ext cx="1447800" cy="609600"/>
             </a:xfrm>
             <a:prstGeom prst="flowChartProcess">
@@ -6981,68 +6981,6 @@
             </a:p>
           </p:txBody>
         </p:sp>
-        <p:sp>
-          <p:nvSpPr>
-            <p:cNvPr id="46086" name="AutoShape 6"/>
-            <p:cNvSpPr>
-              <a:spLocks noChangeArrowheads="1"/>
-            </p:cNvSpPr>
-            <p:nvPr/>
-          </p:nvSpPr>
-          <p:spPr bwMode="auto">
-            <a:xfrm>
-              <a:off x="4132259" y="4237232"/>
-              <a:ext cx="1295400" cy="838200"/>
-            </a:xfrm>
-            <a:prstGeom prst="flowChartDecision">
-              <a:avLst/>
-            </a:prstGeom>
-            <a:solidFill>
-              <a:schemeClr val="tx2">
-                <a:lumMod val="40000"/>
-                <a:lumOff val="60000"/>
-              </a:schemeClr>
-            </a:solidFill>
-            <a:ln w="9525">
-              <a:solidFill>
-                <a:schemeClr val="tx1"/>
-              </a:solidFill>
-              <a:miter lim="800000"/>
-              <a:headEnd/>
-              <a:tailEnd/>
-            </a:ln>
-            <a:effectLst/>
-          </p:spPr>
-          <p:txBody>
-            <a:bodyPr wrap="none" anchor="ctr"/>
-            <a:lstStyle/>
-            <a:p>
-              <a:pPr algn="ctr" eaLnBrk="0" fontAlgn="base" hangingPunct="0">
-                <a:spcBef>
-                  <a:spcPct val="0"/>
-                </a:spcBef>
-                <a:spcAft>
-                  <a:spcPct val="0"/>
-                </a:spcAft>
-              </a:pPr>
-              <a:r>
-                <a:rPr lang="en-US" sz="1400" dirty="0" err="1" smtClean="0">
-                  <a:solidFill>
-                    <a:prstClr val="black"/>
-                  </a:solidFill>
-                  <a:latin typeface="Arial" charset="0"/>
-                </a:rPr>
-                <a:t>ReportMod</a:t>
-              </a:r>
-              <a:endParaRPr lang="en-US" sz="1400" dirty="0">
-                <a:solidFill>
-                  <a:prstClr val="black"/>
-                </a:solidFill>
-                <a:latin typeface="Arial" charset="0"/>
-              </a:endParaRPr>
-            </a:p>
-          </p:txBody>
-        </p:sp>
         <p:cxnSp>
           <p:nvCxnSpPr>
             <p:cNvPr id="46087" name="AutoShape 7"/>
@@ -7056,7 +6994,7 @@
           <p:spPr bwMode="auto">
             <a:xfrm>
               <a:off x="3078480" y="2599263"/>
-              <a:ext cx="560825" cy="648074"/>
+              <a:ext cx="512708" cy="0"/>
             </a:xfrm>
             <a:prstGeom prst="straightConnector1">
               <a:avLst/>
@@ -7265,8 +7203,8 @@
           </p:nvSpPr>
           <p:spPr bwMode="auto">
             <a:xfrm>
-              <a:off x="8510180" y="2336066"/>
-              <a:ext cx="1143000" cy="381000"/>
+              <a:off x="8510180" y="1784194"/>
+              <a:ext cx="1143000" cy="422267"/>
             </a:xfrm>
             <a:prstGeom prst="ellipse">
               <a:avLst/>
@@ -7328,8 +7266,8 @@
           </p:nvCxnSpPr>
           <p:spPr bwMode="auto">
             <a:xfrm flipH="1">
-              <a:off x="7599505" y="2526566"/>
-              <a:ext cx="910675" cy="1155865"/>
+              <a:off x="7671000" y="1995328"/>
+              <a:ext cx="839180" cy="603935"/>
             </a:xfrm>
             <a:prstGeom prst="straightConnector1">
               <a:avLst/>
@@ -7413,7 +7351,7 @@
           </p:nvSpPr>
           <p:spPr bwMode="auto">
             <a:xfrm>
-              <a:off x="5674272" y="3002177"/>
+              <a:off x="5650786" y="2267158"/>
               <a:ext cx="522900" cy="307777"/>
             </a:xfrm>
             <a:prstGeom prst="rect">
@@ -7454,36 +7392,6 @@
             </a:p>
           </p:txBody>
         </p:sp>
-        <p:cxnSp>
-          <p:nvCxnSpPr>
-            <p:cNvPr id="103" name="AutoShape 7"/>
-            <p:cNvCxnSpPr>
-              <a:cxnSpLocks noChangeShapeType="1"/>
-              <a:stCxn id="46086" idx="3"/>
-              <a:endCxn id="46085" idx="1"/>
-            </p:cNvCxnSpPr>
-            <p:nvPr/>
-          </p:nvCxnSpPr>
-          <p:spPr bwMode="auto">
-            <a:xfrm flipV="1">
-              <a:off x="5427659" y="3682431"/>
-              <a:ext cx="724046" cy="973901"/>
-            </a:xfrm>
-            <a:prstGeom prst="straightConnector1">
-              <a:avLst/>
-            </a:prstGeom>
-            <a:noFill/>
-            <a:ln w="9525">
-              <a:solidFill>
-                <a:schemeClr val="tx1"/>
-              </a:solidFill>
-              <a:round/>
-              <a:headEnd/>
-              <a:tailEnd/>
-            </a:ln>
-            <a:effectLst/>
-          </p:spPr>
-        </p:cxnSp>
       </p:grpSp>
       <p:sp>
         <p:nvSpPr>
@@ -7495,7 +7403,7 @@
         </p:nvSpPr>
         <p:spPr bwMode="auto">
           <a:xfrm>
-            <a:off x="2022424" y="2633831"/>
+            <a:off x="1882068" y="3165962"/>
             <a:ext cx="1447800" cy="609600"/>
           </a:xfrm>
           <a:prstGeom prst="flowChartProcess">
@@ -7547,36 +7455,6 @@
           </a:p>
         </p:txBody>
       </p:sp>
-      <p:cxnSp>
-        <p:nvCxnSpPr>
-          <p:cNvPr id="83" name="AutoShape 7"/>
-          <p:cNvCxnSpPr>
-            <a:cxnSpLocks noChangeShapeType="1"/>
-            <a:stCxn id="82" idx="3"/>
-            <a:endCxn id="46086" idx="1"/>
-          </p:cNvCxnSpPr>
-          <p:nvPr/>
-        </p:nvCxnSpPr>
-        <p:spPr bwMode="auto">
-          <a:xfrm flipV="1">
-            <a:off x="3470224" y="2872138"/>
-            <a:ext cx="571223" cy="66493"/>
-          </a:xfrm>
-          <a:prstGeom prst="straightConnector1">
-            <a:avLst/>
-          </a:prstGeom>
-          <a:noFill/>
-          <a:ln w="9525">
-            <a:solidFill>
-              <a:schemeClr val="tx1"/>
-            </a:solidFill>
-            <a:round/>
-            <a:headEnd/>
-            <a:tailEnd/>
-          </a:ln>
-          <a:effectLst/>
-        </p:spPr>
-      </p:cxnSp>
       <p:sp>
         <p:nvSpPr>
           <p:cNvPr id="85" name="Oval 10"/>
@@ -7587,7 +7465,7 @@
         </p:nvSpPr>
         <p:spPr bwMode="auto">
           <a:xfrm>
-            <a:off x="44303" y="2665583"/>
+            <a:off x="97884" y="3223422"/>
             <a:ext cx="1341899" cy="381000"/>
           </a:xfrm>
           <a:prstGeom prst="ellipse">
@@ -7648,7 +7526,7 @@
         </p:nvSpPr>
         <p:spPr bwMode="auto">
           <a:xfrm>
-            <a:off x="97884" y="3129131"/>
+            <a:off x="120208" y="3672434"/>
             <a:ext cx="1318355" cy="381000"/>
           </a:xfrm>
           <a:prstGeom prst="ellipse">
@@ -7711,8 +7589,8 @@
         </p:nvCxnSpPr>
         <p:spPr bwMode="auto">
           <a:xfrm>
-            <a:off x="1386202" y="2856083"/>
-            <a:ext cx="636222" cy="82548"/>
+            <a:off x="1439783" y="3413922"/>
+            <a:ext cx="442285" cy="56840"/>
           </a:xfrm>
           <a:prstGeom prst="straightConnector1">
             <a:avLst/>
@@ -7739,7 +7617,7 @@
         </p:nvSpPr>
         <p:spPr bwMode="auto">
           <a:xfrm>
-            <a:off x="120797" y="2094083"/>
+            <a:off x="143006" y="2780729"/>
             <a:ext cx="1143000" cy="381000"/>
           </a:xfrm>
           <a:prstGeom prst="ellipse">
@@ -7790,63 +7668,6 @@
           </a:p>
         </p:txBody>
       </p:sp>
-      <p:sp>
-        <p:nvSpPr>
-          <p:cNvPr id="91" name="Text Box 145"/>
-          <p:cNvSpPr txBox="1">
-            <a:spLocks noChangeArrowheads="1"/>
-          </p:cNvSpPr>
-          <p:nvPr/>
-        </p:nvSpPr>
-        <p:spPr bwMode="auto">
-          <a:xfrm>
-            <a:off x="3548493" y="2612240"/>
-            <a:ext cx="284052" cy="307777"/>
-          </a:xfrm>
-          <a:prstGeom prst="rect">
-            <a:avLst/>
-          </a:prstGeom>
-          <a:noFill/>
-          <a:ln w="9525">
-            <a:noFill/>
-            <a:miter lim="800000"/>
-            <a:headEnd/>
-            <a:tailEnd/>
-          </a:ln>
-          <a:effectLst/>
-        </p:spPr>
-        <p:txBody>
-          <a:bodyPr wrap="none">
-            <a:spAutoFit/>
-          </a:bodyPr>
-          <a:lstStyle/>
-          <a:p>
-            <a:pPr eaLnBrk="0" fontAlgn="base" hangingPunct="0">
-              <a:spcBef>
-                <a:spcPct val="0"/>
-              </a:spcBef>
-              <a:spcAft>
-                <a:spcPct val="0"/>
-              </a:spcAft>
-            </a:pPr>
-            <a:r>
-              <a:rPr lang="en-US" sz="1400" dirty="0" smtClean="0">
-                <a:solidFill>
-                  <a:prstClr val="black"/>
-                </a:solidFill>
-                <a:latin typeface="Arial" charset="0"/>
-              </a:rPr>
-              <a:t>1</a:t>
-            </a:r>
-            <a:endParaRPr lang="en-US" sz="1400" dirty="0">
-              <a:solidFill>
-                <a:prstClr val="black"/>
-              </a:solidFill>
-              <a:latin typeface="Arial" charset="0"/>
-            </a:endParaRPr>
-          </a:p>
-        </p:txBody>
-      </p:sp>
       <p:cxnSp>
         <p:nvCxnSpPr>
           <p:cNvPr id="92" name="AutoShape 13"/>
@@ -7859,8 +7680,8 @@
         </p:nvCxnSpPr>
         <p:spPr bwMode="auto">
           <a:xfrm>
-            <a:off x="1263797" y="2284583"/>
-            <a:ext cx="758627" cy="654048"/>
+            <a:off x="1286006" y="2971229"/>
+            <a:ext cx="596062" cy="499533"/>
           </a:xfrm>
           <a:prstGeom prst="straightConnector1">
             <a:avLst/>
@@ -7889,8 +7710,8 @@
         </p:nvCxnSpPr>
         <p:spPr bwMode="auto">
           <a:xfrm flipV="1">
-            <a:off x="1416239" y="2938631"/>
-            <a:ext cx="606185" cy="381000"/>
+            <a:off x="1438563" y="3470762"/>
+            <a:ext cx="443505" cy="392172"/>
           </a:xfrm>
           <a:prstGeom prst="straightConnector1">
             <a:avLst/>
@@ -7917,7 +7738,7 @@
         </p:nvSpPr>
         <p:spPr bwMode="auto">
           <a:xfrm>
-            <a:off x="3548493" y="1044043"/>
+            <a:off x="3500376" y="395969"/>
             <a:ext cx="1948188" cy="838200"/>
           </a:xfrm>
           <a:prstGeom prst="flowChartDecision">
@@ -7981,8 +7802,8 @@
         </p:nvCxnSpPr>
         <p:spPr bwMode="auto">
           <a:xfrm>
-            <a:off x="5496681" y="1463143"/>
-            <a:ext cx="564212" cy="435094"/>
+            <a:off x="5448564" y="815069"/>
+            <a:ext cx="683824" cy="0"/>
           </a:xfrm>
           <a:prstGeom prst="straightConnector1">
             <a:avLst/>
@@ -8009,7 +7830,7 @@
         </p:nvSpPr>
         <p:spPr bwMode="auto">
           <a:xfrm>
-            <a:off x="8215896" y="1087158"/>
+            <a:off x="8182291" y="549347"/>
             <a:ext cx="1743449" cy="381000"/>
           </a:xfrm>
           <a:prstGeom prst="ellipse">
@@ -8072,8 +7893,8 @@
         </p:nvCxnSpPr>
         <p:spPr bwMode="auto">
           <a:xfrm flipH="1">
-            <a:off x="7508693" y="1277658"/>
-            <a:ext cx="707203" cy="620579"/>
+            <a:off x="7580188" y="739847"/>
+            <a:ext cx="602103" cy="75222"/>
           </a:xfrm>
           <a:prstGeom prst="straightConnector1">
             <a:avLst/>
@@ -8100,7 +7921,7 @@
         </p:nvSpPr>
         <p:spPr bwMode="auto">
           <a:xfrm>
-            <a:off x="8072905" y="1624356"/>
+            <a:off x="8075000" y="1011289"/>
             <a:ext cx="2221482" cy="381000"/>
           </a:xfrm>
           <a:prstGeom prst="ellipse">
@@ -8162,9 +7983,9 @@
           <p:nvPr/>
         </p:nvCxnSpPr>
         <p:spPr bwMode="auto">
-          <a:xfrm flipH="1">
-            <a:off x="7508693" y="1814856"/>
-            <a:ext cx="564212" cy="83381"/>
+          <a:xfrm flipH="1" flipV="1">
+            <a:off x="7580188" y="815069"/>
+            <a:ext cx="494812" cy="386720"/>
           </a:xfrm>
           <a:prstGeom prst="straightConnector1">
             <a:avLst/>
@@ -8183,66 +8004,15 @@
       </p:cxnSp>
       <p:sp>
         <p:nvSpPr>
-          <p:cNvPr id="53" name="Text Box 149"/>
-          <p:cNvSpPr txBox="1">
+          <p:cNvPr id="79" name="AutoShape 4"/>
+          <p:cNvSpPr>
             <a:spLocks noChangeArrowheads="1"/>
           </p:cNvSpPr>
           <p:nvPr/>
         </p:nvSpPr>
         <p:spPr bwMode="auto">
           <a:xfrm>
-            <a:off x="5555725" y="2458351"/>
-            <a:ext cx="522900" cy="307777"/>
-          </a:xfrm>
-          <a:prstGeom prst="rect">
-            <a:avLst/>
-          </a:prstGeom>
-          <a:noFill/>
-          <a:ln w="9525">
-            <a:noFill/>
-            <a:miter lim="800000"/>
-            <a:headEnd/>
-            <a:tailEnd/>
-          </a:ln>
-          <a:effectLst/>
-        </p:spPr>
-        <p:txBody>
-          <a:bodyPr wrap="none">
-            <a:spAutoFit/>
-          </a:bodyPr>
-          <a:lstStyle/>
-          <a:p>
-            <a:pPr eaLnBrk="0" fontAlgn="base" hangingPunct="0">
-              <a:spcBef>
-                <a:spcPct val="0"/>
-              </a:spcBef>
-              <a:spcAft>
-                <a:spcPct val="0"/>
-              </a:spcAft>
-            </a:pPr>
-            <a:r>
-              <a:rPr lang="en-US" sz="1400" dirty="0">
-                <a:solidFill>
-                  <a:prstClr val="black"/>
-                </a:solidFill>
-                <a:latin typeface="Arial" charset="0"/>
-              </a:rPr>
-              <a:t>{0,*}</a:t>
-            </a:r>
-          </a:p>
-        </p:txBody>
-      </p:sp>
-      <p:sp>
-        <p:nvSpPr>
-          <p:cNvPr id="79" name="AutoShape 4"/>
-          <p:cNvSpPr>
-            <a:spLocks noChangeArrowheads="1"/>
-          </p:cNvSpPr>
-          <p:nvPr/>
-        </p:nvSpPr>
-        <p:spPr bwMode="auto">
-          <a:xfrm>
-            <a:off x="2017594" y="4757393"/>
+            <a:off x="2010391" y="5226297"/>
             <a:ext cx="1447800" cy="609600"/>
           </a:xfrm>
           <a:prstGeom prst="flowChartProcess">
@@ -8484,7 +8254,7 @@
         <p:spPr bwMode="auto">
           <a:xfrm>
             <a:off x="1240884" y="4381900"/>
-            <a:ext cx="776710" cy="680293"/>
+            <a:ext cx="769507" cy="1149197"/>
           </a:xfrm>
           <a:prstGeom prst="straightConnector1">
             <a:avLst/>
@@ -8512,9 +8282,9 @@
           <p:nvPr/>
         </p:nvCxnSpPr>
         <p:spPr bwMode="auto">
-          <a:xfrm flipV="1">
-            <a:off x="1439785" y="5062193"/>
-            <a:ext cx="577809" cy="357423"/>
+          <a:xfrm>
+            <a:off x="1439785" y="5419616"/>
+            <a:ext cx="570606" cy="111481"/>
           </a:xfrm>
           <a:prstGeom prst="straightConnector1">
             <a:avLst/>
@@ -8544,7 +8314,7 @@
         <p:spPr bwMode="auto">
           <a:xfrm>
             <a:off x="1385456" y="4888888"/>
-            <a:ext cx="632138" cy="173305"/>
+            <a:ext cx="624935" cy="642209"/>
           </a:xfrm>
           <a:prstGeom prst="straightConnector1">
             <a:avLst/>
@@ -8571,7 +8341,7 @@
         </p:nvSpPr>
         <p:spPr bwMode="auto">
           <a:xfrm>
-            <a:off x="2093794" y="3592679"/>
+            <a:off x="2010391" y="4018841"/>
             <a:ext cx="1295400" cy="838200"/>
           </a:xfrm>
           <a:prstGeom prst="flowChartDecision">
@@ -8635,8 +8405,8 @@
         </p:nvCxnSpPr>
         <p:spPr bwMode="auto">
           <a:xfrm>
-            <a:off x="2741494" y="4430879"/>
-            <a:ext cx="0" cy="326514"/>
+            <a:off x="2658091" y="4857041"/>
+            <a:ext cx="76200" cy="369256"/>
           </a:xfrm>
           <a:prstGeom prst="straightConnector1">
             <a:avLst/>
@@ -8664,9 +8434,9 @@
           <p:nvPr/>
         </p:nvCxnSpPr>
         <p:spPr bwMode="auto">
-          <a:xfrm flipH="1">
-            <a:off x="2741494" y="3243431"/>
-            <a:ext cx="4830" cy="349248"/>
+          <a:xfrm>
+            <a:off x="2605968" y="3775562"/>
+            <a:ext cx="52123" cy="243279"/>
           </a:xfrm>
           <a:prstGeom prst="straightConnector1">
             <a:avLst/>
@@ -8693,7 +8463,7 @@
         </p:nvSpPr>
         <p:spPr bwMode="auto">
           <a:xfrm>
-            <a:off x="2720831" y="4463920"/>
+            <a:off x="2749830" y="4908303"/>
             <a:ext cx="284052" cy="307777"/>
           </a:xfrm>
           <a:prstGeom prst="rect">
@@ -8750,7 +8520,7 @@
         </p:nvSpPr>
         <p:spPr bwMode="auto">
           <a:xfrm>
-            <a:off x="2708580" y="3224250"/>
+            <a:off x="2828004" y="3792008"/>
             <a:ext cx="522900" cy="307777"/>
           </a:xfrm>
           <a:prstGeom prst="rect">
@@ -8793,7 +8563,7 @@
       </p:sp>
       <p:sp>
         <p:nvSpPr>
-          <p:cNvPr id="109" name="AutoShape 4"/>
+          <p:cNvPr id="130" name="AutoShape 4"/>
           <p:cNvSpPr>
             <a:spLocks noChangeArrowheads="1"/>
           </p:cNvSpPr>
@@ -8801,8 +8571,8 @@
         </p:nvSpPr>
         <p:spPr bwMode="auto">
           <a:xfrm>
-            <a:off x="5305615" y="3451557"/>
-            <a:ext cx="1447800" cy="609600"/>
+            <a:off x="7109772" y="6140697"/>
+            <a:ext cx="2073286" cy="609600"/>
           </a:xfrm>
           <a:prstGeom prst="flowChartProcess">
             <a:avLst/>
@@ -8836,13 +8606,13 @@
               </a:spcAft>
             </a:pPr>
             <a:r>
-              <a:rPr lang="en-US" dirty="0" smtClean="0">
+              <a:rPr lang="en-US" dirty="0" err="1" smtClean="0">
                 <a:solidFill>
                   <a:prstClr val="black"/>
                 </a:solidFill>
                 <a:latin typeface="Arial" charset="0"/>
               </a:rPr>
-              <a:t>Chapter</a:t>
+              <a:t>GameplayElement</a:t>
             </a:r>
             <a:endParaRPr lang="en-US" dirty="0" smtClean="0">
               <a:solidFill>
@@ -8855,16 +8625,370 @@
       </p:sp>
       <p:sp>
         <p:nvSpPr>
-          <p:cNvPr id="110" name="AutoShape 6"/>
-          <p:cNvSpPr>
+          <p:cNvPr id="165" name="Text Box 149"/>
+          <p:cNvSpPr txBox="1">
             <a:spLocks noChangeArrowheads="1"/>
           </p:cNvSpPr>
           <p:nvPr/>
         </p:nvSpPr>
         <p:spPr bwMode="auto">
           <a:xfrm>
-            <a:off x="6859565" y="2577531"/>
-            <a:ext cx="1295400" cy="838200"/>
+            <a:off x="6551869" y="6044705"/>
+            <a:ext cx="522900" cy="307777"/>
+          </a:xfrm>
+          <a:prstGeom prst="rect">
+            <a:avLst/>
+          </a:prstGeom>
+          <a:noFill/>
+          <a:ln w="9525">
+            <a:noFill/>
+            <a:miter lim="800000"/>
+            <a:headEnd/>
+            <a:tailEnd/>
+          </a:ln>
+          <a:effectLst/>
+        </p:spPr>
+        <p:txBody>
+          <a:bodyPr wrap="none">
+            <a:spAutoFit/>
+          </a:bodyPr>
+          <a:lstStyle/>
+          <a:p>
+            <a:pPr eaLnBrk="0" fontAlgn="base" hangingPunct="0">
+              <a:spcBef>
+                <a:spcPct val="0"/>
+              </a:spcBef>
+              <a:spcAft>
+                <a:spcPct val="0"/>
+              </a:spcAft>
+            </a:pPr>
+            <a:r>
+              <a:rPr lang="en-US" sz="1400" dirty="0">
+                <a:solidFill>
+                  <a:prstClr val="black"/>
+                </a:solidFill>
+                <a:latin typeface="Arial" charset="0"/>
+              </a:rPr>
+              <a:t>{0,*}</a:t>
+            </a:r>
+          </a:p>
+        </p:txBody>
+      </p:sp>
+      <p:sp>
+        <p:nvSpPr>
+          <p:cNvPr id="167" name="Oval 112"/>
+          <p:cNvSpPr>
+            <a:spLocks noChangeArrowheads="1"/>
+          </p:cNvSpPr>
+          <p:nvPr/>
+        </p:nvSpPr>
+        <p:spPr bwMode="auto">
+          <a:xfrm>
+            <a:off x="9801614" y="5514743"/>
+            <a:ext cx="2527479" cy="381000"/>
+          </a:xfrm>
+          <a:prstGeom prst="ellipse">
+            <a:avLst/>
+          </a:prstGeom>
+          <a:solidFill>
+            <a:schemeClr val="bg1">
+              <a:lumMod val="85000"/>
+            </a:schemeClr>
+          </a:solidFill>
+          <a:ln w="9525">
+            <a:solidFill>
+              <a:schemeClr val="tx1"/>
+            </a:solidFill>
+            <a:round/>
+            <a:headEnd/>
+            <a:tailEnd/>
+          </a:ln>
+          <a:effectLst/>
+        </p:spPr>
+        <p:txBody>
+          <a:bodyPr wrap="none" anchor="ctr"/>
+          <a:lstStyle/>
+          <a:p>
+            <a:pPr algn="ctr" eaLnBrk="0" fontAlgn="base" hangingPunct="0">
+              <a:spcBef>
+                <a:spcPct val="0"/>
+              </a:spcBef>
+              <a:spcAft>
+                <a:spcPct val="0"/>
+              </a:spcAft>
+            </a:pPr>
+            <a:r>
+              <a:rPr lang="en-US" sz="1600" u="sng" dirty="0" err="1" smtClean="0">
+                <a:solidFill>
+                  <a:prstClr val="black"/>
+                </a:solidFill>
+                <a:latin typeface="Arial" charset="0"/>
+              </a:rPr>
+              <a:t>gameplayElementID</a:t>
+            </a:r>
+            <a:endParaRPr lang="en-US" dirty="0">
+              <a:solidFill>
+                <a:prstClr val="black"/>
+              </a:solidFill>
+              <a:latin typeface="Arial" charset="0"/>
+            </a:endParaRPr>
+          </a:p>
+        </p:txBody>
+      </p:sp>
+      <p:sp>
+        <p:nvSpPr>
+          <p:cNvPr id="168" name="Oval 112"/>
+          <p:cNvSpPr>
+            <a:spLocks noChangeArrowheads="1"/>
+          </p:cNvSpPr>
+          <p:nvPr/>
+        </p:nvSpPr>
+        <p:spPr bwMode="auto">
+          <a:xfrm>
+            <a:off x="9496611" y="6316755"/>
+            <a:ext cx="2717050" cy="381000"/>
+          </a:xfrm>
+          <a:prstGeom prst="ellipse">
+            <a:avLst/>
+          </a:prstGeom>
+          <a:solidFill>
+            <a:schemeClr val="bg1">
+              <a:lumMod val="85000"/>
+            </a:schemeClr>
+          </a:solidFill>
+          <a:ln w="9525">
+            <a:solidFill>
+              <a:schemeClr val="tx1"/>
+            </a:solidFill>
+            <a:round/>
+            <a:headEnd/>
+            <a:tailEnd/>
+          </a:ln>
+          <a:effectLst/>
+        </p:spPr>
+        <p:txBody>
+          <a:bodyPr wrap="none" anchor="ctr"/>
+          <a:lstStyle/>
+          <a:p>
+            <a:pPr algn="ctr" eaLnBrk="0" fontAlgn="base" hangingPunct="0">
+              <a:spcBef>
+                <a:spcPct val="0"/>
+              </a:spcBef>
+              <a:spcAft>
+                <a:spcPct val="0"/>
+              </a:spcAft>
+            </a:pPr>
+            <a:r>
+              <a:rPr lang="en-US" sz="1600" dirty="0" err="1" smtClean="0">
+                <a:solidFill>
+                  <a:prstClr val="black"/>
+                </a:solidFill>
+                <a:latin typeface="Arial" charset="0"/>
+              </a:rPr>
+              <a:t>gameplayElementName</a:t>
+            </a:r>
+            <a:endParaRPr lang="en-US" sz="1600" dirty="0" smtClean="0">
+              <a:solidFill>
+                <a:prstClr val="black"/>
+              </a:solidFill>
+              <a:latin typeface="Arial" charset="0"/>
+            </a:endParaRPr>
+          </a:p>
+        </p:txBody>
+      </p:sp>
+      <p:cxnSp>
+        <p:nvCxnSpPr>
+          <p:cNvPr id="169" name="AutoShape 7"/>
+          <p:cNvCxnSpPr>
+            <a:cxnSpLocks noChangeShapeType="1"/>
+            <a:stCxn id="130" idx="3"/>
+            <a:endCxn id="167" idx="2"/>
+          </p:cNvCxnSpPr>
+          <p:nvPr/>
+        </p:nvCxnSpPr>
+        <p:spPr bwMode="auto">
+          <a:xfrm flipV="1">
+            <a:off x="9183058" y="5705243"/>
+            <a:ext cx="618556" cy="740254"/>
+          </a:xfrm>
+          <a:prstGeom prst="straightConnector1">
+            <a:avLst/>
+          </a:prstGeom>
+          <a:noFill/>
+          <a:ln w="9525">
+            <a:solidFill>
+              <a:schemeClr val="tx1"/>
+            </a:solidFill>
+            <a:round/>
+            <a:headEnd/>
+            <a:tailEnd/>
+          </a:ln>
+          <a:effectLst/>
+        </p:spPr>
+      </p:cxnSp>
+      <p:cxnSp>
+        <p:nvCxnSpPr>
+          <p:cNvPr id="172" name="AutoShape 7"/>
+          <p:cNvCxnSpPr>
+            <a:cxnSpLocks noChangeShapeType="1"/>
+            <a:stCxn id="130" idx="3"/>
+            <a:endCxn id="168" idx="2"/>
+          </p:cNvCxnSpPr>
+          <p:nvPr/>
+        </p:nvCxnSpPr>
+        <p:spPr bwMode="auto">
+          <a:xfrm>
+            <a:off x="9183058" y="6445497"/>
+            <a:ext cx="313553" cy="61758"/>
+          </a:xfrm>
+          <a:prstGeom prst="straightConnector1">
+            <a:avLst/>
+          </a:prstGeom>
+          <a:noFill/>
+          <a:ln w="9525">
+            <a:solidFill>
+              <a:schemeClr val="tx1"/>
+            </a:solidFill>
+            <a:round/>
+            <a:headEnd/>
+            <a:tailEnd/>
+          </a:ln>
+          <a:effectLst/>
+        </p:spPr>
+      </p:cxnSp>
+      <p:sp>
+        <p:nvSpPr>
+          <p:cNvPr id="183" name="Oval 114"/>
+          <p:cNvSpPr>
+            <a:spLocks noChangeArrowheads="1"/>
+          </p:cNvSpPr>
+          <p:nvPr/>
+        </p:nvSpPr>
+        <p:spPr bwMode="auto">
+          <a:xfrm>
+            <a:off x="8438108" y="1506589"/>
+            <a:ext cx="1231814" cy="381000"/>
+          </a:xfrm>
+          <a:prstGeom prst="ellipse">
+            <a:avLst/>
+          </a:prstGeom>
+          <a:solidFill>
+            <a:schemeClr val="bg1">
+              <a:lumMod val="85000"/>
+            </a:schemeClr>
+          </a:solidFill>
+          <a:ln w="9525">
+            <a:solidFill>
+              <a:schemeClr val="tx1"/>
+            </a:solidFill>
+            <a:round/>
+            <a:headEnd/>
+            <a:tailEnd/>
+          </a:ln>
+          <a:effectLst/>
+        </p:spPr>
+        <p:txBody>
+          <a:bodyPr wrap="none" anchor="ctr"/>
+          <a:lstStyle/>
+          <a:p>
+            <a:pPr algn="ctr" eaLnBrk="0" fontAlgn="base" hangingPunct="0">
+              <a:spcBef>
+                <a:spcPct val="0"/>
+              </a:spcBef>
+              <a:spcAft>
+                <a:spcPct val="0"/>
+              </a:spcAft>
+            </a:pPr>
+            <a:r>
+              <a:rPr lang="en-US" sz="1600" dirty="0" smtClean="0">
+                <a:solidFill>
+                  <a:prstClr val="black"/>
+                </a:solidFill>
+                <a:latin typeface="Arial" charset="0"/>
+              </a:rPr>
+              <a:t>rating</a:t>
+            </a:r>
+            <a:endParaRPr lang="en-US" dirty="0">
+              <a:solidFill>
+                <a:prstClr val="black"/>
+              </a:solidFill>
+              <a:latin typeface="Arial" charset="0"/>
+            </a:endParaRPr>
+          </a:p>
+        </p:txBody>
+      </p:sp>
+      <p:cxnSp>
+        <p:nvCxnSpPr>
+          <p:cNvPr id="187" name="AutoShape 115"/>
+          <p:cNvCxnSpPr>
+            <a:cxnSpLocks noChangeShapeType="1"/>
+            <a:stCxn id="183" idx="2"/>
+            <a:endCxn id="46085" idx="3"/>
+          </p:cNvCxnSpPr>
+          <p:nvPr/>
+        </p:nvCxnSpPr>
+        <p:spPr bwMode="auto">
+          <a:xfrm flipH="1" flipV="1">
+            <a:off x="7580188" y="815069"/>
+            <a:ext cx="857920" cy="882020"/>
+          </a:xfrm>
+          <a:prstGeom prst="straightConnector1">
+            <a:avLst/>
+          </a:prstGeom>
+          <a:noFill/>
+          <a:ln w="9525">
+            <a:solidFill>
+              <a:schemeClr val="tx1"/>
+            </a:solidFill>
+            <a:round/>
+            <a:headEnd/>
+            <a:tailEnd/>
+          </a:ln>
+          <a:effectLst/>
+        </p:spPr>
+      </p:cxnSp>
+      <p:cxnSp>
+        <p:nvCxnSpPr>
+          <p:cNvPr id="195" name="AutoShape 7"/>
+          <p:cNvCxnSpPr>
+            <a:cxnSpLocks noChangeShapeType="1"/>
+            <a:stCxn id="198" idx="3"/>
+            <a:endCxn id="130" idx="1"/>
+          </p:cNvCxnSpPr>
+          <p:nvPr/>
+        </p:nvCxnSpPr>
+        <p:spPr bwMode="auto">
+          <a:xfrm>
+            <a:off x="6063758" y="6437415"/>
+            <a:ext cx="1046014" cy="8082"/>
+          </a:xfrm>
+          <a:prstGeom prst="straightConnector1">
+            <a:avLst/>
+          </a:prstGeom>
+          <a:noFill/>
+          <a:ln w="9525">
+            <a:solidFill>
+              <a:schemeClr val="tx1"/>
+            </a:solidFill>
+            <a:round/>
+            <a:headEnd/>
+            <a:tailEnd/>
+          </a:ln>
+          <a:effectLst/>
+        </p:spPr>
+      </p:cxnSp>
+      <p:sp>
+        <p:nvSpPr>
+          <p:cNvPr id="198" name="AutoShape 6"/>
+          <p:cNvSpPr>
+            <a:spLocks noChangeArrowheads="1"/>
+          </p:cNvSpPr>
+          <p:nvPr/>
+        </p:nvSpPr>
+        <p:spPr bwMode="auto">
+          <a:xfrm>
+            <a:off x="4399622" y="6018315"/>
+            <a:ext cx="1664136" cy="838200"/>
           </a:xfrm>
           <a:prstGeom prst="flowChartDecision">
             <a:avLst/>
@@ -8904,213 +9028,15 @@
                 </a:solidFill>
                 <a:latin typeface="Arial" charset="0"/>
               </a:rPr>
-              <a:t>ReportChapter</a:t>
-            </a:r>
-            <a:endParaRPr lang="en-US" sz="1400" dirty="0">
+              <a:t>gameplayElement</a:t>
+            </a:r>
+            <a:endParaRPr lang="en-US" sz="1400" dirty="0" smtClean="0">
               <a:solidFill>
                 <a:prstClr val="black"/>
               </a:solidFill>
               <a:latin typeface="Arial" charset="0"/>
             </a:endParaRPr>
           </a:p>
-        </p:txBody>
-      </p:sp>
-      <p:cxnSp>
-        <p:nvCxnSpPr>
-          <p:cNvPr id="111" name="AutoShape 7"/>
-          <p:cNvCxnSpPr>
-            <a:cxnSpLocks noChangeShapeType="1"/>
-            <a:stCxn id="110" idx="0"/>
-            <a:endCxn id="46085" idx="2"/>
-          </p:cNvCxnSpPr>
-          <p:nvPr/>
-        </p:nvCxnSpPr>
-        <p:spPr bwMode="auto">
-          <a:xfrm flipH="1" flipV="1">
-            <a:off x="6784793" y="2203037"/>
-            <a:ext cx="722472" cy="374494"/>
-          </a:xfrm>
-          <a:prstGeom prst="straightConnector1">
-            <a:avLst/>
-          </a:prstGeom>
-          <a:noFill/>
-          <a:ln w="9525">
-            <a:solidFill>
-              <a:schemeClr val="tx1"/>
-            </a:solidFill>
-            <a:round/>
-            <a:headEnd/>
-            <a:tailEnd/>
-          </a:ln>
-          <a:effectLst/>
-        </p:spPr>
-      </p:cxnSp>
-      <p:cxnSp>
-        <p:nvCxnSpPr>
-          <p:cNvPr id="112" name="AutoShape 7"/>
-          <p:cNvCxnSpPr>
-            <a:cxnSpLocks noChangeShapeType="1"/>
-            <a:stCxn id="109" idx="0"/>
-            <a:endCxn id="110" idx="1"/>
-          </p:cNvCxnSpPr>
-          <p:nvPr/>
-        </p:nvCxnSpPr>
-        <p:spPr bwMode="auto">
-          <a:xfrm flipV="1">
-            <a:off x="6029515" y="2996631"/>
-            <a:ext cx="830050" cy="454926"/>
-          </a:xfrm>
-          <a:prstGeom prst="straightConnector1">
-            <a:avLst/>
-          </a:prstGeom>
-          <a:noFill/>
-          <a:ln w="9525">
-            <a:solidFill>
-              <a:schemeClr val="tx1"/>
-            </a:solidFill>
-            <a:round/>
-            <a:headEnd/>
-            <a:tailEnd/>
-          </a:ln>
-          <a:effectLst/>
-        </p:spPr>
-      </p:cxnSp>
-      <p:sp>
-        <p:nvSpPr>
-          <p:cNvPr id="119" name="Text Box 149"/>
-          <p:cNvSpPr txBox="1">
-            <a:spLocks noChangeArrowheads="1"/>
-          </p:cNvSpPr>
-          <p:nvPr/>
-        </p:nvSpPr>
-        <p:spPr bwMode="auto">
-          <a:xfrm>
-            <a:off x="6355825" y="2219952"/>
-            <a:ext cx="522900" cy="307777"/>
-          </a:xfrm>
-          <a:prstGeom prst="rect">
-            <a:avLst/>
-          </a:prstGeom>
-          <a:noFill/>
-          <a:ln w="9525">
-            <a:noFill/>
-            <a:miter lim="800000"/>
-            <a:headEnd/>
-            <a:tailEnd/>
-          </a:ln>
-          <a:effectLst/>
-        </p:spPr>
-        <p:txBody>
-          <a:bodyPr wrap="none">
-            <a:spAutoFit/>
-          </a:bodyPr>
-          <a:lstStyle/>
-          <a:p>
-            <a:pPr eaLnBrk="0" fontAlgn="base" hangingPunct="0">
-              <a:spcBef>
-                <a:spcPct val="0"/>
-              </a:spcBef>
-              <a:spcAft>
-                <a:spcPct val="0"/>
-              </a:spcAft>
-            </a:pPr>
-            <a:r>
-              <a:rPr lang="en-US" sz="1400" dirty="0">
-                <a:solidFill>
-                  <a:prstClr val="black"/>
-                </a:solidFill>
-                <a:latin typeface="Arial" charset="0"/>
-              </a:rPr>
-              <a:t>{0,*}</a:t>
-            </a:r>
-          </a:p>
-        </p:txBody>
-      </p:sp>
-      <p:sp>
-        <p:nvSpPr>
-          <p:cNvPr id="121" name="Text Box 149"/>
-          <p:cNvSpPr txBox="1">
-            <a:spLocks noChangeArrowheads="1"/>
-          </p:cNvSpPr>
-          <p:nvPr/>
-        </p:nvSpPr>
-        <p:spPr bwMode="auto">
-          <a:xfrm>
-            <a:off x="6362271" y="3156641"/>
-            <a:ext cx="522900" cy="307777"/>
-          </a:xfrm>
-          <a:prstGeom prst="rect">
-            <a:avLst/>
-          </a:prstGeom>
-          <a:noFill/>
-          <a:ln w="9525">
-            <a:noFill/>
-            <a:miter lim="800000"/>
-            <a:headEnd/>
-            <a:tailEnd/>
-          </a:ln>
-          <a:effectLst/>
-        </p:spPr>
-        <p:txBody>
-          <a:bodyPr wrap="none">
-            <a:spAutoFit/>
-          </a:bodyPr>
-          <a:lstStyle/>
-          <a:p>
-            <a:pPr eaLnBrk="0" fontAlgn="base" hangingPunct="0">
-              <a:spcBef>
-                <a:spcPct val="0"/>
-              </a:spcBef>
-              <a:spcAft>
-                <a:spcPct val="0"/>
-              </a:spcAft>
-            </a:pPr>
-            <a:r>
-              <a:rPr lang="en-US" sz="1400" dirty="0">
-                <a:solidFill>
-                  <a:prstClr val="black"/>
-                </a:solidFill>
-                <a:latin typeface="Arial" charset="0"/>
-              </a:rPr>
-              <a:t>{0,*}</a:t>
-            </a:r>
-          </a:p>
-        </p:txBody>
-      </p:sp>
-      <p:sp>
-        <p:nvSpPr>
-          <p:cNvPr id="122" name="Oval 112"/>
-          <p:cNvSpPr>
-            <a:spLocks noChangeArrowheads="1"/>
-          </p:cNvSpPr>
-          <p:nvPr/>
-        </p:nvSpPr>
-        <p:spPr bwMode="auto">
-          <a:xfrm>
-            <a:off x="3705065" y="3433162"/>
-            <a:ext cx="1143000" cy="381000"/>
-          </a:xfrm>
-          <a:prstGeom prst="ellipse">
-            <a:avLst/>
-          </a:prstGeom>
-          <a:solidFill>
-            <a:schemeClr val="bg1">
-              <a:lumMod val="85000"/>
-            </a:schemeClr>
-          </a:solidFill>
-          <a:ln w="9525">
-            <a:solidFill>
-              <a:schemeClr val="tx1"/>
-            </a:solidFill>
-            <a:round/>
-            <a:headEnd/>
-            <a:tailEnd/>
-          </a:ln>
-          <a:effectLst/>
-        </p:spPr>
-        <p:txBody>
-          <a:bodyPr wrap="none" anchor="ctr"/>
-          <a:lstStyle/>
           <a:p>
             <a:pPr algn="ctr" eaLnBrk="0" fontAlgn="base" hangingPunct="0">
               <a:spcBef>
@@ -9121,15 +9047,15 @@
               </a:spcAft>
             </a:pPr>
             <a:r>
-              <a:rPr lang="en-US" sz="1600" u="sng" dirty="0" err="1" smtClean="0">
+              <a:rPr lang="en-US" sz="1400" dirty="0" smtClean="0">
                 <a:solidFill>
                   <a:prstClr val="black"/>
                 </a:solidFill>
                 <a:latin typeface="Arial" charset="0"/>
               </a:rPr>
-              <a:t>chapterID</a:t>
-            </a:r>
-            <a:endParaRPr lang="en-US" dirty="0">
+              <a:t>-Category</a:t>
+            </a:r>
+            <a:endParaRPr lang="en-US" sz="1400" dirty="0">
               <a:solidFill>
                 <a:prstClr val="black"/>
               </a:solidFill>
@@ -9140,7 +9066,7 @@
       </p:sp>
       <p:sp>
         <p:nvSpPr>
-          <p:cNvPr id="123" name="Oval 112"/>
+          <p:cNvPr id="200" name="AutoShape 4"/>
           <p:cNvSpPr>
             <a:spLocks noChangeArrowheads="1"/>
           </p:cNvSpPr>
@@ -9148,128 +9074,7 @@
         </p:nvSpPr>
         <p:spPr bwMode="auto">
           <a:xfrm>
-            <a:off x="3714134" y="3981539"/>
-            <a:ext cx="1143000" cy="381000"/>
-          </a:xfrm>
-          <a:prstGeom prst="ellipse">
-            <a:avLst/>
-          </a:prstGeom>
-          <a:solidFill>
-            <a:schemeClr val="bg1">
-              <a:lumMod val="85000"/>
-            </a:schemeClr>
-          </a:solidFill>
-          <a:ln w="9525">
-            <a:solidFill>
-              <a:schemeClr val="tx1"/>
-            </a:solidFill>
-            <a:round/>
-            <a:headEnd/>
-            <a:tailEnd/>
-          </a:ln>
-          <a:effectLst/>
-        </p:spPr>
-        <p:txBody>
-          <a:bodyPr wrap="none" anchor="ctr"/>
-          <a:lstStyle/>
-          <a:p>
-            <a:pPr algn="ctr" eaLnBrk="0" fontAlgn="base" hangingPunct="0">
-              <a:spcBef>
-                <a:spcPct val="0"/>
-              </a:spcBef>
-              <a:spcAft>
-                <a:spcPct val="0"/>
-              </a:spcAft>
-            </a:pPr>
-            <a:r>
-              <a:rPr lang="en-US" sz="1600" dirty="0" err="1" smtClean="0">
-                <a:solidFill>
-                  <a:prstClr val="black"/>
-                </a:solidFill>
-                <a:latin typeface="Arial" charset="0"/>
-              </a:rPr>
-              <a:t>chapterName</a:t>
-            </a:r>
-            <a:endParaRPr lang="en-US" dirty="0">
-              <a:solidFill>
-                <a:prstClr val="black"/>
-              </a:solidFill>
-              <a:latin typeface="Arial" charset="0"/>
-            </a:endParaRPr>
-          </a:p>
-        </p:txBody>
-      </p:sp>
-      <p:cxnSp>
-        <p:nvCxnSpPr>
-          <p:cNvPr id="124" name="AutoShape 7"/>
-          <p:cNvCxnSpPr>
-            <a:cxnSpLocks noChangeShapeType="1"/>
-            <a:stCxn id="122" idx="6"/>
-            <a:endCxn id="109" idx="1"/>
-          </p:cNvCxnSpPr>
-          <p:nvPr/>
-        </p:nvCxnSpPr>
-        <p:spPr bwMode="auto">
-          <a:xfrm>
-            <a:off x="4848065" y="3623662"/>
-            <a:ext cx="457550" cy="132695"/>
-          </a:xfrm>
-          <a:prstGeom prst="straightConnector1">
-            <a:avLst/>
-          </a:prstGeom>
-          <a:noFill/>
-          <a:ln w="9525">
-            <a:solidFill>
-              <a:schemeClr val="tx1"/>
-            </a:solidFill>
-            <a:round/>
-            <a:headEnd/>
-            <a:tailEnd/>
-          </a:ln>
-          <a:effectLst/>
-        </p:spPr>
-      </p:cxnSp>
-      <p:cxnSp>
-        <p:nvCxnSpPr>
-          <p:cNvPr id="128" name="AutoShape 7"/>
-          <p:cNvCxnSpPr>
-            <a:cxnSpLocks noChangeShapeType="1"/>
-            <a:stCxn id="123" idx="6"/>
-            <a:endCxn id="109" idx="1"/>
-          </p:cNvCxnSpPr>
-          <p:nvPr/>
-        </p:nvCxnSpPr>
-        <p:spPr bwMode="auto">
-          <a:xfrm flipV="1">
-            <a:off x="4857134" y="3756357"/>
-            <a:ext cx="448481" cy="415682"/>
-          </a:xfrm>
-          <a:prstGeom prst="straightConnector1">
-            <a:avLst/>
-          </a:prstGeom>
-          <a:noFill/>
-          <a:ln w="9525">
-            <a:solidFill>
-              <a:schemeClr val="tx1"/>
-            </a:solidFill>
-            <a:round/>
-            <a:headEnd/>
-            <a:tailEnd/>
-          </a:ln>
-          <a:effectLst/>
-        </p:spPr>
-      </p:cxnSp>
-      <p:sp>
-        <p:nvSpPr>
-          <p:cNvPr id="130" name="AutoShape 4"/>
-          <p:cNvSpPr>
-            <a:spLocks noChangeArrowheads="1"/>
-          </p:cNvSpPr>
-          <p:nvPr/>
-        </p:nvSpPr>
-        <p:spPr bwMode="auto">
-          <a:xfrm>
-            <a:off x="7118322" y="5971899"/>
+            <a:off x="1635570" y="6140697"/>
             <a:ext cx="2073286" cy="609600"/>
           </a:xfrm>
           <a:prstGeom prst="flowChartProcess">
@@ -9310,7 +9115,7 @@
                 </a:solidFill>
                 <a:latin typeface="Arial" charset="0"/>
               </a:rPr>
-              <a:t>GameplayElement</a:t>
+              <a:t>GameplayCategory</a:t>
             </a:r>
             <a:endParaRPr lang="en-US" dirty="0" smtClean="0">
               <a:solidFill>
@@ -9321,9 +9126,39 @@
           </a:p>
         </p:txBody>
       </p:sp>
-      <p:sp>
-        <p:nvSpPr>
-          <p:cNvPr id="131" name="AutoShape 6"/>
+      <p:cxnSp>
+        <p:nvCxnSpPr>
+          <p:cNvPr id="201" name="AutoShape 7"/>
+          <p:cNvCxnSpPr>
+            <a:cxnSpLocks noChangeShapeType="1"/>
+            <a:stCxn id="200" idx="3"/>
+            <a:endCxn id="198" idx="1"/>
+          </p:cNvCxnSpPr>
+          <p:nvPr/>
+        </p:nvCxnSpPr>
+        <p:spPr bwMode="auto">
+          <a:xfrm flipV="1">
+            <a:off x="3708856" y="6437415"/>
+            <a:ext cx="690766" cy="8082"/>
+          </a:xfrm>
+          <a:prstGeom prst="straightConnector1">
+            <a:avLst/>
+          </a:prstGeom>
+          <a:noFill/>
+          <a:ln w="9525">
+            <a:solidFill>
+              <a:schemeClr val="tx1"/>
+            </a:solidFill>
+            <a:round/>
+            <a:headEnd/>
+            <a:tailEnd/>
+          </a:ln>
+          <a:effectLst/>
+        </p:spPr>
+      </p:cxnSp>
+      <p:sp>
+        <p:nvSpPr>
+          <p:cNvPr id="209" name="Oval 10"/>
           <p:cNvSpPr>
             <a:spLocks noChangeArrowheads="1"/>
           </p:cNvSpPr>
@@ -9331,8 +9166,247 @@
         </p:nvSpPr>
         <p:spPr bwMode="auto">
           <a:xfrm>
-            <a:off x="6129885" y="4285277"/>
-            <a:ext cx="2072283" cy="838200"/>
+            <a:off x="-8768" y="6369297"/>
+            <a:ext cx="1341899" cy="381000"/>
+          </a:xfrm>
+          <a:prstGeom prst="ellipse">
+            <a:avLst/>
+          </a:prstGeom>
+          <a:solidFill>
+            <a:schemeClr val="bg1">
+              <a:lumMod val="85000"/>
+            </a:schemeClr>
+          </a:solidFill>
+          <a:ln w="9525">
+            <a:solidFill>
+              <a:schemeClr val="tx1"/>
+            </a:solidFill>
+            <a:round/>
+            <a:headEnd/>
+            <a:tailEnd/>
+          </a:ln>
+          <a:effectLst/>
+        </p:spPr>
+        <p:txBody>
+          <a:bodyPr wrap="none" anchor="ctr"/>
+          <a:lstStyle/>
+          <a:p>
+            <a:pPr algn="ctr" eaLnBrk="0" fontAlgn="base" hangingPunct="0">
+              <a:spcBef>
+                <a:spcPct val="0"/>
+              </a:spcBef>
+              <a:spcAft>
+                <a:spcPct val="0"/>
+              </a:spcAft>
+            </a:pPr>
+            <a:r>
+              <a:rPr lang="en-US" sz="1600" dirty="0" err="1" smtClean="0">
+                <a:solidFill>
+                  <a:prstClr val="black"/>
+                </a:solidFill>
+                <a:latin typeface="Arial" charset="0"/>
+              </a:rPr>
+              <a:t>categoryName</a:t>
+            </a:r>
+            <a:endParaRPr lang="en-US" dirty="0">
+              <a:solidFill>
+                <a:prstClr val="black"/>
+              </a:solidFill>
+              <a:latin typeface="Arial" charset="0"/>
+            </a:endParaRPr>
+          </a:p>
+        </p:txBody>
+      </p:sp>
+      <p:sp>
+        <p:nvSpPr>
+          <p:cNvPr id="210" name="Oval 112"/>
+          <p:cNvSpPr>
+            <a:spLocks noChangeArrowheads="1"/>
+          </p:cNvSpPr>
+          <p:nvPr/>
+        </p:nvSpPr>
+        <p:spPr bwMode="auto">
+          <a:xfrm>
+            <a:off x="45559" y="5862309"/>
+            <a:ext cx="1143000" cy="381000"/>
+          </a:xfrm>
+          <a:prstGeom prst="ellipse">
+            <a:avLst/>
+          </a:prstGeom>
+          <a:solidFill>
+            <a:schemeClr val="bg1">
+              <a:lumMod val="85000"/>
+            </a:schemeClr>
+          </a:solidFill>
+          <a:ln w="9525">
+            <a:solidFill>
+              <a:schemeClr val="tx1"/>
+            </a:solidFill>
+            <a:round/>
+            <a:headEnd/>
+            <a:tailEnd/>
+          </a:ln>
+          <a:effectLst/>
+        </p:spPr>
+        <p:txBody>
+          <a:bodyPr wrap="none" anchor="ctr"/>
+          <a:lstStyle/>
+          <a:p>
+            <a:pPr algn="ctr" eaLnBrk="0" fontAlgn="base" hangingPunct="0">
+              <a:spcBef>
+                <a:spcPct val="0"/>
+              </a:spcBef>
+              <a:spcAft>
+                <a:spcPct val="0"/>
+              </a:spcAft>
+            </a:pPr>
+            <a:r>
+              <a:rPr lang="en-US" sz="1600" u="sng" dirty="0" err="1" smtClean="0">
+                <a:solidFill>
+                  <a:prstClr val="black"/>
+                </a:solidFill>
+                <a:latin typeface="Arial" charset="0"/>
+              </a:rPr>
+              <a:t>categoryID</a:t>
+            </a:r>
+            <a:endParaRPr lang="en-US" dirty="0">
+              <a:solidFill>
+                <a:prstClr val="black"/>
+              </a:solidFill>
+              <a:latin typeface="Arial" charset="0"/>
+            </a:endParaRPr>
+          </a:p>
+        </p:txBody>
+      </p:sp>
+      <p:cxnSp>
+        <p:nvCxnSpPr>
+          <p:cNvPr id="211" name="AutoShape 13"/>
+          <p:cNvCxnSpPr>
+            <a:cxnSpLocks noChangeShapeType="1"/>
+            <a:stCxn id="210" idx="6"/>
+            <a:endCxn id="200" idx="1"/>
+          </p:cNvCxnSpPr>
+          <p:nvPr/>
+        </p:nvCxnSpPr>
+        <p:spPr bwMode="auto">
+          <a:xfrm>
+            <a:off x="1188559" y="6052809"/>
+            <a:ext cx="447011" cy="392688"/>
+          </a:xfrm>
+          <a:prstGeom prst="straightConnector1">
+            <a:avLst/>
+          </a:prstGeom>
+          <a:noFill/>
+          <a:ln w="9525">
+            <a:solidFill>
+              <a:schemeClr val="tx1"/>
+            </a:solidFill>
+            <a:round/>
+            <a:headEnd/>
+            <a:tailEnd/>
+          </a:ln>
+          <a:effectLst/>
+        </p:spPr>
+      </p:cxnSp>
+      <p:cxnSp>
+        <p:nvCxnSpPr>
+          <p:cNvPr id="212" name="AutoShape 13"/>
+          <p:cNvCxnSpPr>
+            <a:cxnSpLocks noChangeShapeType="1"/>
+            <a:stCxn id="209" idx="6"/>
+            <a:endCxn id="200" idx="1"/>
+          </p:cNvCxnSpPr>
+          <p:nvPr/>
+        </p:nvCxnSpPr>
+        <p:spPr bwMode="auto">
+          <a:xfrm flipV="1">
+            <a:off x="1333131" y="6445497"/>
+            <a:ext cx="302439" cy="114300"/>
+          </a:xfrm>
+          <a:prstGeom prst="straightConnector1">
+            <a:avLst/>
+          </a:prstGeom>
+          <a:noFill/>
+          <a:ln w="9525">
+            <a:solidFill>
+              <a:schemeClr val="tx1"/>
+            </a:solidFill>
+            <a:round/>
+            <a:headEnd/>
+            <a:tailEnd/>
+          </a:ln>
+          <a:effectLst/>
+        </p:spPr>
+      </p:cxnSp>
+      <p:sp>
+        <p:nvSpPr>
+          <p:cNvPr id="219" name="Text Box 145"/>
+          <p:cNvSpPr txBox="1">
+            <a:spLocks noChangeArrowheads="1"/>
+          </p:cNvSpPr>
+          <p:nvPr/>
+        </p:nvSpPr>
+        <p:spPr bwMode="auto">
+          <a:xfrm>
+            <a:off x="3810567" y="6073641"/>
+            <a:ext cx="284052" cy="307777"/>
+          </a:xfrm>
+          <a:prstGeom prst="rect">
+            <a:avLst/>
+          </a:prstGeom>
+          <a:noFill/>
+          <a:ln w="9525">
+            <a:noFill/>
+            <a:miter lim="800000"/>
+            <a:headEnd/>
+            <a:tailEnd/>
+          </a:ln>
+          <a:effectLst/>
+        </p:spPr>
+        <p:txBody>
+          <a:bodyPr wrap="none">
+            <a:spAutoFit/>
+          </a:bodyPr>
+          <a:lstStyle/>
+          <a:p>
+            <a:pPr eaLnBrk="0" fontAlgn="base" hangingPunct="0">
+              <a:spcBef>
+                <a:spcPct val="0"/>
+              </a:spcBef>
+              <a:spcAft>
+                <a:spcPct val="0"/>
+              </a:spcAft>
+            </a:pPr>
+            <a:r>
+              <a:rPr lang="en-US" sz="1400" dirty="0" smtClean="0">
+                <a:solidFill>
+                  <a:prstClr val="black"/>
+                </a:solidFill>
+                <a:latin typeface="Arial" charset="0"/>
+              </a:rPr>
+              <a:t>1</a:t>
+            </a:r>
+            <a:endParaRPr lang="en-US" sz="1400" dirty="0">
+              <a:solidFill>
+                <a:prstClr val="black"/>
+              </a:solidFill>
+              <a:latin typeface="Arial" charset="0"/>
+            </a:endParaRPr>
+          </a:p>
+        </p:txBody>
+      </p:sp>
+      <p:sp>
+        <p:nvSpPr>
+          <p:cNvPr id="182" name="AutoShape 6"/>
+          <p:cNvSpPr>
+            <a:spLocks noChangeArrowheads="1"/>
+          </p:cNvSpPr>
+          <p:nvPr/>
+        </p:nvSpPr>
+        <p:spPr bwMode="auto">
+          <a:xfrm>
+            <a:off x="3500376" y="1290166"/>
+            <a:ext cx="1948188" cy="838200"/>
           </a:xfrm>
           <a:prstGeom prst="flowChartDecision">
             <a:avLst/>
@@ -9372,7 +9446,7 @@
                 </a:solidFill>
                 <a:latin typeface="Arial" charset="0"/>
               </a:rPr>
-              <a:t>IntroducedElements</a:t>
+              <a:t>ReportChapter</a:t>
             </a:r>
             <a:endParaRPr lang="en-US" sz="1400" dirty="0">
               <a:solidFill>
@@ -9385,18 +9459,17 @@
       </p:sp>
       <p:cxnSp>
         <p:nvCxnSpPr>
-          <p:cNvPr id="134" name="AutoShape 7"/>
+          <p:cNvPr id="184" name="AutoShape 7"/>
           <p:cNvCxnSpPr>
             <a:cxnSpLocks noChangeShapeType="1"/>
-            <a:stCxn id="131" idx="0"/>
-            <a:endCxn id="110" idx="2"/>
+            <a:stCxn id="182" idx="3"/>
           </p:cNvCxnSpPr>
           <p:nvPr/>
         </p:nvCxnSpPr>
         <p:spPr bwMode="auto">
           <a:xfrm flipV="1">
-            <a:off x="7166027" y="3415731"/>
-            <a:ext cx="341238" cy="869546"/>
+            <a:off x="5448564" y="941546"/>
+            <a:ext cx="683824" cy="767720"/>
           </a:xfrm>
           <a:prstGeom prst="straightConnector1">
             <a:avLst/>
@@ -9415,7 +9488,7 @@
       </p:cxnSp>
       <p:sp>
         <p:nvSpPr>
-          <p:cNvPr id="135" name="Text Box 149"/>
+          <p:cNvPr id="186" name="Text Box 149"/>
           <p:cNvSpPr txBox="1">
             <a:spLocks noChangeArrowheads="1"/>
           </p:cNvSpPr>
@@ -9423,7 +9496,7 @@
         </p:nvSpPr>
         <p:spPr bwMode="auto">
           <a:xfrm>
-            <a:off x="7255529" y="5651539"/>
+            <a:off x="5538353" y="926392"/>
             <a:ext cx="522900" cy="307777"/>
           </a:xfrm>
           <a:prstGeom prst="rect">
@@ -9466,7 +9539,7 @@
       </p:sp>
       <p:sp>
         <p:nvSpPr>
-          <p:cNvPr id="146" name="AutoShape 6"/>
+          <p:cNvPr id="188" name="AutoShape 6"/>
           <p:cNvSpPr>
             <a:spLocks noChangeArrowheads="1"/>
           </p:cNvSpPr>
@@ -9474,8 +9547,8 @@
         </p:nvSpPr>
         <p:spPr bwMode="auto">
           <a:xfrm>
-            <a:off x="8614780" y="4175036"/>
-            <a:ext cx="2072283" cy="838200"/>
+            <a:off x="1814681" y="2172382"/>
+            <a:ext cx="1295400" cy="838200"/>
           </a:xfrm>
           <a:prstGeom prst="flowChartDecision">
             <a:avLst/>
@@ -9515,7 +9588,7 @@
                 </a:solidFill>
                 <a:latin typeface="Arial" charset="0"/>
               </a:rPr>
-              <a:t>TestedElements</a:t>
+              <a:t>ModChapter</a:t>
             </a:r>
             <a:endParaRPr lang="en-US" sz="1400" dirty="0">
               <a:solidFill>
@@ -9528,18 +9601,18 @@
       </p:sp>
       <p:cxnSp>
         <p:nvCxnSpPr>
-          <p:cNvPr id="149" name="AutoShape 7"/>
+          <p:cNvPr id="202" name="AutoShape 13"/>
           <p:cNvCxnSpPr>
             <a:cxnSpLocks noChangeShapeType="1"/>
-            <a:stCxn id="146" idx="0"/>
-            <a:endCxn id="110" idx="2"/>
+            <a:stCxn id="188" idx="2"/>
+            <a:endCxn id="82" idx="0"/>
           </p:cNvCxnSpPr>
           <p:nvPr/>
         </p:nvCxnSpPr>
         <p:spPr bwMode="auto">
-          <a:xfrm flipH="1" flipV="1">
-            <a:off x="7507265" y="3415731"/>
-            <a:ext cx="2143657" cy="759305"/>
+          <a:xfrm>
+            <a:off x="2462381" y="3010582"/>
+            <a:ext cx="143587" cy="155380"/>
           </a:xfrm>
           <a:prstGeom prst="straightConnector1">
             <a:avLst/>
@@ -9556,20 +9629,82 @@
           <a:effectLst/>
         </p:spPr>
       </p:cxnSp>
+      <p:sp>
+        <p:nvSpPr>
+          <p:cNvPr id="206" name="AutoShape 4"/>
+          <p:cNvSpPr>
+            <a:spLocks noChangeArrowheads="1"/>
+          </p:cNvSpPr>
+          <p:nvPr/>
+        </p:nvSpPr>
+        <p:spPr bwMode="auto">
+          <a:xfrm>
+            <a:off x="1738481" y="1360108"/>
+            <a:ext cx="1447800" cy="609600"/>
+          </a:xfrm>
+          <a:prstGeom prst="flowChartProcess">
+            <a:avLst/>
+          </a:prstGeom>
+          <a:solidFill>
+            <a:schemeClr val="accent3">
+              <a:lumMod val="60000"/>
+              <a:lumOff val="40000"/>
+            </a:schemeClr>
+          </a:solidFill>
+          <a:ln w="9525">
+            <a:solidFill>
+              <a:schemeClr val="tx1"/>
+            </a:solidFill>
+            <a:miter lim="800000"/>
+            <a:headEnd/>
+            <a:tailEnd/>
+          </a:ln>
+          <a:effectLst/>
+        </p:spPr>
+        <p:txBody>
+          <a:bodyPr wrap="none" anchor="ctr"/>
+          <a:lstStyle/>
+          <a:p>
+            <a:pPr algn="ctr" eaLnBrk="0" fontAlgn="base" hangingPunct="0">
+              <a:spcBef>
+                <a:spcPct val="0"/>
+              </a:spcBef>
+              <a:spcAft>
+                <a:spcPct val="0"/>
+              </a:spcAft>
+            </a:pPr>
+            <a:r>
+              <a:rPr lang="en-US" dirty="0" smtClean="0">
+                <a:solidFill>
+                  <a:prstClr val="black"/>
+                </a:solidFill>
+                <a:latin typeface="Arial" charset="0"/>
+              </a:rPr>
+              <a:t>Chapter</a:t>
+            </a:r>
+            <a:endParaRPr lang="en-US" dirty="0">
+              <a:solidFill>
+                <a:prstClr val="black"/>
+              </a:solidFill>
+              <a:latin typeface="Arial" charset="0"/>
+            </a:endParaRPr>
+          </a:p>
+        </p:txBody>
+      </p:sp>
       <p:cxnSp>
         <p:nvCxnSpPr>
-          <p:cNvPr id="150" name="AutoShape 7"/>
+          <p:cNvPr id="207" name="AutoShape 7"/>
           <p:cNvCxnSpPr>
             <a:cxnSpLocks noChangeShapeType="1"/>
-            <a:stCxn id="146" idx="2"/>
-            <a:endCxn id="130" idx="0"/>
+            <a:stCxn id="206" idx="3"/>
+            <a:endCxn id="182" idx="1"/>
           </p:cNvCxnSpPr>
           <p:nvPr/>
         </p:nvCxnSpPr>
         <p:spPr bwMode="auto">
-          <a:xfrm flipH="1">
-            <a:off x="8154965" y="5013236"/>
-            <a:ext cx="1495957" cy="958663"/>
+          <a:xfrm>
+            <a:off x="3186281" y="1664908"/>
+            <a:ext cx="314095" cy="44358"/>
           </a:xfrm>
           <a:prstGeom prst="straightConnector1">
             <a:avLst/>
@@ -9588,18 +9723,18 @@
       </p:cxnSp>
       <p:cxnSp>
         <p:nvCxnSpPr>
-          <p:cNvPr id="153" name="AutoShape 7"/>
+          <p:cNvPr id="213" name="AutoShape 13"/>
           <p:cNvCxnSpPr>
             <a:cxnSpLocks noChangeShapeType="1"/>
-            <a:stCxn id="130" idx="0"/>
-            <a:endCxn id="131" idx="2"/>
+            <a:stCxn id="188" idx="0"/>
+            <a:endCxn id="206" idx="2"/>
           </p:cNvCxnSpPr>
           <p:nvPr/>
         </p:nvCxnSpPr>
         <p:spPr bwMode="auto">
-          <a:xfrm flipH="1" flipV="1">
-            <a:off x="7166027" y="5123477"/>
-            <a:ext cx="988938" cy="848422"/>
+          <a:xfrm flipV="1">
+            <a:off x="2462381" y="1969708"/>
+            <a:ext cx="0" cy="202674"/>
           </a:xfrm>
           <a:prstGeom prst="straightConnector1">
             <a:avLst/>
@@ -9618,67 +9753,16 @@
       </p:cxnSp>
       <p:sp>
         <p:nvSpPr>
-          <p:cNvPr id="165" name="Text Box 149"/>
-          <p:cNvSpPr txBox="1">
+          <p:cNvPr id="232" name="Oval 112"/>
+          <p:cNvSpPr>
             <a:spLocks noChangeArrowheads="1"/>
           </p:cNvSpPr>
           <p:nvPr/>
         </p:nvSpPr>
         <p:spPr bwMode="auto">
           <a:xfrm>
-            <a:off x="6551869" y="6044705"/>
-            <a:ext cx="522900" cy="307777"/>
-          </a:xfrm>
-          <a:prstGeom prst="rect">
-            <a:avLst/>
-          </a:prstGeom>
-          <a:noFill/>
-          <a:ln w="9525">
-            <a:noFill/>
-            <a:miter lim="800000"/>
-            <a:headEnd/>
-            <a:tailEnd/>
-          </a:ln>
-          <a:effectLst/>
-        </p:spPr>
-        <p:txBody>
-          <a:bodyPr wrap="none">
-            <a:spAutoFit/>
-          </a:bodyPr>
-          <a:lstStyle/>
-          <a:p>
-            <a:pPr eaLnBrk="0" fontAlgn="base" hangingPunct="0">
-              <a:spcBef>
-                <a:spcPct val="0"/>
-              </a:spcBef>
-              <a:spcAft>
-                <a:spcPct val="0"/>
-              </a:spcAft>
-            </a:pPr>
-            <a:r>
-              <a:rPr lang="en-US" sz="1400" dirty="0">
-                <a:solidFill>
-                  <a:prstClr val="black"/>
-                </a:solidFill>
-                <a:latin typeface="Arial" charset="0"/>
-              </a:rPr>
-              <a:t>{0,*}</a:t>
-            </a:r>
-          </a:p>
-        </p:txBody>
-      </p:sp>
-      <p:sp>
-        <p:nvSpPr>
-          <p:cNvPr id="167" name="Oval 112"/>
-          <p:cNvSpPr>
-            <a:spLocks noChangeArrowheads="1"/>
-          </p:cNvSpPr>
-          <p:nvPr/>
-        </p:nvSpPr>
-        <p:spPr bwMode="auto">
-          <a:xfrm>
-            <a:off x="9801614" y="5514743"/>
-            <a:ext cx="2527479" cy="381000"/>
+            <a:off x="20890" y="1283433"/>
+            <a:ext cx="1143000" cy="381000"/>
           </a:xfrm>
           <a:prstGeom prst="ellipse">
             <a:avLst/>
@@ -9717,7 +9801,7 @@
                 </a:solidFill>
                 <a:latin typeface="Arial" charset="0"/>
               </a:rPr>
-              <a:t>gameplayElementID</a:t>
+              <a:t>chapterID</a:t>
             </a:r>
             <a:endParaRPr lang="en-US" dirty="0">
               <a:solidFill>
@@ -9728,18 +9812,48 @@
           </a:p>
         </p:txBody>
       </p:sp>
-      <p:sp>
-        <p:nvSpPr>
-          <p:cNvPr id="168" name="Oval 112"/>
-          <p:cNvSpPr>
-            <a:spLocks noChangeArrowheads="1"/>
-          </p:cNvSpPr>
+      <p:cxnSp>
+        <p:nvCxnSpPr>
+          <p:cNvPr id="233" name="AutoShape 13"/>
+          <p:cNvCxnSpPr>
+            <a:cxnSpLocks noChangeShapeType="1"/>
+            <a:stCxn id="232" idx="6"/>
+            <a:endCxn id="206" idx="1"/>
+          </p:cNvCxnSpPr>
           <p:nvPr/>
-        </p:nvSpPr>
+        </p:nvCxnSpPr>
         <p:spPr bwMode="auto">
           <a:xfrm>
-            <a:off x="9496611" y="6316755"/>
-            <a:ext cx="2717050" cy="381000"/>
+            <a:off x="1163890" y="1473933"/>
+            <a:ext cx="574591" cy="190975"/>
+          </a:xfrm>
+          <a:prstGeom prst="straightConnector1">
+            <a:avLst/>
+          </a:prstGeom>
+          <a:noFill/>
+          <a:ln w="9525">
+            <a:solidFill>
+              <a:schemeClr val="tx1"/>
+            </a:solidFill>
+            <a:round/>
+            <a:headEnd/>
+            <a:tailEnd/>
+          </a:ln>
+          <a:effectLst/>
+        </p:spPr>
+      </p:cxnSp>
+      <p:sp>
+        <p:nvSpPr>
+          <p:cNvPr id="235" name="Oval 10"/>
+          <p:cNvSpPr>
+            <a:spLocks noChangeArrowheads="1"/>
+          </p:cNvSpPr>
+          <p:nvPr/>
+        </p:nvSpPr>
+        <p:spPr bwMode="auto">
+          <a:xfrm>
+            <a:off x="-23345" y="1779208"/>
+            <a:ext cx="1341899" cy="381000"/>
           </a:xfrm>
           <a:prstGeom prst="ellipse">
             <a:avLst/>
@@ -9778,9 +9892,9 @@
                 </a:solidFill>
                 <a:latin typeface="Arial" charset="0"/>
               </a:rPr>
-              <a:t>gameplayElementName</a:t>
-            </a:r>
-            <a:endParaRPr lang="en-US" sz="1600" dirty="0" smtClean="0">
+              <a:t>chapterName</a:t>
+            </a:r>
+            <a:endParaRPr lang="en-US" dirty="0">
               <a:solidFill>
                 <a:prstClr val="black"/>
               </a:solidFill>
@@ -9791,18 +9905,18 @@
       </p:sp>
       <p:cxnSp>
         <p:nvCxnSpPr>
-          <p:cNvPr id="169" name="AutoShape 7"/>
+          <p:cNvPr id="236" name="AutoShape 14"/>
           <p:cNvCxnSpPr>
             <a:cxnSpLocks noChangeShapeType="1"/>
-            <a:stCxn id="130" idx="3"/>
-            <a:endCxn id="167" idx="2"/>
+            <a:stCxn id="235" idx="6"/>
+            <a:endCxn id="206" idx="1"/>
           </p:cNvCxnSpPr>
           <p:nvPr/>
         </p:nvCxnSpPr>
         <p:spPr bwMode="auto">
           <a:xfrm flipV="1">
-            <a:off x="9191608" y="5705243"/>
-            <a:ext cx="610006" cy="571456"/>
+            <a:off x="1318554" y="1664908"/>
+            <a:ext cx="419927" cy="304800"/>
           </a:xfrm>
           <a:prstGeom prst="straightConnector1">
             <a:avLst/>
@@ -9819,78 +9933,18 @@
           <a:effectLst/>
         </p:spPr>
       </p:cxnSp>
-      <p:cxnSp>
-        <p:nvCxnSpPr>
-          <p:cNvPr id="172" name="AutoShape 7"/>
-          <p:cNvCxnSpPr>
-            <a:cxnSpLocks noChangeShapeType="1"/>
-            <a:stCxn id="130" idx="3"/>
-            <a:endCxn id="168" idx="2"/>
-          </p:cNvCxnSpPr>
+      <p:sp>
+        <p:nvSpPr>
+          <p:cNvPr id="238" name="Oval 10"/>
+          <p:cNvSpPr>
+            <a:spLocks noChangeArrowheads="1"/>
+          </p:cNvSpPr>
           <p:nvPr/>
-        </p:nvCxnSpPr>
+        </p:nvSpPr>
         <p:spPr bwMode="auto">
           <a:xfrm>
-            <a:off x="9191608" y="6276699"/>
-            <a:ext cx="305003" cy="230556"/>
-          </a:xfrm>
-          <a:prstGeom prst="straightConnector1">
-            <a:avLst/>
-          </a:prstGeom>
-          <a:noFill/>
-          <a:ln w="9525">
-            <a:solidFill>
-              <a:schemeClr val="tx1"/>
-            </a:solidFill>
-            <a:round/>
-            <a:headEnd/>
-            <a:tailEnd/>
-          </a:ln>
-          <a:effectLst/>
-        </p:spPr>
-      </p:cxnSp>
-      <p:cxnSp>
-        <p:nvCxnSpPr>
-          <p:cNvPr id="176" name="AutoShape 7"/>
-          <p:cNvCxnSpPr>
-            <a:cxnSpLocks noChangeShapeType="1"/>
-            <a:stCxn id="110" idx="3"/>
-            <a:endCxn id="179" idx="2"/>
-          </p:cNvCxnSpPr>
-          <p:nvPr/>
-        </p:nvCxnSpPr>
-        <p:spPr bwMode="auto">
-          <a:xfrm>
-            <a:off x="8154965" y="2996631"/>
-            <a:ext cx="1407403" cy="34076"/>
-          </a:xfrm>
-          <a:prstGeom prst="straightConnector1">
-            <a:avLst/>
-          </a:prstGeom>
-          <a:noFill/>
-          <a:ln w="9525">
-            <a:solidFill>
-              <a:schemeClr val="tx1"/>
-            </a:solidFill>
-            <a:round/>
-            <a:headEnd/>
-            <a:tailEnd/>
-          </a:ln>
-          <a:effectLst/>
-        </p:spPr>
-      </p:cxnSp>
-      <p:sp>
-        <p:nvSpPr>
-          <p:cNvPr id="179" name="Oval 112"/>
-          <p:cNvSpPr>
-            <a:spLocks noChangeArrowheads="1"/>
-          </p:cNvSpPr>
-          <p:nvPr/>
-        </p:nvSpPr>
-        <p:spPr bwMode="auto">
-          <a:xfrm>
-            <a:off x="9562368" y="2840207"/>
-            <a:ext cx="2527479" cy="381000"/>
+            <a:off x="8186" y="2241485"/>
+            <a:ext cx="1341899" cy="381000"/>
           </a:xfrm>
           <a:prstGeom prst="ellipse">
             <a:avLst/>
@@ -9923,13 +9977,13 @@
               </a:spcAft>
             </a:pPr>
             <a:r>
-              <a:rPr lang="en-US" dirty="0" err="1" smtClean="0">
+              <a:rPr lang="en-US" sz="1600" dirty="0" err="1" smtClean="0">
                 <a:solidFill>
                   <a:prstClr val="black"/>
                 </a:solidFill>
                 <a:latin typeface="Arial" charset="0"/>
               </a:rPr>
-              <a:t>timePlayed</a:t>
+              <a:t>chapterNumber</a:t>
             </a:r>
             <a:endParaRPr lang="en-US" dirty="0">
               <a:solidFill>
@@ -9940,17 +9994,212 @@
           </a:p>
         </p:txBody>
       </p:sp>
-      <p:sp>
-        <p:nvSpPr>
-          <p:cNvPr id="183" name="Oval 114"/>
-          <p:cNvSpPr>
+      <p:cxnSp>
+        <p:nvCxnSpPr>
+          <p:cNvPr id="239" name="AutoShape 14"/>
+          <p:cNvCxnSpPr>
+            <a:cxnSpLocks noChangeShapeType="1"/>
+            <a:stCxn id="238" idx="6"/>
+            <a:endCxn id="206" idx="1"/>
+          </p:cNvCxnSpPr>
+          <p:nvPr/>
+        </p:nvCxnSpPr>
+        <p:spPr bwMode="auto">
+          <a:xfrm flipV="1">
+            <a:off x="1350085" y="1664908"/>
+            <a:ext cx="388396" cy="767077"/>
+          </a:xfrm>
+          <a:prstGeom prst="straightConnector1">
+            <a:avLst/>
+          </a:prstGeom>
+          <a:noFill/>
+          <a:ln w="9525">
+            <a:solidFill>
+              <a:schemeClr val="tx1"/>
+            </a:solidFill>
+            <a:round/>
+            <a:headEnd/>
+            <a:tailEnd/>
+          </a:ln>
+          <a:effectLst/>
+        </p:spPr>
+      </p:cxnSp>
+      <p:sp>
+        <p:nvSpPr>
+          <p:cNvPr id="244" name="Text Box 145"/>
+          <p:cNvSpPr txBox="1">
             <a:spLocks noChangeArrowheads="1"/>
           </p:cNvSpPr>
           <p:nvPr/>
         </p:nvSpPr>
         <p:spPr bwMode="auto">
           <a:xfrm>
-            <a:off x="8374961" y="2218119"/>
+            <a:off x="3142844" y="1342315"/>
+            <a:ext cx="284052" cy="307777"/>
+          </a:xfrm>
+          <a:prstGeom prst="rect">
+            <a:avLst/>
+          </a:prstGeom>
+          <a:noFill/>
+          <a:ln w="9525">
+            <a:noFill/>
+            <a:miter lim="800000"/>
+            <a:headEnd/>
+            <a:tailEnd/>
+          </a:ln>
+          <a:effectLst/>
+        </p:spPr>
+        <p:txBody>
+          <a:bodyPr wrap="none">
+            <a:spAutoFit/>
+          </a:bodyPr>
+          <a:lstStyle/>
+          <a:p>
+            <a:pPr eaLnBrk="0" fontAlgn="base" hangingPunct="0">
+              <a:spcBef>
+                <a:spcPct val="0"/>
+              </a:spcBef>
+              <a:spcAft>
+                <a:spcPct val="0"/>
+              </a:spcAft>
+            </a:pPr>
+            <a:r>
+              <a:rPr lang="en-US" sz="1400" dirty="0" smtClean="0">
+                <a:solidFill>
+                  <a:prstClr val="black"/>
+                </a:solidFill>
+                <a:latin typeface="Arial" charset="0"/>
+              </a:rPr>
+              <a:t>1</a:t>
+            </a:r>
+            <a:endParaRPr lang="en-US" sz="1400" dirty="0">
+              <a:solidFill>
+                <a:prstClr val="black"/>
+              </a:solidFill>
+              <a:latin typeface="Arial" charset="0"/>
+            </a:endParaRPr>
+          </a:p>
+        </p:txBody>
+      </p:sp>
+      <p:sp>
+        <p:nvSpPr>
+          <p:cNvPr id="245" name="Text Box 149"/>
+          <p:cNvSpPr txBox="1">
+            <a:spLocks noChangeArrowheads="1"/>
+          </p:cNvSpPr>
+          <p:nvPr/>
+        </p:nvSpPr>
+        <p:spPr bwMode="auto">
+          <a:xfrm>
+            <a:off x="2522239" y="1945549"/>
+            <a:ext cx="522900" cy="307777"/>
+          </a:xfrm>
+          <a:prstGeom prst="rect">
+            <a:avLst/>
+          </a:prstGeom>
+          <a:noFill/>
+          <a:ln w="9525">
+            <a:noFill/>
+            <a:miter lim="800000"/>
+            <a:headEnd/>
+            <a:tailEnd/>
+          </a:ln>
+          <a:effectLst/>
+        </p:spPr>
+        <p:txBody>
+          <a:bodyPr wrap="none">
+            <a:spAutoFit/>
+          </a:bodyPr>
+          <a:lstStyle/>
+          <a:p>
+            <a:pPr eaLnBrk="0" fontAlgn="base" hangingPunct="0">
+              <a:spcBef>
+                <a:spcPct val="0"/>
+              </a:spcBef>
+              <a:spcAft>
+                <a:spcPct val="0"/>
+              </a:spcAft>
+            </a:pPr>
+            <a:r>
+              <a:rPr lang="en-US" sz="1400" dirty="0">
+                <a:solidFill>
+                  <a:prstClr val="black"/>
+                </a:solidFill>
+                <a:latin typeface="Arial" charset="0"/>
+              </a:rPr>
+              <a:t>{0,*}</a:t>
+            </a:r>
+          </a:p>
+        </p:txBody>
+      </p:sp>
+      <p:sp>
+        <p:nvSpPr>
+          <p:cNvPr id="246" name="Text Box 145"/>
+          <p:cNvSpPr txBox="1">
+            <a:spLocks noChangeArrowheads="1"/>
+          </p:cNvSpPr>
+          <p:nvPr/>
+        </p:nvSpPr>
+        <p:spPr bwMode="auto">
+          <a:xfrm>
+            <a:off x="2641663" y="2856693"/>
+            <a:ext cx="284052" cy="307777"/>
+          </a:xfrm>
+          <a:prstGeom prst="rect">
+            <a:avLst/>
+          </a:prstGeom>
+          <a:noFill/>
+          <a:ln w="9525">
+            <a:noFill/>
+            <a:miter lim="800000"/>
+            <a:headEnd/>
+            <a:tailEnd/>
+          </a:ln>
+          <a:effectLst/>
+        </p:spPr>
+        <p:txBody>
+          <a:bodyPr wrap="none">
+            <a:spAutoFit/>
+          </a:bodyPr>
+          <a:lstStyle/>
+          <a:p>
+            <a:pPr eaLnBrk="0" fontAlgn="base" hangingPunct="0">
+              <a:spcBef>
+                <a:spcPct val="0"/>
+              </a:spcBef>
+              <a:spcAft>
+                <a:spcPct val="0"/>
+              </a:spcAft>
+            </a:pPr>
+            <a:r>
+              <a:rPr lang="en-US" sz="1400" dirty="0" smtClean="0">
+                <a:solidFill>
+                  <a:prstClr val="black"/>
+                </a:solidFill>
+                <a:latin typeface="Arial" charset="0"/>
+              </a:rPr>
+              <a:t>1</a:t>
+            </a:r>
+            <a:endParaRPr lang="en-US" sz="1400" dirty="0">
+              <a:solidFill>
+                <a:prstClr val="black"/>
+              </a:solidFill>
+              <a:latin typeface="Arial" charset="0"/>
+            </a:endParaRPr>
+          </a:p>
+        </p:txBody>
+      </p:sp>
+      <p:sp>
+        <p:nvSpPr>
+          <p:cNvPr id="247" name="Oval 114"/>
+          <p:cNvSpPr>
+            <a:spLocks noChangeArrowheads="1"/>
+          </p:cNvSpPr>
+          <p:nvPr/>
+        </p:nvSpPr>
+        <p:spPr bwMode="auto">
+          <a:xfrm>
+            <a:off x="8438108" y="1927645"/>
             <a:ext cx="1231814" cy="381000"/>
           </a:xfrm>
           <a:prstGeom prst="ellipse">
@@ -9984,13 +10233,13 @@
               </a:spcAft>
             </a:pPr>
             <a:r>
-              <a:rPr lang="en-US" sz="1600" dirty="0" smtClean="0">
+              <a:rPr lang="en-US" sz="1600" dirty="0" err="1" smtClean="0">
                 <a:solidFill>
                   <a:prstClr val="black"/>
                 </a:solidFill>
                 <a:latin typeface="Arial" charset="0"/>
               </a:rPr>
-              <a:t>rating</a:t>
+              <a:t>timePlayed</a:t>
             </a:r>
             <a:endParaRPr lang="en-US" dirty="0">
               <a:solidFill>
@@ -10003,18 +10252,18 @@
       </p:sp>
       <p:cxnSp>
         <p:nvCxnSpPr>
-          <p:cNvPr id="187" name="AutoShape 115"/>
+          <p:cNvPr id="248" name="AutoShape 115"/>
           <p:cNvCxnSpPr>
             <a:cxnSpLocks noChangeShapeType="1"/>
-            <a:stCxn id="183" idx="2"/>
+            <a:stCxn id="247" idx="2"/>
             <a:endCxn id="46085" idx="3"/>
           </p:cNvCxnSpPr>
           <p:nvPr/>
         </p:nvCxnSpPr>
         <p:spPr bwMode="auto">
           <a:xfrm flipH="1" flipV="1">
-            <a:off x="7508693" y="1898237"/>
-            <a:ext cx="866268" cy="510382"/>
+            <a:off x="7580188" y="815069"/>
+            <a:ext cx="857920" cy="1303076"/>
           </a:xfrm>
           <a:prstGeom prst="straightConnector1">
             <a:avLst/>
@@ -10031,39 +10280,9 @@
           <a:effectLst/>
         </p:spPr>
       </p:cxnSp>
-      <p:cxnSp>
-        <p:nvCxnSpPr>
-          <p:cNvPr id="195" name="AutoShape 7"/>
-          <p:cNvCxnSpPr>
-            <a:cxnSpLocks noChangeShapeType="1"/>
-            <a:stCxn id="198" idx="3"/>
-            <a:endCxn id="130" idx="1"/>
-          </p:cNvCxnSpPr>
-          <p:nvPr/>
-        </p:nvCxnSpPr>
-        <p:spPr bwMode="auto">
-          <a:xfrm flipV="1">
-            <a:off x="6063758" y="6276699"/>
-            <a:ext cx="1054564" cy="160716"/>
-          </a:xfrm>
-          <a:prstGeom prst="straightConnector1">
-            <a:avLst/>
-          </a:prstGeom>
-          <a:noFill/>
-          <a:ln w="9525">
-            <a:solidFill>
-              <a:schemeClr val="tx1"/>
-            </a:solidFill>
-            <a:round/>
-            <a:headEnd/>
-            <a:tailEnd/>
-          </a:ln>
-          <a:effectLst/>
-        </p:spPr>
-      </p:cxnSp>
-      <p:sp>
-        <p:nvSpPr>
-          <p:cNvPr id="198" name="AutoShape 6"/>
+      <p:sp>
+        <p:nvSpPr>
+          <p:cNvPr id="255" name="AutoShape 6"/>
           <p:cNvSpPr>
             <a:spLocks noChangeArrowheads="1"/>
           </p:cNvSpPr>
@@ -10071,7 +10290,7 @@
         </p:nvSpPr>
         <p:spPr bwMode="auto">
           <a:xfrm>
-            <a:off x="4399622" y="6018315"/>
+            <a:off x="5559974" y="3478101"/>
             <a:ext cx="1664136" cy="838200"/>
           </a:xfrm>
           <a:prstGeom prst="flowChartDecision">
@@ -10112,32 +10331,7 @@
                 </a:solidFill>
                 <a:latin typeface="Arial" charset="0"/>
               </a:rPr>
-              <a:t>gameplayElement</a:t>
-            </a:r>
-            <a:endParaRPr lang="en-US" sz="1400" dirty="0" smtClean="0">
-              <a:solidFill>
-                <a:prstClr val="black"/>
-              </a:solidFill>
-              <a:latin typeface="Arial" charset="0"/>
-            </a:endParaRPr>
-          </a:p>
-          <a:p>
-            <a:pPr algn="ctr" eaLnBrk="0" fontAlgn="base" hangingPunct="0">
-              <a:spcBef>
-                <a:spcPct val="0"/>
-              </a:spcBef>
-              <a:spcAft>
-                <a:spcPct val="0"/>
-              </a:spcAft>
-            </a:pPr>
-            <a:r>
-              <a:rPr lang="en-US" sz="1400" dirty="0" smtClean="0">
-                <a:solidFill>
-                  <a:prstClr val="black"/>
-                </a:solidFill>
-                <a:latin typeface="Arial" charset="0"/>
-              </a:rPr>
-              <a:t>-Category</a:t>
+              <a:t>IntroducedElement</a:t>
             </a:r>
             <a:endParaRPr lang="en-US" sz="1400" dirty="0">
               <a:solidFill>
@@ -10150,7 +10344,7 @@
       </p:sp>
       <p:sp>
         <p:nvSpPr>
-          <p:cNvPr id="200" name="AutoShape 4"/>
+          <p:cNvPr id="256" name="AutoShape 6"/>
           <p:cNvSpPr>
             <a:spLocks noChangeArrowheads="1"/>
           </p:cNvSpPr>
@@ -10158,16 +10352,16 @@
         </p:nvSpPr>
         <p:spPr bwMode="auto">
           <a:xfrm>
-            <a:off x="1635570" y="6140697"/>
-            <a:ext cx="2073286" cy="609600"/>
-          </a:xfrm>
-          <a:prstGeom prst="flowChartProcess">
+            <a:off x="7999778" y="3493864"/>
+            <a:ext cx="1664136" cy="838200"/>
+          </a:xfrm>
+          <a:prstGeom prst="flowChartDecision">
             <a:avLst/>
           </a:prstGeom>
           <a:solidFill>
-            <a:schemeClr val="accent3">
-              <a:lumMod val="60000"/>
-              <a:lumOff val="40000"/>
+            <a:schemeClr val="tx2">
+              <a:lumMod val="40000"/>
+              <a:lumOff val="60000"/>
             </a:schemeClr>
           </a:solidFill>
           <a:ln w="9525">
@@ -10193,15 +10387,15 @@
               </a:spcAft>
             </a:pPr>
             <a:r>
-              <a:rPr lang="en-US" dirty="0" err="1" smtClean="0">
+              <a:rPr lang="en-US" sz="1400" dirty="0" err="1" smtClean="0">
                 <a:solidFill>
                   <a:prstClr val="black"/>
                 </a:solidFill>
                 <a:latin typeface="Arial" charset="0"/>
               </a:rPr>
-              <a:t>GameplayCategory</a:t>
-            </a:r>
-            <a:endParaRPr lang="en-US" dirty="0" smtClean="0">
+              <a:t>TestedElement</a:t>
+            </a:r>
+            <a:endParaRPr lang="en-US" sz="1400" dirty="0">
               <a:solidFill>
                 <a:prstClr val="black"/>
               </a:solidFill>
@@ -10212,18 +10406,18 @@
       </p:sp>
       <p:cxnSp>
         <p:nvCxnSpPr>
-          <p:cNvPr id="201" name="AutoShape 7"/>
+          <p:cNvPr id="257" name="AutoShape 13"/>
           <p:cNvCxnSpPr>
             <a:cxnSpLocks noChangeShapeType="1"/>
-            <a:stCxn id="200" idx="3"/>
-            <a:endCxn id="198" idx="1"/>
+            <a:stCxn id="255" idx="2"/>
+            <a:endCxn id="130" idx="0"/>
           </p:cNvCxnSpPr>
           <p:nvPr/>
         </p:nvCxnSpPr>
         <p:spPr bwMode="auto">
-          <a:xfrm flipV="1">
-            <a:off x="3708856" y="6437415"/>
-            <a:ext cx="690766" cy="8082"/>
+          <a:xfrm>
+            <a:off x="6392042" y="4316301"/>
+            <a:ext cx="1754373" cy="1824396"/>
           </a:xfrm>
           <a:prstGeom prst="straightConnector1">
             <a:avLst/>
@@ -10240,18 +10434,216 @@
           <a:effectLst/>
         </p:spPr>
       </p:cxnSp>
-      <p:sp>
-        <p:nvSpPr>
-          <p:cNvPr id="209" name="Oval 10"/>
-          <p:cNvSpPr>
-            <a:spLocks noChangeArrowheads="1"/>
-          </p:cNvSpPr>
+      <p:cxnSp>
+        <p:nvCxnSpPr>
+          <p:cNvPr id="260" name="AutoShape 13"/>
+          <p:cNvCxnSpPr>
+            <a:cxnSpLocks noChangeShapeType="1"/>
+            <a:stCxn id="256" idx="2"/>
+            <a:endCxn id="130" idx="0"/>
+          </p:cNvCxnSpPr>
           <p:nvPr/>
-        </p:nvSpPr>
+        </p:nvCxnSpPr>
+        <p:spPr bwMode="auto">
+          <a:xfrm flipH="1">
+            <a:off x="8146415" y="4332064"/>
+            <a:ext cx="685431" cy="1808633"/>
+          </a:xfrm>
+          <a:prstGeom prst="straightConnector1">
+            <a:avLst/>
+          </a:prstGeom>
+          <a:noFill/>
+          <a:ln w="9525">
+            <a:solidFill>
+              <a:schemeClr val="tx1"/>
+            </a:solidFill>
+            <a:round/>
+            <a:headEnd/>
+            <a:tailEnd/>
+          </a:ln>
+          <a:effectLst/>
+        </p:spPr>
+      </p:cxnSp>
+      <p:cxnSp>
+        <p:nvCxnSpPr>
+          <p:cNvPr id="263" name="AutoShape 13"/>
+          <p:cNvCxnSpPr>
+            <a:cxnSpLocks noChangeShapeType="1"/>
+            <a:stCxn id="46085" idx="2"/>
+            <a:endCxn id="255" idx="0"/>
+          </p:cNvCxnSpPr>
+          <p:nvPr/>
+        </p:nvCxnSpPr>
+        <p:spPr bwMode="auto">
+          <a:xfrm flipH="1">
+            <a:off x="6392042" y="1119869"/>
+            <a:ext cx="464246" cy="2358232"/>
+          </a:xfrm>
+          <a:prstGeom prst="straightConnector1">
+            <a:avLst/>
+          </a:prstGeom>
+          <a:noFill/>
+          <a:ln w="9525">
+            <a:solidFill>
+              <a:schemeClr val="tx1"/>
+            </a:solidFill>
+            <a:round/>
+            <a:headEnd/>
+            <a:tailEnd/>
+          </a:ln>
+          <a:effectLst/>
+        </p:spPr>
+      </p:cxnSp>
+      <p:cxnSp>
+        <p:nvCxnSpPr>
+          <p:cNvPr id="266" name="AutoShape 13"/>
+          <p:cNvCxnSpPr>
+            <a:cxnSpLocks noChangeShapeType="1"/>
+            <a:stCxn id="46085" idx="2"/>
+            <a:endCxn id="256" idx="0"/>
+          </p:cNvCxnSpPr>
+          <p:nvPr/>
+        </p:nvCxnSpPr>
         <p:spPr bwMode="auto">
           <a:xfrm>
-            <a:off x="-8768" y="6369297"/>
-            <a:ext cx="1341899" cy="381000"/>
+            <a:off x="6856288" y="1119869"/>
+            <a:ext cx="1975558" cy="2373995"/>
+          </a:xfrm>
+          <a:prstGeom prst="straightConnector1">
+            <a:avLst/>
+          </a:prstGeom>
+          <a:noFill/>
+          <a:ln w="9525">
+            <a:solidFill>
+              <a:schemeClr val="tx1"/>
+            </a:solidFill>
+            <a:round/>
+            <a:headEnd/>
+            <a:tailEnd/>
+          </a:ln>
+          <a:effectLst/>
+        </p:spPr>
+      </p:cxnSp>
+      <p:sp>
+        <p:nvSpPr>
+          <p:cNvPr id="269" name="Text Box 149"/>
+          <p:cNvSpPr txBox="1">
+            <a:spLocks noChangeArrowheads="1"/>
+          </p:cNvSpPr>
+          <p:nvPr/>
+        </p:nvSpPr>
+        <p:spPr bwMode="auto">
+          <a:xfrm>
+            <a:off x="7268965" y="5718176"/>
+            <a:ext cx="522900" cy="307777"/>
+          </a:xfrm>
+          <a:prstGeom prst="rect">
+            <a:avLst/>
+          </a:prstGeom>
+          <a:noFill/>
+          <a:ln w="9525">
+            <a:noFill/>
+            <a:miter lim="800000"/>
+            <a:headEnd/>
+            <a:tailEnd/>
+          </a:ln>
+          <a:effectLst/>
+        </p:spPr>
+        <p:txBody>
+          <a:bodyPr wrap="none">
+            <a:spAutoFit/>
+          </a:bodyPr>
+          <a:lstStyle/>
+          <a:p>
+            <a:pPr eaLnBrk="0" fontAlgn="base" hangingPunct="0">
+              <a:spcBef>
+                <a:spcPct val="0"/>
+              </a:spcBef>
+              <a:spcAft>
+                <a:spcPct val="0"/>
+              </a:spcAft>
+            </a:pPr>
+            <a:r>
+              <a:rPr lang="en-US" sz="1400" dirty="0">
+                <a:solidFill>
+                  <a:prstClr val="black"/>
+                </a:solidFill>
+                <a:latin typeface="Arial" charset="0"/>
+              </a:rPr>
+              <a:t>{0,*}</a:t>
+            </a:r>
+          </a:p>
+        </p:txBody>
+      </p:sp>
+      <p:sp>
+        <p:nvSpPr>
+          <p:cNvPr id="270" name="Text Box 145"/>
+          <p:cNvSpPr txBox="1">
+            <a:spLocks noChangeArrowheads="1"/>
+          </p:cNvSpPr>
+          <p:nvPr/>
+        </p:nvSpPr>
+        <p:spPr bwMode="auto">
+          <a:xfrm>
+            <a:off x="6347044" y="1254590"/>
+            <a:ext cx="284052" cy="307777"/>
+          </a:xfrm>
+          <a:prstGeom prst="rect">
+            <a:avLst/>
+          </a:prstGeom>
+          <a:noFill/>
+          <a:ln w="9525">
+            <a:noFill/>
+            <a:miter lim="800000"/>
+            <a:headEnd/>
+            <a:tailEnd/>
+          </a:ln>
+          <a:effectLst/>
+        </p:spPr>
+        <p:txBody>
+          <a:bodyPr wrap="none">
+            <a:spAutoFit/>
+          </a:bodyPr>
+          <a:lstStyle/>
+          <a:p>
+            <a:pPr eaLnBrk="0" fontAlgn="base" hangingPunct="0">
+              <a:spcBef>
+                <a:spcPct val="0"/>
+              </a:spcBef>
+              <a:spcAft>
+                <a:spcPct val="0"/>
+              </a:spcAft>
+            </a:pPr>
+            <a:r>
+              <a:rPr lang="en-US" sz="1400" dirty="0" smtClean="0">
+                <a:solidFill>
+                  <a:prstClr val="black"/>
+                </a:solidFill>
+                <a:latin typeface="Arial" charset="0"/>
+              </a:rPr>
+              <a:t>1</a:t>
+            </a:r>
+            <a:endParaRPr lang="en-US" sz="1400" dirty="0">
+              <a:solidFill>
+                <a:prstClr val="black"/>
+              </a:solidFill>
+              <a:latin typeface="Arial" charset="0"/>
+            </a:endParaRPr>
+          </a:p>
+        </p:txBody>
+      </p:sp>
+      <p:sp>
+        <p:nvSpPr>
+          <p:cNvPr id="271" name="Oval 114"/>
+          <p:cNvSpPr>
+            <a:spLocks noChangeArrowheads="1"/>
+          </p:cNvSpPr>
+          <p:nvPr/>
+        </p:nvSpPr>
+        <p:spPr bwMode="auto">
+          <a:xfrm>
+            <a:off x="8489130" y="2454538"/>
+            <a:ext cx="1231814" cy="381000"/>
           </a:xfrm>
           <a:prstGeom prst="ellipse">
             <a:avLst/>
@@ -10284,13 +10676,13 @@
               </a:spcAft>
             </a:pPr>
             <a:r>
-              <a:rPr lang="en-US" sz="1600" dirty="0" err="1" smtClean="0">
+              <a:rPr lang="en-US" dirty="0" smtClean="0">
                 <a:solidFill>
                   <a:prstClr val="black"/>
                 </a:solidFill>
                 <a:latin typeface="Arial" charset="0"/>
               </a:rPr>
-              <a:t>categoryName</a:t>
+              <a:t>comment</a:t>
             </a:r>
             <a:endParaRPr lang="en-US" dirty="0">
               <a:solidFill>
@@ -10301,9 +10693,39 @@
           </a:p>
         </p:txBody>
       </p:sp>
-      <p:sp>
-        <p:nvSpPr>
-          <p:cNvPr id="210" name="Oval 112"/>
+      <p:cxnSp>
+        <p:nvCxnSpPr>
+          <p:cNvPr id="272" name="AutoShape 115"/>
+          <p:cNvCxnSpPr>
+            <a:cxnSpLocks noChangeShapeType="1"/>
+            <a:stCxn id="271" idx="2"/>
+            <a:endCxn id="46085" idx="3"/>
+          </p:cNvCxnSpPr>
+          <p:nvPr/>
+        </p:nvCxnSpPr>
+        <p:spPr bwMode="auto">
+          <a:xfrm flipH="1" flipV="1">
+            <a:off x="7580188" y="815069"/>
+            <a:ext cx="908942" cy="1829969"/>
+          </a:xfrm>
+          <a:prstGeom prst="straightConnector1">
+            <a:avLst/>
+          </a:prstGeom>
+          <a:noFill/>
+          <a:ln w="9525">
+            <a:solidFill>
+              <a:schemeClr val="tx1"/>
+            </a:solidFill>
+            <a:round/>
+            <a:headEnd/>
+            <a:tailEnd/>
+          </a:ln>
+          <a:effectLst/>
+        </p:spPr>
+      </p:cxnSp>
+      <p:sp>
+        <p:nvSpPr>
+          <p:cNvPr id="276" name="Oval 114"/>
           <p:cNvSpPr>
             <a:spLocks noChangeArrowheads="1"/>
           </p:cNvSpPr>
@@ -10311,8 +10733,8 @@
         </p:nvSpPr>
         <p:spPr bwMode="auto">
           <a:xfrm>
-            <a:off x="45559" y="5862309"/>
-            <a:ext cx="1143000" cy="381000"/>
+            <a:off x="9942533" y="3706701"/>
+            <a:ext cx="1231814" cy="381000"/>
           </a:xfrm>
           <a:prstGeom prst="ellipse">
             <a:avLst/>
@@ -10345,13 +10767,13 @@
               </a:spcAft>
             </a:pPr>
             <a:r>
-              <a:rPr lang="en-US" sz="1600" u="sng" dirty="0" err="1" smtClean="0">
+              <a:rPr lang="en-US" dirty="0" smtClean="0">
                 <a:solidFill>
                   <a:prstClr val="black"/>
                 </a:solidFill>
                 <a:latin typeface="Arial" charset="0"/>
               </a:rPr>
-              <a:t>categoryID</a:t>
+              <a:t>comment</a:t>
             </a:r>
             <a:endParaRPr lang="en-US" dirty="0">
               <a:solidFill>
@@ -10364,18 +10786,18 @@
       </p:sp>
       <p:cxnSp>
         <p:nvCxnSpPr>
-          <p:cNvPr id="211" name="AutoShape 13"/>
+          <p:cNvPr id="277" name="AutoShape 115"/>
           <p:cNvCxnSpPr>
             <a:cxnSpLocks noChangeShapeType="1"/>
-            <a:stCxn id="210" idx="6"/>
-            <a:endCxn id="200" idx="1"/>
+            <a:stCxn id="276" idx="2"/>
+            <a:endCxn id="256" idx="3"/>
           </p:cNvCxnSpPr>
           <p:nvPr/>
         </p:nvCxnSpPr>
         <p:spPr bwMode="auto">
-          <a:xfrm>
-            <a:off x="1188559" y="6052809"/>
-            <a:ext cx="447011" cy="392688"/>
+          <a:xfrm flipH="1">
+            <a:off x="9663914" y="3897201"/>
+            <a:ext cx="278619" cy="15763"/>
           </a:xfrm>
           <a:prstGeom prst="straightConnector1">
             <a:avLst/>
@@ -10392,135 +10814,18 @@
           <a:effectLst/>
         </p:spPr>
       </p:cxnSp>
-      <p:cxnSp>
-        <p:nvCxnSpPr>
-          <p:cNvPr id="212" name="AutoShape 13"/>
-          <p:cNvCxnSpPr>
-            <a:cxnSpLocks noChangeShapeType="1"/>
-            <a:stCxn id="209" idx="6"/>
-            <a:endCxn id="200" idx="1"/>
-          </p:cNvCxnSpPr>
-          <p:nvPr/>
-        </p:nvCxnSpPr>
-        <p:spPr bwMode="auto">
-          <a:xfrm flipV="1">
-            <a:off x="1333131" y="6445497"/>
-            <a:ext cx="302439" cy="114300"/>
-          </a:xfrm>
-          <a:prstGeom prst="straightConnector1">
-            <a:avLst/>
-          </a:prstGeom>
-          <a:noFill/>
-          <a:ln w="9525">
-            <a:solidFill>
-              <a:schemeClr val="tx1"/>
-            </a:solidFill>
-            <a:round/>
-            <a:headEnd/>
-            <a:tailEnd/>
-          </a:ln>
-          <a:effectLst/>
-        </p:spPr>
-      </p:cxnSp>
-      <p:sp>
-        <p:nvSpPr>
-          <p:cNvPr id="219" name="Text Box 145"/>
-          <p:cNvSpPr txBox="1">
+      <p:sp>
+        <p:nvSpPr>
+          <p:cNvPr id="280" name="Oval 114"/>
+          <p:cNvSpPr>
             <a:spLocks noChangeArrowheads="1"/>
           </p:cNvSpPr>
           <p:nvPr/>
         </p:nvSpPr>
         <p:spPr bwMode="auto">
           <a:xfrm>
-            <a:off x="3810567" y="6073641"/>
-            <a:ext cx="284052" cy="307777"/>
-          </a:xfrm>
-          <a:prstGeom prst="rect">
-            <a:avLst/>
-          </a:prstGeom>
-          <a:noFill/>
-          <a:ln w="9525">
-            <a:noFill/>
-            <a:miter lim="800000"/>
-            <a:headEnd/>
-            <a:tailEnd/>
-          </a:ln>
-          <a:effectLst/>
-        </p:spPr>
-        <p:txBody>
-          <a:bodyPr wrap="none">
-            <a:spAutoFit/>
-          </a:bodyPr>
-          <a:lstStyle/>
-          <a:p>
-            <a:pPr eaLnBrk="0" fontAlgn="base" hangingPunct="0">
-              <a:spcBef>
-                <a:spcPct val="0"/>
-              </a:spcBef>
-              <a:spcAft>
-                <a:spcPct val="0"/>
-              </a:spcAft>
-            </a:pPr>
-            <a:r>
-              <a:rPr lang="en-US" sz="1400" dirty="0" smtClean="0">
-                <a:solidFill>
-                  <a:prstClr val="black"/>
-                </a:solidFill>
-                <a:latin typeface="Arial" charset="0"/>
-              </a:rPr>
-              <a:t>1</a:t>
-            </a:r>
-            <a:endParaRPr lang="en-US" sz="1400" dirty="0">
-              <a:solidFill>
-                <a:prstClr val="black"/>
-              </a:solidFill>
-              <a:latin typeface="Arial" charset="0"/>
-            </a:endParaRPr>
-          </a:p>
-        </p:txBody>
-      </p:sp>
-      <p:cxnSp>
-        <p:nvCxnSpPr>
-          <p:cNvPr id="84" name="AutoShape 7"/>
-          <p:cNvCxnSpPr>
-            <a:cxnSpLocks noChangeShapeType="1"/>
-            <a:stCxn id="87" idx="6"/>
-            <a:endCxn id="131" idx="1"/>
-          </p:cNvCxnSpPr>
-          <p:nvPr/>
-        </p:nvCxnSpPr>
-        <p:spPr bwMode="auto">
-          <a:xfrm flipH="1" flipV="1">
-            <a:off x="6129885" y="4704377"/>
-            <a:ext cx="76200" cy="486984"/>
-          </a:xfrm>
-          <a:prstGeom prst="straightConnector1">
-            <a:avLst/>
-          </a:prstGeom>
-          <a:noFill/>
-          <a:ln w="9525">
-            <a:solidFill>
-              <a:schemeClr val="tx1"/>
-            </a:solidFill>
-            <a:round/>
-            <a:headEnd/>
-            <a:tailEnd/>
-          </a:ln>
-          <a:effectLst/>
-        </p:spPr>
-      </p:cxnSp>
-      <p:sp>
-        <p:nvSpPr>
-          <p:cNvPr id="87" name="Oval 112"/>
-          <p:cNvSpPr>
-            <a:spLocks noChangeArrowheads="1"/>
-          </p:cNvSpPr>
-          <p:nvPr/>
-        </p:nvSpPr>
-        <p:spPr bwMode="auto">
-          <a:xfrm>
-            <a:off x="5063085" y="5000861"/>
-            <a:ext cx="1143000" cy="381000"/>
+            <a:off x="4099375" y="3706701"/>
+            <a:ext cx="1231814" cy="381000"/>
           </a:xfrm>
           <a:prstGeom prst="ellipse">
             <a:avLst/>
@@ -10553,7 +10858,7 @@
               </a:spcAft>
             </a:pPr>
             <a:r>
-              <a:rPr lang="en-US" sz="1600" dirty="0" smtClean="0">
+              <a:rPr lang="en-US" dirty="0" smtClean="0">
                 <a:solidFill>
                   <a:prstClr val="black"/>
                 </a:solidFill>
@@ -10561,23 +10866,29 @@
               </a:rPr>
               <a:t>comment</a:t>
             </a:r>
+            <a:endParaRPr lang="en-US" dirty="0">
+              <a:solidFill>
+                <a:prstClr val="black"/>
+              </a:solidFill>
+              <a:latin typeface="Arial" charset="0"/>
+            </a:endParaRPr>
           </a:p>
         </p:txBody>
       </p:sp>
       <p:cxnSp>
         <p:nvCxnSpPr>
-          <p:cNvPr id="136" name="AutoShape 7"/>
+          <p:cNvPr id="281" name="AutoShape 115"/>
           <p:cNvCxnSpPr>
             <a:cxnSpLocks noChangeShapeType="1"/>
-            <a:stCxn id="146" idx="3"/>
-            <a:endCxn id="141" idx="2"/>
+            <a:stCxn id="255" idx="1"/>
+            <a:endCxn id="280" idx="6"/>
           </p:cNvCxnSpPr>
           <p:nvPr/>
         </p:nvCxnSpPr>
         <p:spPr bwMode="auto">
-          <a:xfrm flipV="1">
-            <a:off x="10687063" y="4527609"/>
-            <a:ext cx="393653" cy="66527"/>
+          <a:xfrm flipH="1">
+            <a:off x="5331189" y="3897201"/>
+            <a:ext cx="228785" cy="0"/>
           </a:xfrm>
           <a:prstGeom prst="straightConnector1">
             <a:avLst/>
@@ -10594,61 +10905,6 @@
           <a:effectLst/>
         </p:spPr>
       </p:cxnSp>
-      <p:sp>
-        <p:nvSpPr>
-          <p:cNvPr id="141" name="Oval 112"/>
-          <p:cNvSpPr>
-            <a:spLocks noChangeArrowheads="1"/>
-          </p:cNvSpPr>
-          <p:nvPr/>
-        </p:nvSpPr>
-        <p:spPr bwMode="auto">
-          <a:xfrm>
-            <a:off x="11080716" y="4337109"/>
-            <a:ext cx="1143000" cy="381000"/>
-          </a:xfrm>
-          <a:prstGeom prst="ellipse">
-            <a:avLst/>
-          </a:prstGeom>
-          <a:solidFill>
-            <a:schemeClr val="bg1">
-              <a:lumMod val="85000"/>
-            </a:schemeClr>
-          </a:solidFill>
-          <a:ln w="9525">
-            <a:solidFill>
-              <a:schemeClr val="tx1"/>
-            </a:solidFill>
-            <a:round/>
-            <a:headEnd/>
-            <a:tailEnd/>
-          </a:ln>
-          <a:effectLst/>
-        </p:spPr>
-        <p:txBody>
-          <a:bodyPr wrap="none" anchor="ctr"/>
-          <a:lstStyle/>
-          <a:p>
-            <a:pPr algn="ctr" eaLnBrk="0" fontAlgn="base" hangingPunct="0">
-              <a:spcBef>
-                <a:spcPct val="0"/>
-              </a:spcBef>
-              <a:spcAft>
-                <a:spcPct val="0"/>
-              </a:spcAft>
-            </a:pPr>
-            <a:r>
-              <a:rPr lang="en-US" sz="1600" dirty="0" smtClean="0">
-                <a:solidFill>
-                  <a:prstClr val="black"/>
-                </a:solidFill>
-                <a:latin typeface="Arial" charset="0"/>
-              </a:rPr>
-              <a:t>comment</a:t>
-            </a:r>
-          </a:p>
-        </p:txBody>
-      </p:sp>
     </p:spTree>
     <p:extLst>
       <p:ext uri="{BB962C8B-B14F-4D97-AF65-F5344CB8AC3E}">

</xml_diff>

<commit_message>
Settled upon a schema that associates reviews with chapters as well as mods. The glaring flaw is that all chapters associated with a review must also be associated with a mod. I think a constraint will be required.
</commit_message>
<xml_diff>
--- a/project/erd.pptx
+++ b/project/erd.pptx
@@ -6970,7 +6970,7 @@
                   </a:solidFill>
                   <a:latin typeface="Arial" charset="0"/>
                 </a:rPr>
-                <a:t>Report</a:t>
+                <a:t>Review</a:t>
               </a:r>
               <a:endParaRPr lang="en-US" dirty="0">
                 <a:solidFill>
@@ -7243,7 +7243,7 @@
                   </a:solidFill>
                   <a:latin typeface="Arial" charset="0"/>
                 </a:rPr>
-                <a:t>reportID</a:t>
+                <a:t>modReviewID</a:t>
               </a:r>
               <a:endParaRPr lang="en-US" dirty="0">
                 <a:solidFill>
@@ -7779,7 +7779,7 @@
                 </a:solidFill>
                 <a:latin typeface="Arial" charset="0"/>
               </a:rPr>
-              <a:t>ReportSubmission</a:t>
+              <a:t>ReviewSubmission</a:t>
             </a:r>
             <a:endParaRPr lang="en-US" sz="1400" dirty="0">
               <a:solidFill>
@@ -7911,73 +7911,12 @@
           <a:effectLst/>
         </p:spPr>
       </p:cxnSp>
-      <p:sp>
-        <p:nvSpPr>
-          <p:cNvPr id="139" name="Oval 114"/>
-          <p:cNvSpPr>
-            <a:spLocks noChangeArrowheads="1"/>
-          </p:cNvSpPr>
-          <p:nvPr/>
-        </p:nvSpPr>
-        <p:spPr bwMode="auto">
-          <a:xfrm>
-            <a:off x="8075000" y="1011289"/>
-            <a:ext cx="2221482" cy="381000"/>
-          </a:xfrm>
-          <a:prstGeom prst="ellipse">
-            <a:avLst/>
-          </a:prstGeom>
-          <a:solidFill>
-            <a:schemeClr val="bg1">
-              <a:lumMod val="85000"/>
-            </a:schemeClr>
-          </a:solidFill>
-          <a:ln w="9525">
-            <a:solidFill>
-              <a:schemeClr val="tx1"/>
-            </a:solidFill>
-            <a:round/>
-            <a:headEnd/>
-            <a:tailEnd/>
-          </a:ln>
-          <a:effectLst/>
-        </p:spPr>
-        <p:txBody>
-          <a:bodyPr wrap="none" anchor="ctr"/>
-          <a:lstStyle/>
-          <a:p>
-            <a:pPr algn="ctr" eaLnBrk="0" fontAlgn="base" hangingPunct="0">
-              <a:spcBef>
-                <a:spcPct val="0"/>
-              </a:spcBef>
-              <a:spcAft>
-                <a:spcPct val="0"/>
-              </a:spcAft>
-            </a:pPr>
-            <a:r>
-              <a:rPr lang="en-US" sz="1600" dirty="0" err="1" smtClean="0">
-                <a:solidFill>
-                  <a:prstClr val="black"/>
-                </a:solidFill>
-                <a:latin typeface="Arial" charset="0"/>
-              </a:rPr>
-              <a:t>datePlayed</a:t>
-            </a:r>
-            <a:endParaRPr lang="en-US" dirty="0">
-              <a:solidFill>
-                <a:prstClr val="black"/>
-              </a:solidFill>
-              <a:latin typeface="Arial" charset="0"/>
-            </a:endParaRPr>
-          </a:p>
-        </p:txBody>
-      </p:sp>
       <p:cxnSp>
         <p:nvCxnSpPr>
           <p:cNvPr id="140" name="AutoShape 115"/>
           <p:cNvCxnSpPr>
             <a:cxnSpLocks noChangeShapeType="1"/>
-            <a:stCxn id="139" idx="2"/>
+            <a:stCxn id="183" idx="2"/>
             <a:endCxn id="46085" idx="3"/>
           </p:cNvCxnSpPr>
           <p:nvPr/>
@@ -7985,7 +7924,7 @@
         <p:spPr bwMode="auto">
           <a:xfrm flipH="1" flipV="1">
             <a:off x="7580188" y="815069"/>
-            <a:ext cx="494812" cy="386720"/>
+            <a:ext cx="943478" cy="402413"/>
           </a:xfrm>
           <a:prstGeom prst="straightConnector1">
             <a:avLst/>
@@ -8866,7 +8805,7 @@
         </p:nvSpPr>
         <p:spPr bwMode="auto">
           <a:xfrm>
-            <a:off x="8438108" y="1506589"/>
+            <a:off x="8523666" y="1026982"/>
             <a:ext cx="1231814" cy="381000"/>
           </a:xfrm>
           <a:prstGeom prst="ellipse">
@@ -8917,36 +8856,6 @@
           </a:p>
         </p:txBody>
       </p:sp>
-      <p:cxnSp>
-        <p:nvCxnSpPr>
-          <p:cNvPr id="187" name="AutoShape 115"/>
-          <p:cNvCxnSpPr>
-            <a:cxnSpLocks noChangeShapeType="1"/>
-            <a:stCxn id="183" idx="2"/>
-            <a:endCxn id="46085" idx="3"/>
-          </p:cNvCxnSpPr>
-          <p:nvPr/>
-        </p:nvCxnSpPr>
-        <p:spPr bwMode="auto">
-          <a:xfrm flipH="1" flipV="1">
-            <a:off x="7580188" y="815069"/>
-            <a:ext cx="857920" cy="882020"/>
-          </a:xfrm>
-          <a:prstGeom prst="straightConnector1">
-            <a:avLst/>
-          </a:prstGeom>
-          <a:noFill/>
-          <a:ln w="9525">
-            <a:solidFill>
-              <a:schemeClr val="tx1"/>
-            </a:solidFill>
-            <a:round/>
-            <a:headEnd/>
-            <a:tailEnd/>
-          </a:ln>
-          <a:effectLst/>
-        </p:spPr>
-      </p:cxnSp>
       <p:cxnSp>
         <p:nvCxnSpPr>
           <p:cNvPr id="195" name="AutoShape 7"/>
@@ -9395,18 +9304,99 @@
           </a:p>
         </p:txBody>
       </p:sp>
-      <p:sp>
-        <p:nvSpPr>
-          <p:cNvPr id="182" name="AutoShape 6"/>
-          <p:cNvSpPr>
+      <p:cxnSp>
+        <p:nvCxnSpPr>
+          <p:cNvPr id="184" name="AutoShape 7"/>
+          <p:cNvCxnSpPr>
+            <a:cxnSpLocks noChangeShapeType="1"/>
+            <a:stCxn id="320" idx="3"/>
+            <a:endCxn id="46085" idx="1"/>
+          </p:cNvCxnSpPr>
+          <p:nvPr/>
+        </p:nvCxnSpPr>
+        <p:spPr bwMode="auto">
+          <a:xfrm flipV="1">
+            <a:off x="3597396" y="815069"/>
+            <a:ext cx="2534992" cy="1191481"/>
+          </a:xfrm>
+          <a:prstGeom prst="straightConnector1">
+            <a:avLst/>
+          </a:prstGeom>
+          <a:noFill/>
+          <a:ln w="9525">
+            <a:solidFill>
+              <a:schemeClr val="tx1"/>
+            </a:solidFill>
+            <a:round/>
+            <a:headEnd/>
+            <a:tailEnd/>
+          </a:ln>
+          <a:effectLst/>
+        </p:spPr>
+      </p:cxnSp>
+      <p:sp>
+        <p:nvSpPr>
+          <p:cNvPr id="186" name="Text Box 149"/>
+          <p:cNvSpPr txBox="1">
             <a:spLocks noChangeArrowheads="1"/>
           </p:cNvSpPr>
           <p:nvPr/>
         </p:nvSpPr>
         <p:spPr bwMode="auto">
           <a:xfrm>
-            <a:off x="3500376" y="1290166"/>
-            <a:ext cx="1948188" cy="838200"/>
+            <a:off x="5617321" y="1027450"/>
+            <a:ext cx="522900" cy="307777"/>
+          </a:xfrm>
+          <a:prstGeom prst="rect">
+            <a:avLst/>
+          </a:prstGeom>
+          <a:noFill/>
+          <a:ln w="9525">
+            <a:noFill/>
+            <a:miter lim="800000"/>
+            <a:headEnd/>
+            <a:tailEnd/>
+          </a:ln>
+          <a:effectLst/>
+        </p:spPr>
+        <p:txBody>
+          <a:bodyPr wrap="none">
+            <a:spAutoFit/>
+          </a:bodyPr>
+          <a:lstStyle/>
+          <a:p>
+            <a:pPr eaLnBrk="0" fontAlgn="base" hangingPunct="0">
+              <a:spcBef>
+                <a:spcPct val="0"/>
+              </a:spcBef>
+              <a:spcAft>
+                <a:spcPct val="0"/>
+              </a:spcAft>
+            </a:pPr>
+            <a:r>
+              <a:rPr lang="en-US" sz="1400" dirty="0">
+                <a:solidFill>
+                  <a:prstClr val="black"/>
+                </a:solidFill>
+                <a:latin typeface="Arial" charset="0"/>
+              </a:rPr>
+              <a:t>{0,*}</a:t>
+            </a:r>
+          </a:p>
+        </p:txBody>
+      </p:sp>
+      <p:sp>
+        <p:nvSpPr>
+          <p:cNvPr id="188" name="AutoShape 6"/>
+          <p:cNvSpPr>
+            <a:spLocks noChangeArrowheads="1"/>
+          </p:cNvSpPr>
+          <p:nvPr/>
+        </p:nvSpPr>
+        <p:spPr bwMode="auto">
+          <a:xfrm>
+            <a:off x="4153917" y="3311994"/>
+            <a:ext cx="1295400" cy="838200"/>
           </a:xfrm>
           <a:prstGeom prst="flowChartDecision">
             <a:avLst/>
@@ -9446,7 +9436,7 @@
                 </a:solidFill>
                 <a:latin typeface="Arial" charset="0"/>
               </a:rPr>
-              <a:t>ReportChapter</a:t>
+              <a:t>ModChapter</a:t>
             </a:r>
             <a:endParaRPr lang="en-US" sz="1400" dirty="0">
               <a:solidFill>
@@ -9459,17 +9449,18 @@
       </p:sp>
       <p:cxnSp>
         <p:nvCxnSpPr>
-          <p:cNvPr id="184" name="AutoShape 7"/>
+          <p:cNvPr id="202" name="AutoShape 13"/>
           <p:cNvCxnSpPr>
             <a:cxnSpLocks noChangeShapeType="1"/>
-            <a:stCxn id="182" idx="3"/>
+            <a:stCxn id="188" idx="1"/>
+            <a:endCxn id="82" idx="3"/>
           </p:cNvCxnSpPr>
           <p:nvPr/>
         </p:nvCxnSpPr>
         <p:spPr bwMode="auto">
-          <a:xfrm flipV="1">
-            <a:off x="5448564" y="941546"/>
-            <a:ext cx="683824" cy="767720"/>
+          <a:xfrm flipH="1" flipV="1">
+            <a:off x="3329868" y="3470762"/>
+            <a:ext cx="824049" cy="260332"/>
           </a:xfrm>
           <a:prstGeom prst="straightConnector1">
             <a:avLst/>
@@ -9488,7 +9479,402 @@
       </p:cxnSp>
       <p:sp>
         <p:nvSpPr>
-          <p:cNvPr id="186" name="Text Box 149"/>
+          <p:cNvPr id="206" name="AutoShape 4"/>
+          <p:cNvSpPr>
+            <a:spLocks noChangeArrowheads="1"/>
+          </p:cNvSpPr>
+          <p:nvPr/>
+        </p:nvSpPr>
+        <p:spPr bwMode="auto">
+          <a:xfrm>
+            <a:off x="5097900" y="2384023"/>
+            <a:ext cx="1447800" cy="609600"/>
+          </a:xfrm>
+          <a:prstGeom prst="flowChartProcess">
+            <a:avLst/>
+          </a:prstGeom>
+          <a:solidFill>
+            <a:schemeClr val="accent3">
+              <a:lumMod val="60000"/>
+              <a:lumOff val="40000"/>
+            </a:schemeClr>
+          </a:solidFill>
+          <a:ln w="9525">
+            <a:solidFill>
+              <a:schemeClr val="tx1"/>
+            </a:solidFill>
+            <a:miter lim="800000"/>
+            <a:headEnd/>
+            <a:tailEnd/>
+          </a:ln>
+          <a:effectLst/>
+        </p:spPr>
+        <p:txBody>
+          <a:bodyPr wrap="none" anchor="ctr"/>
+          <a:lstStyle/>
+          <a:p>
+            <a:pPr algn="ctr" eaLnBrk="0" fontAlgn="base" hangingPunct="0">
+              <a:spcBef>
+                <a:spcPct val="0"/>
+              </a:spcBef>
+              <a:spcAft>
+                <a:spcPct val="0"/>
+              </a:spcAft>
+            </a:pPr>
+            <a:r>
+              <a:rPr lang="en-US" dirty="0" smtClean="0">
+                <a:solidFill>
+                  <a:prstClr val="black"/>
+                </a:solidFill>
+                <a:latin typeface="Arial" charset="0"/>
+              </a:rPr>
+              <a:t>Chapter</a:t>
+            </a:r>
+            <a:endParaRPr lang="en-US" dirty="0">
+              <a:solidFill>
+                <a:prstClr val="black"/>
+              </a:solidFill>
+              <a:latin typeface="Arial" charset="0"/>
+            </a:endParaRPr>
+          </a:p>
+        </p:txBody>
+      </p:sp>
+      <p:cxnSp>
+        <p:nvCxnSpPr>
+          <p:cNvPr id="207" name="AutoShape 7"/>
+          <p:cNvCxnSpPr>
+            <a:cxnSpLocks noChangeShapeType="1"/>
+            <a:stCxn id="206" idx="3"/>
+            <a:endCxn id="330" idx="1"/>
+          </p:cNvCxnSpPr>
+          <p:nvPr/>
+        </p:nvCxnSpPr>
+        <p:spPr bwMode="auto">
+          <a:xfrm flipV="1">
+            <a:off x="6545700" y="2125257"/>
+            <a:ext cx="222519" cy="563566"/>
+          </a:xfrm>
+          <a:prstGeom prst="straightConnector1">
+            <a:avLst/>
+          </a:prstGeom>
+          <a:noFill/>
+          <a:ln w="9525">
+            <a:solidFill>
+              <a:schemeClr val="tx1"/>
+            </a:solidFill>
+            <a:round/>
+            <a:headEnd/>
+            <a:tailEnd/>
+          </a:ln>
+          <a:effectLst/>
+        </p:spPr>
+      </p:cxnSp>
+      <p:cxnSp>
+        <p:nvCxnSpPr>
+          <p:cNvPr id="213" name="AutoShape 13"/>
+          <p:cNvCxnSpPr>
+            <a:cxnSpLocks noChangeShapeType="1"/>
+            <a:stCxn id="188" idx="0"/>
+            <a:endCxn id="206" idx="2"/>
+          </p:cNvCxnSpPr>
+          <p:nvPr/>
+        </p:nvCxnSpPr>
+        <p:spPr bwMode="auto">
+          <a:xfrm flipV="1">
+            <a:off x="4801617" y="2993623"/>
+            <a:ext cx="1020183" cy="318371"/>
+          </a:xfrm>
+          <a:prstGeom prst="straightConnector1">
+            <a:avLst/>
+          </a:prstGeom>
+          <a:noFill/>
+          <a:ln w="9525">
+            <a:solidFill>
+              <a:schemeClr val="tx1"/>
+            </a:solidFill>
+            <a:round/>
+            <a:headEnd/>
+            <a:tailEnd/>
+          </a:ln>
+          <a:effectLst/>
+        </p:spPr>
+      </p:cxnSp>
+      <p:sp>
+        <p:nvSpPr>
+          <p:cNvPr id="232" name="Oval 112"/>
+          <p:cNvSpPr>
+            <a:spLocks noChangeArrowheads="1"/>
+          </p:cNvSpPr>
+          <p:nvPr/>
+        </p:nvSpPr>
+        <p:spPr bwMode="auto">
+          <a:xfrm>
+            <a:off x="3806554" y="2052811"/>
+            <a:ext cx="1143000" cy="381000"/>
+          </a:xfrm>
+          <a:prstGeom prst="ellipse">
+            <a:avLst/>
+          </a:prstGeom>
+          <a:solidFill>
+            <a:schemeClr val="bg1">
+              <a:lumMod val="85000"/>
+            </a:schemeClr>
+          </a:solidFill>
+          <a:ln w="9525">
+            <a:solidFill>
+              <a:schemeClr val="tx1"/>
+            </a:solidFill>
+            <a:round/>
+            <a:headEnd/>
+            <a:tailEnd/>
+          </a:ln>
+          <a:effectLst/>
+        </p:spPr>
+        <p:txBody>
+          <a:bodyPr wrap="none" anchor="ctr"/>
+          <a:lstStyle/>
+          <a:p>
+            <a:pPr algn="ctr" eaLnBrk="0" fontAlgn="base" hangingPunct="0">
+              <a:spcBef>
+                <a:spcPct val="0"/>
+              </a:spcBef>
+              <a:spcAft>
+                <a:spcPct val="0"/>
+              </a:spcAft>
+            </a:pPr>
+            <a:r>
+              <a:rPr lang="en-US" sz="1600" u="sng" dirty="0" err="1" smtClean="0">
+                <a:solidFill>
+                  <a:prstClr val="black"/>
+                </a:solidFill>
+                <a:latin typeface="Arial" charset="0"/>
+              </a:rPr>
+              <a:t>chapterID</a:t>
+            </a:r>
+            <a:endParaRPr lang="en-US" dirty="0">
+              <a:solidFill>
+                <a:prstClr val="black"/>
+              </a:solidFill>
+              <a:latin typeface="Arial" charset="0"/>
+            </a:endParaRPr>
+          </a:p>
+        </p:txBody>
+      </p:sp>
+      <p:cxnSp>
+        <p:nvCxnSpPr>
+          <p:cNvPr id="233" name="AutoShape 13"/>
+          <p:cNvCxnSpPr>
+            <a:cxnSpLocks noChangeShapeType="1"/>
+            <a:stCxn id="232" idx="6"/>
+            <a:endCxn id="206" idx="1"/>
+          </p:cNvCxnSpPr>
+          <p:nvPr/>
+        </p:nvCxnSpPr>
+        <p:spPr bwMode="auto">
+          <a:xfrm>
+            <a:off x="4949554" y="2243311"/>
+            <a:ext cx="148346" cy="445512"/>
+          </a:xfrm>
+          <a:prstGeom prst="straightConnector1">
+            <a:avLst/>
+          </a:prstGeom>
+          <a:noFill/>
+          <a:ln w="9525">
+            <a:solidFill>
+              <a:schemeClr val="tx1"/>
+            </a:solidFill>
+            <a:round/>
+            <a:headEnd/>
+            <a:tailEnd/>
+          </a:ln>
+          <a:effectLst/>
+        </p:spPr>
+      </p:cxnSp>
+      <p:sp>
+        <p:nvSpPr>
+          <p:cNvPr id="235" name="Oval 10"/>
+          <p:cNvSpPr>
+            <a:spLocks noChangeArrowheads="1"/>
+          </p:cNvSpPr>
+          <p:nvPr/>
+        </p:nvSpPr>
+        <p:spPr bwMode="auto">
+          <a:xfrm>
+            <a:off x="3533482" y="2490797"/>
+            <a:ext cx="1341899" cy="381000"/>
+          </a:xfrm>
+          <a:prstGeom prst="ellipse">
+            <a:avLst/>
+          </a:prstGeom>
+          <a:solidFill>
+            <a:schemeClr val="bg1">
+              <a:lumMod val="85000"/>
+            </a:schemeClr>
+          </a:solidFill>
+          <a:ln w="9525">
+            <a:solidFill>
+              <a:schemeClr val="tx1"/>
+            </a:solidFill>
+            <a:round/>
+            <a:headEnd/>
+            <a:tailEnd/>
+          </a:ln>
+          <a:effectLst/>
+        </p:spPr>
+        <p:txBody>
+          <a:bodyPr wrap="none" anchor="ctr"/>
+          <a:lstStyle/>
+          <a:p>
+            <a:pPr algn="ctr" eaLnBrk="0" fontAlgn="base" hangingPunct="0">
+              <a:spcBef>
+                <a:spcPct val="0"/>
+              </a:spcBef>
+              <a:spcAft>
+                <a:spcPct val="0"/>
+              </a:spcAft>
+            </a:pPr>
+            <a:r>
+              <a:rPr lang="en-US" sz="1600" dirty="0" err="1" smtClean="0">
+                <a:solidFill>
+                  <a:prstClr val="black"/>
+                </a:solidFill>
+                <a:latin typeface="Arial" charset="0"/>
+              </a:rPr>
+              <a:t>chapterName</a:t>
+            </a:r>
+            <a:endParaRPr lang="en-US" dirty="0">
+              <a:solidFill>
+                <a:prstClr val="black"/>
+              </a:solidFill>
+              <a:latin typeface="Arial" charset="0"/>
+            </a:endParaRPr>
+          </a:p>
+        </p:txBody>
+      </p:sp>
+      <p:cxnSp>
+        <p:nvCxnSpPr>
+          <p:cNvPr id="236" name="AutoShape 14"/>
+          <p:cNvCxnSpPr>
+            <a:cxnSpLocks noChangeShapeType="1"/>
+            <a:stCxn id="235" idx="6"/>
+            <a:endCxn id="206" idx="1"/>
+          </p:cNvCxnSpPr>
+          <p:nvPr/>
+        </p:nvCxnSpPr>
+        <p:spPr bwMode="auto">
+          <a:xfrm>
+            <a:off x="4875381" y="2681297"/>
+            <a:ext cx="222519" cy="7526"/>
+          </a:xfrm>
+          <a:prstGeom prst="straightConnector1">
+            <a:avLst/>
+          </a:prstGeom>
+          <a:noFill/>
+          <a:ln w="9525">
+            <a:solidFill>
+              <a:schemeClr val="tx1"/>
+            </a:solidFill>
+            <a:round/>
+            <a:headEnd/>
+            <a:tailEnd/>
+          </a:ln>
+          <a:effectLst/>
+        </p:spPr>
+      </p:cxnSp>
+      <p:sp>
+        <p:nvSpPr>
+          <p:cNvPr id="238" name="Oval 10"/>
+          <p:cNvSpPr>
+            <a:spLocks noChangeArrowheads="1"/>
+          </p:cNvSpPr>
+          <p:nvPr/>
+        </p:nvSpPr>
+        <p:spPr bwMode="auto">
+          <a:xfrm>
+            <a:off x="3500376" y="2937362"/>
+            <a:ext cx="1341899" cy="381000"/>
+          </a:xfrm>
+          <a:prstGeom prst="ellipse">
+            <a:avLst/>
+          </a:prstGeom>
+          <a:solidFill>
+            <a:schemeClr val="bg1">
+              <a:lumMod val="85000"/>
+            </a:schemeClr>
+          </a:solidFill>
+          <a:ln w="9525">
+            <a:solidFill>
+              <a:schemeClr val="tx1"/>
+            </a:solidFill>
+            <a:round/>
+            <a:headEnd/>
+            <a:tailEnd/>
+          </a:ln>
+          <a:effectLst/>
+        </p:spPr>
+        <p:txBody>
+          <a:bodyPr wrap="none" anchor="ctr"/>
+          <a:lstStyle/>
+          <a:p>
+            <a:pPr algn="ctr" eaLnBrk="0" fontAlgn="base" hangingPunct="0">
+              <a:spcBef>
+                <a:spcPct val="0"/>
+              </a:spcBef>
+              <a:spcAft>
+                <a:spcPct val="0"/>
+              </a:spcAft>
+            </a:pPr>
+            <a:r>
+              <a:rPr lang="en-US" sz="1600" dirty="0" err="1" smtClean="0">
+                <a:solidFill>
+                  <a:prstClr val="black"/>
+                </a:solidFill>
+                <a:latin typeface="Arial" charset="0"/>
+              </a:rPr>
+              <a:t>chapterNumber</a:t>
+            </a:r>
+            <a:endParaRPr lang="en-US" dirty="0">
+              <a:solidFill>
+                <a:prstClr val="black"/>
+              </a:solidFill>
+              <a:latin typeface="Arial" charset="0"/>
+            </a:endParaRPr>
+          </a:p>
+        </p:txBody>
+      </p:sp>
+      <p:cxnSp>
+        <p:nvCxnSpPr>
+          <p:cNvPr id="239" name="AutoShape 14"/>
+          <p:cNvCxnSpPr>
+            <a:cxnSpLocks noChangeShapeType="1"/>
+            <a:stCxn id="238" idx="6"/>
+            <a:endCxn id="206" idx="1"/>
+          </p:cNvCxnSpPr>
+          <p:nvPr/>
+        </p:nvCxnSpPr>
+        <p:spPr bwMode="auto">
+          <a:xfrm flipV="1">
+            <a:off x="4842275" y="2688823"/>
+            <a:ext cx="255625" cy="439039"/>
+          </a:xfrm>
+          <a:prstGeom prst="straightConnector1">
+            <a:avLst/>
+          </a:prstGeom>
+          <a:noFill/>
+          <a:ln w="9525">
+            <a:solidFill>
+              <a:schemeClr val="tx1"/>
+            </a:solidFill>
+            <a:round/>
+            <a:headEnd/>
+            <a:tailEnd/>
+          </a:ln>
+          <a:effectLst/>
+        </p:spPr>
+      </p:cxnSp>
+      <p:sp>
+        <p:nvSpPr>
+          <p:cNvPr id="245" name="Text Box 149"/>
           <p:cNvSpPr txBox="1">
             <a:spLocks noChangeArrowheads="1"/>
           </p:cNvSpPr>
@@ -9496,7 +9882,7 @@
         </p:nvSpPr>
         <p:spPr bwMode="auto">
           <a:xfrm>
-            <a:off x="5538353" y="926392"/>
+            <a:off x="5331565" y="3219510"/>
             <a:ext cx="522900" cy="307777"/>
           </a:xfrm>
           <a:prstGeom prst="rect">
@@ -9539,16 +9925,73 @@
       </p:sp>
       <p:sp>
         <p:nvSpPr>
-          <p:cNvPr id="188" name="AutoShape 6"/>
-          <p:cNvSpPr>
+          <p:cNvPr id="246" name="Text Box 145"/>
+          <p:cNvSpPr txBox="1">
             <a:spLocks noChangeArrowheads="1"/>
           </p:cNvSpPr>
           <p:nvPr/>
         </p:nvSpPr>
         <p:spPr bwMode="auto">
           <a:xfrm>
-            <a:off x="1814681" y="2172382"/>
-            <a:ext cx="1295400" cy="838200"/>
+            <a:off x="3411061" y="3533729"/>
+            <a:ext cx="284052" cy="307777"/>
+          </a:xfrm>
+          <a:prstGeom prst="rect">
+            <a:avLst/>
+          </a:prstGeom>
+          <a:noFill/>
+          <a:ln w="9525">
+            <a:noFill/>
+            <a:miter lim="800000"/>
+            <a:headEnd/>
+            <a:tailEnd/>
+          </a:ln>
+          <a:effectLst/>
+        </p:spPr>
+        <p:txBody>
+          <a:bodyPr wrap="none">
+            <a:spAutoFit/>
+          </a:bodyPr>
+          <a:lstStyle/>
+          <a:p>
+            <a:pPr eaLnBrk="0" fontAlgn="base" hangingPunct="0">
+              <a:spcBef>
+                <a:spcPct val="0"/>
+              </a:spcBef>
+              <a:spcAft>
+                <a:spcPct val="0"/>
+              </a:spcAft>
+            </a:pPr>
+            <a:r>
+              <a:rPr lang="en-US" sz="1400" dirty="0" smtClean="0">
+                <a:solidFill>
+                  <a:prstClr val="black"/>
+                </a:solidFill>
+                <a:latin typeface="Arial" charset="0"/>
+              </a:rPr>
+              <a:t>1</a:t>
+            </a:r>
+            <a:endParaRPr lang="en-US" sz="1400" dirty="0">
+              <a:solidFill>
+                <a:prstClr val="black"/>
+              </a:solidFill>
+              <a:latin typeface="Arial" charset="0"/>
+            </a:endParaRPr>
+          </a:p>
+        </p:txBody>
+      </p:sp>
+      <p:sp>
+        <p:nvSpPr>
+          <p:cNvPr id="255" name="AutoShape 6"/>
+          <p:cNvSpPr>
+            <a:spLocks noChangeArrowheads="1"/>
+          </p:cNvSpPr>
+          <p:nvPr/>
+        </p:nvSpPr>
+        <p:spPr bwMode="auto">
+          <a:xfrm>
+            <a:off x="5821800" y="4659958"/>
+            <a:ext cx="1664136" cy="838200"/>
           </a:xfrm>
           <a:prstGeom prst="flowChartDecision">
             <a:avLst/>
@@ -9588,7 +10031,7 @@
                 </a:solidFill>
                 <a:latin typeface="Arial" charset="0"/>
               </a:rPr>
-              <a:t>ModChapter</a:t>
+              <a:t>IntroducedElement</a:t>
             </a:r>
             <a:endParaRPr lang="en-US" sz="1400" dirty="0">
               <a:solidFill>
@@ -9599,698 +10042,17 @@
           </a:p>
         </p:txBody>
       </p:sp>
-      <p:cxnSp>
-        <p:nvCxnSpPr>
-          <p:cNvPr id="202" name="AutoShape 13"/>
-          <p:cNvCxnSpPr>
-            <a:cxnSpLocks noChangeShapeType="1"/>
-            <a:stCxn id="188" idx="2"/>
-            <a:endCxn id="82" idx="0"/>
-          </p:cNvCxnSpPr>
+      <p:sp>
+        <p:nvSpPr>
+          <p:cNvPr id="256" name="AutoShape 6"/>
+          <p:cNvSpPr>
+            <a:spLocks noChangeArrowheads="1"/>
+          </p:cNvSpPr>
           <p:nvPr/>
-        </p:nvCxnSpPr>
+        </p:nvSpPr>
         <p:spPr bwMode="auto">
           <a:xfrm>
-            <a:off x="2462381" y="3010582"/>
-            <a:ext cx="143587" cy="155380"/>
-          </a:xfrm>
-          <a:prstGeom prst="straightConnector1">
-            <a:avLst/>
-          </a:prstGeom>
-          <a:noFill/>
-          <a:ln w="9525">
-            <a:solidFill>
-              <a:schemeClr val="tx1"/>
-            </a:solidFill>
-            <a:round/>
-            <a:headEnd/>
-            <a:tailEnd/>
-          </a:ln>
-          <a:effectLst/>
-        </p:spPr>
-      </p:cxnSp>
-      <p:sp>
-        <p:nvSpPr>
-          <p:cNvPr id="206" name="AutoShape 4"/>
-          <p:cNvSpPr>
-            <a:spLocks noChangeArrowheads="1"/>
-          </p:cNvSpPr>
-          <p:nvPr/>
-        </p:nvSpPr>
-        <p:spPr bwMode="auto">
-          <a:xfrm>
-            <a:off x="1738481" y="1360108"/>
-            <a:ext cx="1447800" cy="609600"/>
-          </a:xfrm>
-          <a:prstGeom prst="flowChartProcess">
-            <a:avLst/>
-          </a:prstGeom>
-          <a:solidFill>
-            <a:schemeClr val="accent3">
-              <a:lumMod val="60000"/>
-              <a:lumOff val="40000"/>
-            </a:schemeClr>
-          </a:solidFill>
-          <a:ln w="9525">
-            <a:solidFill>
-              <a:schemeClr val="tx1"/>
-            </a:solidFill>
-            <a:miter lim="800000"/>
-            <a:headEnd/>
-            <a:tailEnd/>
-          </a:ln>
-          <a:effectLst/>
-        </p:spPr>
-        <p:txBody>
-          <a:bodyPr wrap="none" anchor="ctr"/>
-          <a:lstStyle/>
-          <a:p>
-            <a:pPr algn="ctr" eaLnBrk="0" fontAlgn="base" hangingPunct="0">
-              <a:spcBef>
-                <a:spcPct val="0"/>
-              </a:spcBef>
-              <a:spcAft>
-                <a:spcPct val="0"/>
-              </a:spcAft>
-            </a:pPr>
-            <a:r>
-              <a:rPr lang="en-US" dirty="0" smtClean="0">
-                <a:solidFill>
-                  <a:prstClr val="black"/>
-                </a:solidFill>
-                <a:latin typeface="Arial" charset="0"/>
-              </a:rPr>
-              <a:t>Chapter</a:t>
-            </a:r>
-            <a:endParaRPr lang="en-US" dirty="0">
-              <a:solidFill>
-                <a:prstClr val="black"/>
-              </a:solidFill>
-              <a:latin typeface="Arial" charset="0"/>
-            </a:endParaRPr>
-          </a:p>
-        </p:txBody>
-      </p:sp>
-      <p:cxnSp>
-        <p:nvCxnSpPr>
-          <p:cNvPr id="207" name="AutoShape 7"/>
-          <p:cNvCxnSpPr>
-            <a:cxnSpLocks noChangeShapeType="1"/>
-            <a:stCxn id="206" idx="3"/>
-            <a:endCxn id="182" idx="1"/>
-          </p:cNvCxnSpPr>
-          <p:nvPr/>
-        </p:nvCxnSpPr>
-        <p:spPr bwMode="auto">
-          <a:xfrm>
-            <a:off x="3186281" y="1664908"/>
-            <a:ext cx="314095" cy="44358"/>
-          </a:xfrm>
-          <a:prstGeom prst="straightConnector1">
-            <a:avLst/>
-          </a:prstGeom>
-          <a:noFill/>
-          <a:ln w="9525">
-            <a:solidFill>
-              <a:schemeClr val="tx1"/>
-            </a:solidFill>
-            <a:round/>
-            <a:headEnd/>
-            <a:tailEnd/>
-          </a:ln>
-          <a:effectLst/>
-        </p:spPr>
-      </p:cxnSp>
-      <p:cxnSp>
-        <p:nvCxnSpPr>
-          <p:cNvPr id="213" name="AutoShape 13"/>
-          <p:cNvCxnSpPr>
-            <a:cxnSpLocks noChangeShapeType="1"/>
-            <a:stCxn id="188" idx="0"/>
-            <a:endCxn id="206" idx="2"/>
-          </p:cNvCxnSpPr>
-          <p:nvPr/>
-        </p:nvCxnSpPr>
-        <p:spPr bwMode="auto">
-          <a:xfrm flipV="1">
-            <a:off x="2462381" y="1969708"/>
-            <a:ext cx="0" cy="202674"/>
-          </a:xfrm>
-          <a:prstGeom prst="straightConnector1">
-            <a:avLst/>
-          </a:prstGeom>
-          <a:noFill/>
-          <a:ln w="9525">
-            <a:solidFill>
-              <a:schemeClr val="tx1"/>
-            </a:solidFill>
-            <a:round/>
-            <a:headEnd/>
-            <a:tailEnd/>
-          </a:ln>
-          <a:effectLst/>
-        </p:spPr>
-      </p:cxnSp>
-      <p:sp>
-        <p:nvSpPr>
-          <p:cNvPr id="232" name="Oval 112"/>
-          <p:cNvSpPr>
-            <a:spLocks noChangeArrowheads="1"/>
-          </p:cNvSpPr>
-          <p:nvPr/>
-        </p:nvSpPr>
-        <p:spPr bwMode="auto">
-          <a:xfrm>
-            <a:off x="20890" y="1283433"/>
-            <a:ext cx="1143000" cy="381000"/>
-          </a:xfrm>
-          <a:prstGeom prst="ellipse">
-            <a:avLst/>
-          </a:prstGeom>
-          <a:solidFill>
-            <a:schemeClr val="bg1">
-              <a:lumMod val="85000"/>
-            </a:schemeClr>
-          </a:solidFill>
-          <a:ln w="9525">
-            <a:solidFill>
-              <a:schemeClr val="tx1"/>
-            </a:solidFill>
-            <a:round/>
-            <a:headEnd/>
-            <a:tailEnd/>
-          </a:ln>
-          <a:effectLst/>
-        </p:spPr>
-        <p:txBody>
-          <a:bodyPr wrap="none" anchor="ctr"/>
-          <a:lstStyle/>
-          <a:p>
-            <a:pPr algn="ctr" eaLnBrk="0" fontAlgn="base" hangingPunct="0">
-              <a:spcBef>
-                <a:spcPct val="0"/>
-              </a:spcBef>
-              <a:spcAft>
-                <a:spcPct val="0"/>
-              </a:spcAft>
-            </a:pPr>
-            <a:r>
-              <a:rPr lang="en-US" sz="1600" u="sng" dirty="0" err="1" smtClean="0">
-                <a:solidFill>
-                  <a:prstClr val="black"/>
-                </a:solidFill>
-                <a:latin typeface="Arial" charset="0"/>
-              </a:rPr>
-              <a:t>chapterID</a:t>
-            </a:r>
-            <a:endParaRPr lang="en-US" dirty="0">
-              <a:solidFill>
-                <a:prstClr val="black"/>
-              </a:solidFill>
-              <a:latin typeface="Arial" charset="0"/>
-            </a:endParaRPr>
-          </a:p>
-        </p:txBody>
-      </p:sp>
-      <p:cxnSp>
-        <p:nvCxnSpPr>
-          <p:cNvPr id="233" name="AutoShape 13"/>
-          <p:cNvCxnSpPr>
-            <a:cxnSpLocks noChangeShapeType="1"/>
-            <a:stCxn id="232" idx="6"/>
-            <a:endCxn id="206" idx="1"/>
-          </p:cNvCxnSpPr>
-          <p:nvPr/>
-        </p:nvCxnSpPr>
-        <p:spPr bwMode="auto">
-          <a:xfrm>
-            <a:off x="1163890" y="1473933"/>
-            <a:ext cx="574591" cy="190975"/>
-          </a:xfrm>
-          <a:prstGeom prst="straightConnector1">
-            <a:avLst/>
-          </a:prstGeom>
-          <a:noFill/>
-          <a:ln w="9525">
-            <a:solidFill>
-              <a:schemeClr val="tx1"/>
-            </a:solidFill>
-            <a:round/>
-            <a:headEnd/>
-            <a:tailEnd/>
-          </a:ln>
-          <a:effectLst/>
-        </p:spPr>
-      </p:cxnSp>
-      <p:sp>
-        <p:nvSpPr>
-          <p:cNvPr id="235" name="Oval 10"/>
-          <p:cNvSpPr>
-            <a:spLocks noChangeArrowheads="1"/>
-          </p:cNvSpPr>
-          <p:nvPr/>
-        </p:nvSpPr>
-        <p:spPr bwMode="auto">
-          <a:xfrm>
-            <a:off x="-23345" y="1779208"/>
-            <a:ext cx="1341899" cy="381000"/>
-          </a:xfrm>
-          <a:prstGeom prst="ellipse">
-            <a:avLst/>
-          </a:prstGeom>
-          <a:solidFill>
-            <a:schemeClr val="bg1">
-              <a:lumMod val="85000"/>
-            </a:schemeClr>
-          </a:solidFill>
-          <a:ln w="9525">
-            <a:solidFill>
-              <a:schemeClr val="tx1"/>
-            </a:solidFill>
-            <a:round/>
-            <a:headEnd/>
-            <a:tailEnd/>
-          </a:ln>
-          <a:effectLst/>
-        </p:spPr>
-        <p:txBody>
-          <a:bodyPr wrap="none" anchor="ctr"/>
-          <a:lstStyle/>
-          <a:p>
-            <a:pPr algn="ctr" eaLnBrk="0" fontAlgn="base" hangingPunct="0">
-              <a:spcBef>
-                <a:spcPct val="0"/>
-              </a:spcBef>
-              <a:spcAft>
-                <a:spcPct val="0"/>
-              </a:spcAft>
-            </a:pPr>
-            <a:r>
-              <a:rPr lang="en-US" sz="1600" dirty="0" err="1" smtClean="0">
-                <a:solidFill>
-                  <a:prstClr val="black"/>
-                </a:solidFill>
-                <a:latin typeface="Arial" charset="0"/>
-              </a:rPr>
-              <a:t>chapterName</a:t>
-            </a:r>
-            <a:endParaRPr lang="en-US" dirty="0">
-              <a:solidFill>
-                <a:prstClr val="black"/>
-              </a:solidFill>
-              <a:latin typeface="Arial" charset="0"/>
-            </a:endParaRPr>
-          </a:p>
-        </p:txBody>
-      </p:sp>
-      <p:cxnSp>
-        <p:nvCxnSpPr>
-          <p:cNvPr id="236" name="AutoShape 14"/>
-          <p:cNvCxnSpPr>
-            <a:cxnSpLocks noChangeShapeType="1"/>
-            <a:stCxn id="235" idx="6"/>
-            <a:endCxn id="206" idx="1"/>
-          </p:cNvCxnSpPr>
-          <p:nvPr/>
-        </p:nvCxnSpPr>
-        <p:spPr bwMode="auto">
-          <a:xfrm flipV="1">
-            <a:off x="1318554" y="1664908"/>
-            <a:ext cx="419927" cy="304800"/>
-          </a:xfrm>
-          <a:prstGeom prst="straightConnector1">
-            <a:avLst/>
-          </a:prstGeom>
-          <a:noFill/>
-          <a:ln w="9525">
-            <a:solidFill>
-              <a:schemeClr val="tx1"/>
-            </a:solidFill>
-            <a:round/>
-            <a:headEnd/>
-            <a:tailEnd/>
-          </a:ln>
-          <a:effectLst/>
-        </p:spPr>
-      </p:cxnSp>
-      <p:sp>
-        <p:nvSpPr>
-          <p:cNvPr id="238" name="Oval 10"/>
-          <p:cNvSpPr>
-            <a:spLocks noChangeArrowheads="1"/>
-          </p:cNvSpPr>
-          <p:nvPr/>
-        </p:nvSpPr>
-        <p:spPr bwMode="auto">
-          <a:xfrm>
-            <a:off x="8186" y="2241485"/>
-            <a:ext cx="1341899" cy="381000"/>
-          </a:xfrm>
-          <a:prstGeom prst="ellipse">
-            <a:avLst/>
-          </a:prstGeom>
-          <a:solidFill>
-            <a:schemeClr val="bg1">
-              <a:lumMod val="85000"/>
-            </a:schemeClr>
-          </a:solidFill>
-          <a:ln w="9525">
-            <a:solidFill>
-              <a:schemeClr val="tx1"/>
-            </a:solidFill>
-            <a:round/>
-            <a:headEnd/>
-            <a:tailEnd/>
-          </a:ln>
-          <a:effectLst/>
-        </p:spPr>
-        <p:txBody>
-          <a:bodyPr wrap="none" anchor="ctr"/>
-          <a:lstStyle/>
-          <a:p>
-            <a:pPr algn="ctr" eaLnBrk="0" fontAlgn="base" hangingPunct="0">
-              <a:spcBef>
-                <a:spcPct val="0"/>
-              </a:spcBef>
-              <a:spcAft>
-                <a:spcPct val="0"/>
-              </a:spcAft>
-            </a:pPr>
-            <a:r>
-              <a:rPr lang="en-US" sz="1600" dirty="0" err="1" smtClean="0">
-                <a:solidFill>
-                  <a:prstClr val="black"/>
-                </a:solidFill>
-                <a:latin typeface="Arial" charset="0"/>
-              </a:rPr>
-              <a:t>chapterNumber</a:t>
-            </a:r>
-            <a:endParaRPr lang="en-US" dirty="0">
-              <a:solidFill>
-                <a:prstClr val="black"/>
-              </a:solidFill>
-              <a:latin typeface="Arial" charset="0"/>
-            </a:endParaRPr>
-          </a:p>
-        </p:txBody>
-      </p:sp>
-      <p:cxnSp>
-        <p:nvCxnSpPr>
-          <p:cNvPr id="239" name="AutoShape 14"/>
-          <p:cNvCxnSpPr>
-            <a:cxnSpLocks noChangeShapeType="1"/>
-            <a:stCxn id="238" idx="6"/>
-            <a:endCxn id="206" idx="1"/>
-          </p:cNvCxnSpPr>
-          <p:nvPr/>
-        </p:nvCxnSpPr>
-        <p:spPr bwMode="auto">
-          <a:xfrm flipV="1">
-            <a:off x="1350085" y="1664908"/>
-            <a:ext cx="388396" cy="767077"/>
-          </a:xfrm>
-          <a:prstGeom prst="straightConnector1">
-            <a:avLst/>
-          </a:prstGeom>
-          <a:noFill/>
-          <a:ln w="9525">
-            <a:solidFill>
-              <a:schemeClr val="tx1"/>
-            </a:solidFill>
-            <a:round/>
-            <a:headEnd/>
-            <a:tailEnd/>
-          </a:ln>
-          <a:effectLst/>
-        </p:spPr>
-      </p:cxnSp>
-      <p:sp>
-        <p:nvSpPr>
-          <p:cNvPr id="244" name="Text Box 145"/>
-          <p:cNvSpPr txBox="1">
-            <a:spLocks noChangeArrowheads="1"/>
-          </p:cNvSpPr>
-          <p:nvPr/>
-        </p:nvSpPr>
-        <p:spPr bwMode="auto">
-          <a:xfrm>
-            <a:off x="3142844" y="1342315"/>
-            <a:ext cx="284052" cy="307777"/>
-          </a:xfrm>
-          <a:prstGeom prst="rect">
-            <a:avLst/>
-          </a:prstGeom>
-          <a:noFill/>
-          <a:ln w="9525">
-            <a:noFill/>
-            <a:miter lim="800000"/>
-            <a:headEnd/>
-            <a:tailEnd/>
-          </a:ln>
-          <a:effectLst/>
-        </p:spPr>
-        <p:txBody>
-          <a:bodyPr wrap="none">
-            <a:spAutoFit/>
-          </a:bodyPr>
-          <a:lstStyle/>
-          <a:p>
-            <a:pPr eaLnBrk="0" fontAlgn="base" hangingPunct="0">
-              <a:spcBef>
-                <a:spcPct val="0"/>
-              </a:spcBef>
-              <a:spcAft>
-                <a:spcPct val="0"/>
-              </a:spcAft>
-            </a:pPr>
-            <a:r>
-              <a:rPr lang="en-US" sz="1400" dirty="0" smtClean="0">
-                <a:solidFill>
-                  <a:prstClr val="black"/>
-                </a:solidFill>
-                <a:latin typeface="Arial" charset="0"/>
-              </a:rPr>
-              <a:t>1</a:t>
-            </a:r>
-            <a:endParaRPr lang="en-US" sz="1400" dirty="0">
-              <a:solidFill>
-                <a:prstClr val="black"/>
-              </a:solidFill>
-              <a:latin typeface="Arial" charset="0"/>
-            </a:endParaRPr>
-          </a:p>
-        </p:txBody>
-      </p:sp>
-      <p:sp>
-        <p:nvSpPr>
-          <p:cNvPr id="245" name="Text Box 149"/>
-          <p:cNvSpPr txBox="1">
-            <a:spLocks noChangeArrowheads="1"/>
-          </p:cNvSpPr>
-          <p:nvPr/>
-        </p:nvSpPr>
-        <p:spPr bwMode="auto">
-          <a:xfrm>
-            <a:off x="2522239" y="1945549"/>
-            <a:ext cx="522900" cy="307777"/>
-          </a:xfrm>
-          <a:prstGeom prst="rect">
-            <a:avLst/>
-          </a:prstGeom>
-          <a:noFill/>
-          <a:ln w="9525">
-            <a:noFill/>
-            <a:miter lim="800000"/>
-            <a:headEnd/>
-            <a:tailEnd/>
-          </a:ln>
-          <a:effectLst/>
-        </p:spPr>
-        <p:txBody>
-          <a:bodyPr wrap="none">
-            <a:spAutoFit/>
-          </a:bodyPr>
-          <a:lstStyle/>
-          <a:p>
-            <a:pPr eaLnBrk="0" fontAlgn="base" hangingPunct="0">
-              <a:spcBef>
-                <a:spcPct val="0"/>
-              </a:spcBef>
-              <a:spcAft>
-                <a:spcPct val="0"/>
-              </a:spcAft>
-            </a:pPr>
-            <a:r>
-              <a:rPr lang="en-US" sz="1400" dirty="0">
-                <a:solidFill>
-                  <a:prstClr val="black"/>
-                </a:solidFill>
-                <a:latin typeface="Arial" charset="0"/>
-              </a:rPr>
-              <a:t>{0,*}</a:t>
-            </a:r>
-          </a:p>
-        </p:txBody>
-      </p:sp>
-      <p:sp>
-        <p:nvSpPr>
-          <p:cNvPr id="246" name="Text Box 145"/>
-          <p:cNvSpPr txBox="1">
-            <a:spLocks noChangeArrowheads="1"/>
-          </p:cNvSpPr>
-          <p:nvPr/>
-        </p:nvSpPr>
-        <p:spPr bwMode="auto">
-          <a:xfrm>
-            <a:off x="2641663" y="2856693"/>
-            <a:ext cx="284052" cy="307777"/>
-          </a:xfrm>
-          <a:prstGeom prst="rect">
-            <a:avLst/>
-          </a:prstGeom>
-          <a:noFill/>
-          <a:ln w="9525">
-            <a:noFill/>
-            <a:miter lim="800000"/>
-            <a:headEnd/>
-            <a:tailEnd/>
-          </a:ln>
-          <a:effectLst/>
-        </p:spPr>
-        <p:txBody>
-          <a:bodyPr wrap="none">
-            <a:spAutoFit/>
-          </a:bodyPr>
-          <a:lstStyle/>
-          <a:p>
-            <a:pPr eaLnBrk="0" fontAlgn="base" hangingPunct="0">
-              <a:spcBef>
-                <a:spcPct val="0"/>
-              </a:spcBef>
-              <a:spcAft>
-                <a:spcPct val="0"/>
-              </a:spcAft>
-            </a:pPr>
-            <a:r>
-              <a:rPr lang="en-US" sz="1400" dirty="0" smtClean="0">
-                <a:solidFill>
-                  <a:prstClr val="black"/>
-                </a:solidFill>
-                <a:latin typeface="Arial" charset="0"/>
-              </a:rPr>
-              <a:t>1</a:t>
-            </a:r>
-            <a:endParaRPr lang="en-US" sz="1400" dirty="0">
-              <a:solidFill>
-                <a:prstClr val="black"/>
-              </a:solidFill>
-              <a:latin typeface="Arial" charset="0"/>
-            </a:endParaRPr>
-          </a:p>
-        </p:txBody>
-      </p:sp>
-      <p:sp>
-        <p:nvSpPr>
-          <p:cNvPr id="247" name="Oval 114"/>
-          <p:cNvSpPr>
-            <a:spLocks noChangeArrowheads="1"/>
-          </p:cNvSpPr>
-          <p:nvPr/>
-        </p:nvSpPr>
-        <p:spPr bwMode="auto">
-          <a:xfrm>
-            <a:off x="8438108" y="1927645"/>
-            <a:ext cx="1231814" cy="381000"/>
-          </a:xfrm>
-          <a:prstGeom prst="ellipse">
-            <a:avLst/>
-          </a:prstGeom>
-          <a:solidFill>
-            <a:schemeClr val="bg1">
-              <a:lumMod val="85000"/>
-            </a:schemeClr>
-          </a:solidFill>
-          <a:ln w="9525">
-            <a:solidFill>
-              <a:schemeClr val="tx1"/>
-            </a:solidFill>
-            <a:round/>
-            <a:headEnd/>
-            <a:tailEnd/>
-          </a:ln>
-          <a:effectLst/>
-        </p:spPr>
-        <p:txBody>
-          <a:bodyPr wrap="none" anchor="ctr"/>
-          <a:lstStyle/>
-          <a:p>
-            <a:pPr algn="ctr" eaLnBrk="0" fontAlgn="base" hangingPunct="0">
-              <a:spcBef>
-                <a:spcPct val="0"/>
-              </a:spcBef>
-              <a:spcAft>
-                <a:spcPct val="0"/>
-              </a:spcAft>
-            </a:pPr>
-            <a:r>
-              <a:rPr lang="en-US" sz="1600" dirty="0" err="1" smtClean="0">
-                <a:solidFill>
-                  <a:prstClr val="black"/>
-                </a:solidFill>
-                <a:latin typeface="Arial" charset="0"/>
-              </a:rPr>
-              <a:t>timePlayed</a:t>
-            </a:r>
-            <a:endParaRPr lang="en-US" dirty="0">
-              <a:solidFill>
-                <a:prstClr val="black"/>
-              </a:solidFill>
-              <a:latin typeface="Arial" charset="0"/>
-            </a:endParaRPr>
-          </a:p>
-        </p:txBody>
-      </p:sp>
-      <p:cxnSp>
-        <p:nvCxnSpPr>
-          <p:cNvPr id="248" name="AutoShape 115"/>
-          <p:cNvCxnSpPr>
-            <a:cxnSpLocks noChangeShapeType="1"/>
-            <a:stCxn id="247" idx="2"/>
-            <a:endCxn id="46085" idx="3"/>
-          </p:cNvCxnSpPr>
-          <p:nvPr/>
-        </p:nvCxnSpPr>
-        <p:spPr bwMode="auto">
-          <a:xfrm flipH="1" flipV="1">
-            <a:off x="7580188" y="815069"/>
-            <a:ext cx="857920" cy="1303076"/>
-          </a:xfrm>
-          <a:prstGeom prst="straightConnector1">
-            <a:avLst/>
-          </a:prstGeom>
-          <a:noFill/>
-          <a:ln w="9525">
-            <a:solidFill>
-              <a:schemeClr val="tx1"/>
-            </a:solidFill>
-            <a:round/>
-            <a:headEnd/>
-            <a:tailEnd/>
-          </a:ln>
-          <a:effectLst/>
-        </p:spPr>
-      </p:cxnSp>
-      <p:sp>
-        <p:nvSpPr>
-          <p:cNvPr id="255" name="AutoShape 6"/>
-          <p:cNvSpPr>
-            <a:spLocks noChangeArrowheads="1"/>
-          </p:cNvSpPr>
-          <p:nvPr/>
-        </p:nvSpPr>
-        <p:spPr bwMode="auto">
-          <a:xfrm>
-            <a:off x="5559974" y="3478101"/>
+            <a:off x="8261604" y="4675721"/>
             <a:ext cx="1664136" cy="838200"/>
           </a:xfrm>
           <a:prstGeom prst="flowChartDecision">
@@ -10331,7 +10093,7 @@
                 </a:solidFill>
                 <a:latin typeface="Arial" charset="0"/>
               </a:rPr>
-              <a:t>IntroducedElement</a:t>
+              <a:t>TestedElement</a:t>
             </a:r>
             <a:endParaRPr lang="en-US" sz="1400" dirty="0">
               <a:solidFill>
@@ -10342,18 +10104,519 @@
           </a:p>
         </p:txBody>
       </p:sp>
-      <p:sp>
-        <p:nvSpPr>
-          <p:cNvPr id="256" name="AutoShape 6"/>
-          <p:cNvSpPr>
-            <a:spLocks noChangeArrowheads="1"/>
-          </p:cNvSpPr>
+      <p:cxnSp>
+        <p:nvCxnSpPr>
+          <p:cNvPr id="257" name="AutoShape 13"/>
+          <p:cNvCxnSpPr>
+            <a:cxnSpLocks noChangeShapeType="1"/>
+            <a:stCxn id="255" idx="2"/>
+            <a:endCxn id="130" idx="0"/>
+          </p:cNvCxnSpPr>
           <p:nvPr/>
-        </p:nvSpPr>
+        </p:nvCxnSpPr>
         <p:spPr bwMode="auto">
           <a:xfrm>
-            <a:off x="7999778" y="3493864"/>
-            <a:ext cx="1664136" cy="838200"/>
+            <a:off x="6653868" y="5498158"/>
+            <a:ext cx="1492547" cy="642539"/>
+          </a:xfrm>
+          <a:prstGeom prst="straightConnector1">
+            <a:avLst/>
+          </a:prstGeom>
+          <a:noFill/>
+          <a:ln w="9525">
+            <a:solidFill>
+              <a:schemeClr val="tx1"/>
+            </a:solidFill>
+            <a:round/>
+            <a:headEnd/>
+            <a:tailEnd/>
+          </a:ln>
+          <a:effectLst/>
+        </p:spPr>
+      </p:cxnSp>
+      <p:cxnSp>
+        <p:nvCxnSpPr>
+          <p:cNvPr id="260" name="AutoShape 13"/>
+          <p:cNvCxnSpPr>
+            <a:cxnSpLocks noChangeShapeType="1"/>
+            <a:stCxn id="256" idx="2"/>
+            <a:endCxn id="130" idx="0"/>
+          </p:cNvCxnSpPr>
+          <p:nvPr/>
+        </p:nvCxnSpPr>
+        <p:spPr bwMode="auto">
+          <a:xfrm flipH="1">
+            <a:off x="8146415" y="5513921"/>
+            <a:ext cx="947257" cy="626776"/>
+          </a:xfrm>
+          <a:prstGeom prst="straightConnector1">
+            <a:avLst/>
+          </a:prstGeom>
+          <a:noFill/>
+          <a:ln w="9525">
+            <a:solidFill>
+              <a:schemeClr val="tx1"/>
+            </a:solidFill>
+            <a:round/>
+            <a:headEnd/>
+            <a:tailEnd/>
+          </a:ln>
+          <a:effectLst/>
+        </p:spPr>
+      </p:cxnSp>
+      <p:cxnSp>
+        <p:nvCxnSpPr>
+          <p:cNvPr id="263" name="AutoShape 13"/>
+          <p:cNvCxnSpPr>
+            <a:cxnSpLocks noChangeShapeType="1"/>
+            <a:stCxn id="330" idx="2"/>
+            <a:endCxn id="255" idx="0"/>
+          </p:cNvCxnSpPr>
+          <p:nvPr/>
+        </p:nvCxnSpPr>
+        <p:spPr bwMode="auto">
+          <a:xfrm flipH="1">
+            <a:off x="6653868" y="2544357"/>
+            <a:ext cx="978405" cy="2115601"/>
+          </a:xfrm>
+          <a:prstGeom prst="straightConnector1">
+            <a:avLst/>
+          </a:prstGeom>
+          <a:noFill/>
+          <a:ln w="9525">
+            <a:solidFill>
+              <a:schemeClr val="tx1"/>
+            </a:solidFill>
+            <a:round/>
+            <a:headEnd/>
+            <a:tailEnd/>
+          </a:ln>
+          <a:effectLst/>
+        </p:spPr>
+      </p:cxnSp>
+      <p:cxnSp>
+        <p:nvCxnSpPr>
+          <p:cNvPr id="266" name="AutoShape 13"/>
+          <p:cNvCxnSpPr>
+            <a:cxnSpLocks noChangeShapeType="1"/>
+            <a:stCxn id="330" idx="2"/>
+            <a:endCxn id="256" idx="0"/>
+          </p:cNvCxnSpPr>
+          <p:nvPr/>
+        </p:nvCxnSpPr>
+        <p:spPr bwMode="auto">
+          <a:xfrm>
+            <a:off x="7632273" y="2544357"/>
+            <a:ext cx="1461399" cy="2131364"/>
+          </a:xfrm>
+          <a:prstGeom prst="straightConnector1">
+            <a:avLst/>
+          </a:prstGeom>
+          <a:noFill/>
+          <a:ln w="9525">
+            <a:solidFill>
+              <a:schemeClr val="tx1"/>
+            </a:solidFill>
+            <a:round/>
+            <a:headEnd/>
+            <a:tailEnd/>
+          </a:ln>
+          <a:effectLst/>
+        </p:spPr>
+      </p:cxnSp>
+      <p:sp>
+        <p:nvSpPr>
+          <p:cNvPr id="269" name="Text Box 149"/>
+          <p:cNvSpPr txBox="1">
+            <a:spLocks noChangeArrowheads="1"/>
+          </p:cNvSpPr>
+          <p:nvPr/>
+        </p:nvSpPr>
+        <p:spPr bwMode="auto">
+          <a:xfrm>
+            <a:off x="7177023" y="5835897"/>
+            <a:ext cx="522900" cy="307777"/>
+          </a:xfrm>
+          <a:prstGeom prst="rect">
+            <a:avLst/>
+          </a:prstGeom>
+          <a:noFill/>
+          <a:ln w="9525">
+            <a:noFill/>
+            <a:miter lim="800000"/>
+            <a:headEnd/>
+            <a:tailEnd/>
+          </a:ln>
+          <a:effectLst/>
+        </p:spPr>
+        <p:txBody>
+          <a:bodyPr wrap="none">
+            <a:spAutoFit/>
+          </a:bodyPr>
+          <a:lstStyle/>
+          <a:p>
+            <a:pPr eaLnBrk="0" fontAlgn="base" hangingPunct="0">
+              <a:spcBef>
+                <a:spcPct val="0"/>
+              </a:spcBef>
+              <a:spcAft>
+                <a:spcPct val="0"/>
+              </a:spcAft>
+            </a:pPr>
+            <a:r>
+              <a:rPr lang="en-US" sz="1400" dirty="0">
+                <a:solidFill>
+                  <a:prstClr val="black"/>
+                </a:solidFill>
+                <a:latin typeface="Arial" charset="0"/>
+              </a:rPr>
+              <a:t>{0,*}</a:t>
+            </a:r>
+          </a:p>
+        </p:txBody>
+      </p:sp>
+      <p:sp>
+        <p:nvSpPr>
+          <p:cNvPr id="270" name="Text Box 145"/>
+          <p:cNvSpPr txBox="1">
+            <a:spLocks noChangeArrowheads="1"/>
+          </p:cNvSpPr>
+          <p:nvPr/>
+        </p:nvSpPr>
+        <p:spPr bwMode="auto">
+          <a:xfrm>
+            <a:off x="6549373" y="1108888"/>
+            <a:ext cx="284052" cy="307777"/>
+          </a:xfrm>
+          <a:prstGeom prst="rect">
+            <a:avLst/>
+          </a:prstGeom>
+          <a:noFill/>
+          <a:ln w="9525">
+            <a:noFill/>
+            <a:miter lim="800000"/>
+            <a:headEnd/>
+            <a:tailEnd/>
+          </a:ln>
+          <a:effectLst/>
+        </p:spPr>
+        <p:txBody>
+          <a:bodyPr wrap="none">
+            <a:spAutoFit/>
+          </a:bodyPr>
+          <a:lstStyle/>
+          <a:p>
+            <a:pPr eaLnBrk="0" fontAlgn="base" hangingPunct="0">
+              <a:spcBef>
+                <a:spcPct val="0"/>
+              </a:spcBef>
+              <a:spcAft>
+                <a:spcPct val="0"/>
+              </a:spcAft>
+            </a:pPr>
+            <a:r>
+              <a:rPr lang="en-US" sz="1400" dirty="0" smtClean="0">
+                <a:solidFill>
+                  <a:prstClr val="black"/>
+                </a:solidFill>
+                <a:latin typeface="Arial" charset="0"/>
+              </a:rPr>
+              <a:t>1</a:t>
+            </a:r>
+            <a:endParaRPr lang="en-US" sz="1400" dirty="0">
+              <a:solidFill>
+                <a:prstClr val="black"/>
+              </a:solidFill>
+              <a:latin typeface="Arial" charset="0"/>
+            </a:endParaRPr>
+          </a:p>
+        </p:txBody>
+      </p:sp>
+      <p:sp>
+        <p:nvSpPr>
+          <p:cNvPr id="271" name="Oval 114"/>
+          <p:cNvSpPr>
+            <a:spLocks noChangeArrowheads="1"/>
+          </p:cNvSpPr>
+          <p:nvPr/>
+        </p:nvSpPr>
+        <p:spPr bwMode="auto">
+          <a:xfrm>
+            <a:off x="8539331" y="1486103"/>
+            <a:ext cx="1231814" cy="381000"/>
+          </a:xfrm>
+          <a:prstGeom prst="ellipse">
+            <a:avLst/>
+          </a:prstGeom>
+          <a:solidFill>
+            <a:schemeClr val="bg1">
+              <a:lumMod val="85000"/>
+            </a:schemeClr>
+          </a:solidFill>
+          <a:ln w="9525">
+            <a:solidFill>
+              <a:schemeClr val="tx1"/>
+            </a:solidFill>
+            <a:round/>
+            <a:headEnd/>
+            <a:tailEnd/>
+          </a:ln>
+          <a:effectLst/>
+        </p:spPr>
+        <p:txBody>
+          <a:bodyPr wrap="none" anchor="ctr"/>
+          <a:lstStyle/>
+          <a:p>
+            <a:pPr algn="ctr" eaLnBrk="0" fontAlgn="base" hangingPunct="0">
+              <a:spcBef>
+                <a:spcPct val="0"/>
+              </a:spcBef>
+              <a:spcAft>
+                <a:spcPct val="0"/>
+              </a:spcAft>
+            </a:pPr>
+            <a:r>
+              <a:rPr lang="en-US" dirty="0" smtClean="0">
+                <a:solidFill>
+                  <a:prstClr val="black"/>
+                </a:solidFill>
+                <a:latin typeface="Arial" charset="0"/>
+              </a:rPr>
+              <a:t>comment</a:t>
+            </a:r>
+            <a:endParaRPr lang="en-US" dirty="0">
+              <a:solidFill>
+                <a:prstClr val="black"/>
+              </a:solidFill>
+              <a:latin typeface="Arial" charset="0"/>
+            </a:endParaRPr>
+          </a:p>
+        </p:txBody>
+      </p:sp>
+      <p:cxnSp>
+        <p:nvCxnSpPr>
+          <p:cNvPr id="272" name="AutoShape 115"/>
+          <p:cNvCxnSpPr>
+            <a:cxnSpLocks noChangeShapeType="1"/>
+            <a:stCxn id="271" idx="2"/>
+            <a:endCxn id="46085" idx="3"/>
+          </p:cNvCxnSpPr>
+          <p:nvPr/>
+        </p:nvCxnSpPr>
+        <p:spPr bwMode="auto">
+          <a:xfrm flipH="1" flipV="1">
+            <a:off x="7580188" y="815069"/>
+            <a:ext cx="959143" cy="861534"/>
+          </a:xfrm>
+          <a:prstGeom prst="straightConnector1">
+            <a:avLst/>
+          </a:prstGeom>
+          <a:noFill/>
+          <a:ln w="9525">
+            <a:solidFill>
+              <a:schemeClr val="tx1"/>
+            </a:solidFill>
+            <a:round/>
+            <a:headEnd/>
+            <a:tailEnd/>
+          </a:ln>
+          <a:effectLst/>
+        </p:spPr>
+      </p:cxnSp>
+      <p:sp>
+        <p:nvSpPr>
+          <p:cNvPr id="276" name="Oval 114"/>
+          <p:cNvSpPr>
+            <a:spLocks noChangeArrowheads="1"/>
+          </p:cNvSpPr>
+          <p:nvPr/>
+        </p:nvSpPr>
+        <p:spPr bwMode="auto">
+          <a:xfrm>
+            <a:off x="10204359" y="4888558"/>
+            <a:ext cx="1231814" cy="381000"/>
+          </a:xfrm>
+          <a:prstGeom prst="ellipse">
+            <a:avLst/>
+          </a:prstGeom>
+          <a:solidFill>
+            <a:schemeClr val="bg1">
+              <a:lumMod val="85000"/>
+            </a:schemeClr>
+          </a:solidFill>
+          <a:ln w="9525">
+            <a:solidFill>
+              <a:schemeClr val="tx1"/>
+            </a:solidFill>
+            <a:round/>
+            <a:headEnd/>
+            <a:tailEnd/>
+          </a:ln>
+          <a:effectLst/>
+        </p:spPr>
+        <p:txBody>
+          <a:bodyPr wrap="none" anchor="ctr"/>
+          <a:lstStyle/>
+          <a:p>
+            <a:pPr algn="ctr" eaLnBrk="0" fontAlgn="base" hangingPunct="0">
+              <a:spcBef>
+                <a:spcPct val="0"/>
+              </a:spcBef>
+              <a:spcAft>
+                <a:spcPct val="0"/>
+              </a:spcAft>
+            </a:pPr>
+            <a:r>
+              <a:rPr lang="en-US" dirty="0" smtClean="0">
+                <a:solidFill>
+                  <a:prstClr val="black"/>
+                </a:solidFill>
+                <a:latin typeface="Arial" charset="0"/>
+              </a:rPr>
+              <a:t>comment</a:t>
+            </a:r>
+            <a:endParaRPr lang="en-US" dirty="0">
+              <a:solidFill>
+                <a:prstClr val="black"/>
+              </a:solidFill>
+              <a:latin typeface="Arial" charset="0"/>
+            </a:endParaRPr>
+          </a:p>
+        </p:txBody>
+      </p:sp>
+      <p:cxnSp>
+        <p:nvCxnSpPr>
+          <p:cNvPr id="277" name="AutoShape 115"/>
+          <p:cNvCxnSpPr>
+            <a:cxnSpLocks noChangeShapeType="1"/>
+            <a:stCxn id="276" idx="2"/>
+            <a:endCxn id="256" idx="3"/>
+          </p:cNvCxnSpPr>
+          <p:nvPr/>
+        </p:nvCxnSpPr>
+        <p:spPr bwMode="auto">
+          <a:xfrm flipH="1">
+            <a:off x="9925740" y="5079058"/>
+            <a:ext cx="278619" cy="15763"/>
+          </a:xfrm>
+          <a:prstGeom prst="straightConnector1">
+            <a:avLst/>
+          </a:prstGeom>
+          <a:noFill/>
+          <a:ln w="9525">
+            <a:solidFill>
+              <a:schemeClr val="tx1"/>
+            </a:solidFill>
+            <a:round/>
+            <a:headEnd/>
+            <a:tailEnd/>
+          </a:ln>
+          <a:effectLst/>
+        </p:spPr>
+      </p:cxnSp>
+      <p:sp>
+        <p:nvSpPr>
+          <p:cNvPr id="280" name="Oval 114"/>
+          <p:cNvSpPr>
+            <a:spLocks noChangeArrowheads="1"/>
+          </p:cNvSpPr>
+          <p:nvPr/>
+        </p:nvSpPr>
+        <p:spPr bwMode="auto">
+          <a:xfrm>
+            <a:off x="4361201" y="4888558"/>
+            <a:ext cx="1231814" cy="381000"/>
+          </a:xfrm>
+          <a:prstGeom prst="ellipse">
+            <a:avLst/>
+          </a:prstGeom>
+          <a:solidFill>
+            <a:schemeClr val="bg1">
+              <a:lumMod val="85000"/>
+            </a:schemeClr>
+          </a:solidFill>
+          <a:ln w="9525">
+            <a:solidFill>
+              <a:schemeClr val="tx1"/>
+            </a:solidFill>
+            <a:round/>
+            <a:headEnd/>
+            <a:tailEnd/>
+          </a:ln>
+          <a:effectLst/>
+        </p:spPr>
+        <p:txBody>
+          <a:bodyPr wrap="none" anchor="ctr"/>
+          <a:lstStyle/>
+          <a:p>
+            <a:pPr algn="ctr" eaLnBrk="0" fontAlgn="base" hangingPunct="0">
+              <a:spcBef>
+                <a:spcPct val="0"/>
+              </a:spcBef>
+              <a:spcAft>
+                <a:spcPct val="0"/>
+              </a:spcAft>
+            </a:pPr>
+            <a:r>
+              <a:rPr lang="en-US" dirty="0" smtClean="0">
+                <a:solidFill>
+                  <a:prstClr val="black"/>
+                </a:solidFill>
+                <a:latin typeface="Arial" charset="0"/>
+              </a:rPr>
+              <a:t>comment</a:t>
+            </a:r>
+            <a:endParaRPr lang="en-US" dirty="0">
+              <a:solidFill>
+                <a:prstClr val="black"/>
+              </a:solidFill>
+              <a:latin typeface="Arial" charset="0"/>
+            </a:endParaRPr>
+          </a:p>
+        </p:txBody>
+      </p:sp>
+      <p:cxnSp>
+        <p:nvCxnSpPr>
+          <p:cNvPr id="281" name="AutoShape 115"/>
+          <p:cNvCxnSpPr>
+            <a:cxnSpLocks noChangeShapeType="1"/>
+            <a:stCxn id="255" idx="1"/>
+            <a:endCxn id="280" idx="6"/>
+          </p:cNvCxnSpPr>
+          <p:nvPr/>
+        </p:nvCxnSpPr>
+        <p:spPr bwMode="auto">
+          <a:xfrm flipH="1">
+            <a:off x="5593015" y="5079058"/>
+            <a:ext cx="228785" cy="0"/>
+          </a:xfrm>
+          <a:prstGeom prst="straightConnector1">
+            <a:avLst/>
+          </a:prstGeom>
+          <a:noFill/>
+          <a:ln w="9525">
+            <a:solidFill>
+              <a:schemeClr val="tx1"/>
+            </a:solidFill>
+            <a:round/>
+            <a:headEnd/>
+            <a:tailEnd/>
+          </a:ln>
+          <a:effectLst/>
+        </p:spPr>
+      </p:cxnSp>
+      <p:sp>
+        <p:nvSpPr>
+          <p:cNvPr id="320" name="AutoShape 6"/>
+          <p:cNvSpPr>
+            <a:spLocks noChangeArrowheads="1"/>
+          </p:cNvSpPr>
+          <p:nvPr/>
+        </p:nvSpPr>
+        <p:spPr bwMode="auto">
+          <a:xfrm>
+            <a:off x="1649208" y="1587450"/>
+            <a:ext cx="1948188" cy="838200"/>
           </a:xfrm>
           <a:prstGeom prst="flowChartDecision">
             <a:avLst/>
@@ -10393,7 +10656,7 @@
                 </a:solidFill>
                 <a:latin typeface="Arial" charset="0"/>
               </a:rPr>
-              <a:t>TestedElement</a:t>
+              <a:t>ReviewMod</a:t>
             </a:r>
             <a:endParaRPr lang="en-US" sz="1400" dirty="0">
               <a:solidFill>
@@ -10406,18 +10669,18 @@
       </p:sp>
       <p:cxnSp>
         <p:nvCxnSpPr>
-          <p:cNvPr id="257" name="AutoShape 13"/>
+          <p:cNvPr id="322" name="AutoShape 13"/>
           <p:cNvCxnSpPr>
             <a:cxnSpLocks noChangeShapeType="1"/>
-            <a:stCxn id="255" idx="2"/>
-            <a:endCxn id="130" idx="0"/>
+            <a:stCxn id="320" idx="2"/>
+            <a:endCxn id="82" idx="0"/>
           </p:cNvCxnSpPr>
           <p:nvPr/>
         </p:nvCxnSpPr>
         <p:spPr bwMode="auto">
-          <a:xfrm>
-            <a:off x="6392042" y="4316301"/>
-            <a:ext cx="1754373" cy="1824396"/>
+          <a:xfrm flipH="1">
+            <a:off x="2605968" y="2425650"/>
+            <a:ext cx="17334" cy="740312"/>
           </a:xfrm>
           <a:prstGeom prst="straightConnector1">
             <a:avLst/>
@@ -10434,20 +10697,139 @@
           <a:effectLst/>
         </p:spPr>
       </p:cxnSp>
+      <p:sp>
+        <p:nvSpPr>
+          <p:cNvPr id="327" name="Text Box 145"/>
+          <p:cNvSpPr txBox="1">
+            <a:spLocks noChangeArrowheads="1"/>
+          </p:cNvSpPr>
+          <p:nvPr/>
+        </p:nvSpPr>
+        <p:spPr bwMode="auto">
+          <a:xfrm>
+            <a:off x="2339250" y="2814241"/>
+            <a:ext cx="284052" cy="307777"/>
+          </a:xfrm>
+          <a:prstGeom prst="rect">
+            <a:avLst/>
+          </a:prstGeom>
+          <a:noFill/>
+          <a:ln w="9525">
+            <a:noFill/>
+            <a:miter lim="800000"/>
+            <a:headEnd/>
+            <a:tailEnd/>
+          </a:ln>
+          <a:effectLst/>
+        </p:spPr>
+        <p:txBody>
+          <a:bodyPr wrap="none">
+            <a:spAutoFit/>
+          </a:bodyPr>
+          <a:lstStyle/>
+          <a:p>
+            <a:pPr eaLnBrk="0" fontAlgn="base" hangingPunct="0">
+              <a:spcBef>
+                <a:spcPct val="0"/>
+              </a:spcBef>
+              <a:spcAft>
+                <a:spcPct val="0"/>
+              </a:spcAft>
+            </a:pPr>
+            <a:r>
+              <a:rPr lang="en-US" sz="1400" dirty="0" smtClean="0">
+                <a:solidFill>
+                  <a:prstClr val="black"/>
+                </a:solidFill>
+                <a:latin typeface="Arial" charset="0"/>
+              </a:rPr>
+              <a:t>1</a:t>
+            </a:r>
+            <a:endParaRPr lang="en-US" sz="1400" dirty="0">
+              <a:solidFill>
+                <a:prstClr val="black"/>
+              </a:solidFill>
+              <a:latin typeface="Arial" charset="0"/>
+            </a:endParaRPr>
+          </a:p>
+        </p:txBody>
+      </p:sp>
+      <p:sp>
+        <p:nvSpPr>
+          <p:cNvPr id="330" name="AutoShape 6"/>
+          <p:cNvSpPr>
+            <a:spLocks noChangeArrowheads="1"/>
+          </p:cNvSpPr>
+          <p:nvPr/>
+        </p:nvSpPr>
+        <p:spPr bwMode="auto">
+          <a:xfrm>
+            <a:off x="6768219" y="1706157"/>
+            <a:ext cx="1728107" cy="838200"/>
+          </a:xfrm>
+          <a:prstGeom prst="flowChartDecision">
+            <a:avLst/>
+          </a:prstGeom>
+          <a:solidFill>
+            <a:schemeClr val="tx2">
+              <a:lumMod val="40000"/>
+              <a:lumOff val="60000"/>
+            </a:schemeClr>
+          </a:solidFill>
+          <a:ln w="9525">
+            <a:solidFill>
+              <a:schemeClr val="tx1"/>
+            </a:solidFill>
+            <a:miter lim="800000"/>
+            <a:headEnd/>
+            <a:tailEnd/>
+          </a:ln>
+          <a:effectLst/>
+        </p:spPr>
+        <p:txBody>
+          <a:bodyPr wrap="none" anchor="ctr"/>
+          <a:lstStyle/>
+          <a:p>
+            <a:pPr algn="ctr" eaLnBrk="0" fontAlgn="base" hangingPunct="0">
+              <a:spcBef>
+                <a:spcPct val="0"/>
+              </a:spcBef>
+              <a:spcAft>
+                <a:spcPct val="0"/>
+              </a:spcAft>
+            </a:pPr>
+            <a:r>
+              <a:rPr lang="en-US" sz="1400" dirty="0" err="1" smtClean="0">
+                <a:solidFill>
+                  <a:prstClr val="black"/>
+                </a:solidFill>
+                <a:latin typeface="Arial" charset="0"/>
+              </a:rPr>
+              <a:t>ReviewChapter</a:t>
+            </a:r>
+            <a:endParaRPr lang="en-US" sz="1400" dirty="0">
+              <a:solidFill>
+                <a:prstClr val="black"/>
+              </a:solidFill>
+              <a:latin typeface="Arial" charset="0"/>
+            </a:endParaRPr>
+          </a:p>
+        </p:txBody>
+      </p:sp>
       <p:cxnSp>
         <p:nvCxnSpPr>
-          <p:cNvPr id="260" name="AutoShape 13"/>
+          <p:cNvPr id="332" name="AutoShape 7"/>
           <p:cNvCxnSpPr>
             <a:cxnSpLocks noChangeShapeType="1"/>
-            <a:stCxn id="256" idx="2"/>
-            <a:endCxn id="130" idx="0"/>
+            <a:stCxn id="330" idx="0"/>
+            <a:endCxn id="46085" idx="2"/>
           </p:cNvCxnSpPr>
           <p:nvPr/>
         </p:nvCxnSpPr>
         <p:spPr bwMode="auto">
-          <a:xfrm flipH="1">
-            <a:off x="8146415" y="4332064"/>
-            <a:ext cx="685431" cy="1808633"/>
+          <a:xfrm flipH="1" flipV="1">
+            <a:off x="6856288" y="1119869"/>
+            <a:ext cx="775985" cy="586288"/>
           </a:xfrm>
           <a:prstGeom prst="straightConnector1">
             <a:avLst/>
@@ -10464,20 +10846,71 @@
           <a:effectLst/>
         </p:spPr>
       </p:cxnSp>
+      <p:sp>
+        <p:nvSpPr>
+          <p:cNvPr id="335" name="Text Box 149"/>
+          <p:cNvSpPr txBox="1">
+            <a:spLocks noChangeArrowheads="1"/>
+          </p:cNvSpPr>
+          <p:nvPr/>
+        </p:nvSpPr>
+        <p:spPr bwMode="auto">
+          <a:xfrm>
+            <a:off x="6594838" y="2601729"/>
+            <a:ext cx="522900" cy="307777"/>
+          </a:xfrm>
+          <a:prstGeom prst="rect">
+            <a:avLst/>
+          </a:prstGeom>
+          <a:noFill/>
+          <a:ln w="9525">
+            <a:noFill/>
+            <a:miter lim="800000"/>
+            <a:headEnd/>
+            <a:tailEnd/>
+          </a:ln>
+          <a:effectLst/>
+        </p:spPr>
+        <p:txBody>
+          <a:bodyPr wrap="none">
+            <a:spAutoFit/>
+          </a:bodyPr>
+          <a:lstStyle/>
+          <a:p>
+            <a:pPr eaLnBrk="0" fontAlgn="base" hangingPunct="0">
+              <a:spcBef>
+                <a:spcPct val="0"/>
+              </a:spcBef>
+              <a:spcAft>
+                <a:spcPct val="0"/>
+              </a:spcAft>
+            </a:pPr>
+            <a:r>
+              <a:rPr lang="en-US" sz="1400" dirty="0">
+                <a:solidFill>
+                  <a:prstClr val="black"/>
+                </a:solidFill>
+                <a:latin typeface="Arial" charset="0"/>
+              </a:rPr>
+              <a:t>{0,*}</a:t>
+            </a:r>
+          </a:p>
+        </p:txBody>
+      </p:sp>
       <p:cxnSp>
         <p:nvCxnSpPr>
-          <p:cNvPr id="263" name="AutoShape 13"/>
+          <p:cNvPr id="336" name="AutoShape 115"/>
           <p:cNvCxnSpPr>
             <a:cxnSpLocks noChangeShapeType="1"/>
-            <a:stCxn id="46085" idx="2"/>
-            <a:endCxn id="255" idx="0"/>
+            <a:stCxn id="337" idx="2"/>
+            <a:endCxn id="330" idx="3"/>
           </p:cNvCxnSpPr>
           <p:nvPr/>
         </p:nvCxnSpPr>
         <p:spPr bwMode="auto">
-          <a:xfrm flipH="1">
-            <a:off x="6392042" y="1119869"/>
-            <a:ext cx="464246" cy="2358232"/>
+          <a:xfrm flipH="1" flipV="1">
+            <a:off x="8496326" y="2125257"/>
+            <a:ext cx="557689" cy="1093547"/>
           </a:xfrm>
           <a:prstGeom prst="straightConnector1">
             <a:avLst/>
@@ -10494,155 +10927,17 @@
           <a:effectLst/>
         </p:spPr>
       </p:cxnSp>
-      <p:cxnSp>
-        <p:nvCxnSpPr>
-          <p:cNvPr id="266" name="AutoShape 13"/>
-          <p:cNvCxnSpPr>
-            <a:cxnSpLocks noChangeShapeType="1"/>
-            <a:stCxn id="46085" idx="2"/>
-            <a:endCxn id="256" idx="0"/>
-          </p:cNvCxnSpPr>
+      <p:sp>
+        <p:nvSpPr>
+          <p:cNvPr id="337" name="Oval 114"/>
+          <p:cNvSpPr>
+            <a:spLocks noChangeArrowheads="1"/>
+          </p:cNvSpPr>
           <p:nvPr/>
-        </p:nvCxnSpPr>
+        </p:nvSpPr>
         <p:spPr bwMode="auto">
           <a:xfrm>
-            <a:off x="6856288" y="1119869"/>
-            <a:ext cx="1975558" cy="2373995"/>
-          </a:xfrm>
-          <a:prstGeom prst="straightConnector1">
-            <a:avLst/>
-          </a:prstGeom>
-          <a:noFill/>
-          <a:ln w="9525">
-            <a:solidFill>
-              <a:schemeClr val="tx1"/>
-            </a:solidFill>
-            <a:round/>
-            <a:headEnd/>
-            <a:tailEnd/>
-          </a:ln>
-          <a:effectLst/>
-        </p:spPr>
-      </p:cxnSp>
-      <p:sp>
-        <p:nvSpPr>
-          <p:cNvPr id="269" name="Text Box 149"/>
-          <p:cNvSpPr txBox="1">
-            <a:spLocks noChangeArrowheads="1"/>
-          </p:cNvSpPr>
-          <p:nvPr/>
-        </p:nvSpPr>
-        <p:spPr bwMode="auto">
-          <a:xfrm>
-            <a:off x="7268965" y="5718176"/>
-            <a:ext cx="522900" cy="307777"/>
-          </a:xfrm>
-          <a:prstGeom prst="rect">
-            <a:avLst/>
-          </a:prstGeom>
-          <a:noFill/>
-          <a:ln w="9525">
-            <a:noFill/>
-            <a:miter lim="800000"/>
-            <a:headEnd/>
-            <a:tailEnd/>
-          </a:ln>
-          <a:effectLst/>
-        </p:spPr>
-        <p:txBody>
-          <a:bodyPr wrap="none">
-            <a:spAutoFit/>
-          </a:bodyPr>
-          <a:lstStyle/>
-          <a:p>
-            <a:pPr eaLnBrk="0" fontAlgn="base" hangingPunct="0">
-              <a:spcBef>
-                <a:spcPct val="0"/>
-              </a:spcBef>
-              <a:spcAft>
-                <a:spcPct val="0"/>
-              </a:spcAft>
-            </a:pPr>
-            <a:r>
-              <a:rPr lang="en-US" sz="1400" dirty="0">
-                <a:solidFill>
-                  <a:prstClr val="black"/>
-                </a:solidFill>
-                <a:latin typeface="Arial" charset="0"/>
-              </a:rPr>
-              <a:t>{0,*}</a:t>
-            </a:r>
-          </a:p>
-        </p:txBody>
-      </p:sp>
-      <p:sp>
-        <p:nvSpPr>
-          <p:cNvPr id="270" name="Text Box 145"/>
-          <p:cNvSpPr txBox="1">
-            <a:spLocks noChangeArrowheads="1"/>
-          </p:cNvSpPr>
-          <p:nvPr/>
-        </p:nvSpPr>
-        <p:spPr bwMode="auto">
-          <a:xfrm>
-            <a:off x="6347044" y="1254590"/>
-            <a:ext cx="284052" cy="307777"/>
-          </a:xfrm>
-          <a:prstGeom prst="rect">
-            <a:avLst/>
-          </a:prstGeom>
-          <a:noFill/>
-          <a:ln w="9525">
-            <a:noFill/>
-            <a:miter lim="800000"/>
-            <a:headEnd/>
-            <a:tailEnd/>
-          </a:ln>
-          <a:effectLst/>
-        </p:spPr>
-        <p:txBody>
-          <a:bodyPr wrap="none">
-            <a:spAutoFit/>
-          </a:bodyPr>
-          <a:lstStyle/>
-          <a:p>
-            <a:pPr eaLnBrk="0" fontAlgn="base" hangingPunct="0">
-              <a:spcBef>
-                <a:spcPct val="0"/>
-              </a:spcBef>
-              <a:spcAft>
-                <a:spcPct val="0"/>
-              </a:spcAft>
-            </a:pPr>
-            <a:r>
-              <a:rPr lang="en-US" sz="1400" dirty="0" smtClean="0">
-                <a:solidFill>
-                  <a:prstClr val="black"/>
-                </a:solidFill>
-                <a:latin typeface="Arial" charset="0"/>
-              </a:rPr>
-              <a:t>1</a:t>
-            </a:r>
-            <a:endParaRPr lang="en-US" sz="1400" dirty="0">
-              <a:solidFill>
-                <a:prstClr val="black"/>
-              </a:solidFill>
-              <a:latin typeface="Arial" charset="0"/>
-            </a:endParaRPr>
-          </a:p>
-        </p:txBody>
-      </p:sp>
-      <p:sp>
-        <p:nvSpPr>
-          <p:cNvPr id="271" name="Oval 114"/>
-          <p:cNvSpPr>
-            <a:spLocks noChangeArrowheads="1"/>
-          </p:cNvSpPr>
-          <p:nvPr/>
-        </p:nvSpPr>
-        <p:spPr bwMode="auto">
-          <a:xfrm>
-            <a:off x="8489130" y="2454538"/>
+            <a:off x="9054015" y="3028304"/>
             <a:ext cx="1231814" cy="381000"/>
           </a:xfrm>
           <a:prstGeom prst="ellipse">
@@ -10676,13 +10971,13 @@
               </a:spcAft>
             </a:pPr>
             <a:r>
-              <a:rPr lang="en-US" dirty="0" smtClean="0">
+              <a:rPr lang="en-US" sz="1600" dirty="0" smtClean="0">
                 <a:solidFill>
                   <a:prstClr val="black"/>
                 </a:solidFill>
                 <a:latin typeface="Arial" charset="0"/>
               </a:rPr>
-              <a:t>comment</a:t>
+              <a:t>rating</a:t>
             </a:r>
             <a:endParaRPr lang="en-US" dirty="0">
               <a:solidFill>
@@ -10693,39 +10988,9 @@
           </a:p>
         </p:txBody>
       </p:sp>
-      <p:cxnSp>
-        <p:nvCxnSpPr>
-          <p:cNvPr id="272" name="AutoShape 115"/>
-          <p:cNvCxnSpPr>
-            <a:cxnSpLocks noChangeShapeType="1"/>
-            <a:stCxn id="271" idx="2"/>
-            <a:endCxn id="46085" idx="3"/>
-          </p:cNvCxnSpPr>
-          <p:nvPr/>
-        </p:nvCxnSpPr>
-        <p:spPr bwMode="auto">
-          <a:xfrm flipH="1" flipV="1">
-            <a:off x="7580188" y="815069"/>
-            <a:ext cx="908942" cy="1829969"/>
-          </a:xfrm>
-          <a:prstGeom prst="straightConnector1">
-            <a:avLst/>
-          </a:prstGeom>
-          <a:noFill/>
-          <a:ln w="9525">
-            <a:solidFill>
-              <a:schemeClr val="tx1"/>
-            </a:solidFill>
-            <a:round/>
-            <a:headEnd/>
-            <a:tailEnd/>
-          </a:ln>
-          <a:effectLst/>
-        </p:spPr>
-      </p:cxnSp>
-      <p:sp>
-        <p:nvSpPr>
-          <p:cNvPr id="276" name="Oval 114"/>
+      <p:sp>
+        <p:nvSpPr>
+          <p:cNvPr id="338" name="Oval 114"/>
           <p:cNvSpPr>
             <a:spLocks noChangeArrowheads="1"/>
           </p:cNvSpPr>
@@ -10733,7 +10998,7 @@
         </p:nvSpPr>
         <p:spPr bwMode="auto">
           <a:xfrm>
-            <a:off x="9942533" y="3706701"/>
+            <a:off x="9070594" y="3561704"/>
             <a:ext cx="1231814" cy="381000"/>
           </a:xfrm>
           <a:prstGeom prst="ellipse">
@@ -10786,18 +11051,18 @@
       </p:sp>
       <p:cxnSp>
         <p:nvCxnSpPr>
-          <p:cNvPr id="277" name="AutoShape 115"/>
+          <p:cNvPr id="339" name="AutoShape 115"/>
           <p:cNvCxnSpPr>
             <a:cxnSpLocks noChangeShapeType="1"/>
-            <a:stCxn id="276" idx="2"/>
-            <a:endCxn id="256" idx="3"/>
+            <a:stCxn id="338" idx="2"/>
+            <a:endCxn id="330" idx="3"/>
           </p:cNvCxnSpPr>
           <p:nvPr/>
         </p:nvCxnSpPr>
         <p:spPr bwMode="auto">
-          <a:xfrm flipH="1">
-            <a:off x="9663914" y="3897201"/>
-            <a:ext cx="278619" cy="15763"/>
+          <a:xfrm flipH="1" flipV="1">
+            <a:off x="8496326" y="2125257"/>
+            <a:ext cx="574268" cy="1626947"/>
           </a:xfrm>
           <a:prstGeom prst="straightConnector1">
             <a:avLst/>
@@ -10814,9 +11079,39 @@
           <a:effectLst/>
         </p:spPr>
       </p:cxnSp>
-      <p:sp>
-        <p:nvSpPr>
-          <p:cNvPr id="280" name="Oval 114"/>
+      <p:cxnSp>
+        <p:nvCxnSpPr>
+          <p:cNvPr id="349" name="AutoShape 115"/>
+          <p:cNvCxnSpPr>
+            <a:cxnSpLocks noChangeShapeType="1"/>
+            <a:stCxn id="350" idx="2"/>
+            <a:endCxn id="330" idx="3"/>
+          </p:cNvCxnSpPr>
+          <p:nvPr/>
+        </p:nvCxnSpPr>
+        <p:spPr bwMode="auto">
+          <a:xfrm flipH="1" flipV="1">
+            <a:off x="8496326" y="2125257"/>
+            <a:ext cx="557689" cy="12784"/>
+          </a:xfrm>
+          <a:prstGeom prst="straightConnector1">
+            <a:avLst/>
+          </a:prstGeom>
+          <a:noFill/>
+          <a:ln w="9525">
+            <a:solidFill>
+              <a:schemeClr val="tx1"/>
+            </a:solidFill>
+            <a:round/>
+            <a:headEnd/>
+            <a:tailEnd/>
+          </a:ln>
+          <a:effectLst/>
+        </p:spPr>
+      </p:cxnSp>
+      <p:sp>
+        <p:nvSpPr>
+          <p:cNvPr id="350" name="Oval 114"/>
           <p:cNvSpPr>
             <a:spLocks noChangeArrowheads="1"/>
           </p:cNvSpPr>
@@ -10824,7 +11119,7 @@
         </p:nvSpPr>
         <p:spPr bwMode="auto">
           <a:xfrm>
-            <a:off x="4099375" y="3706701"/>
+            <a:off x="9054015" y="1947541"/>
             <a:ext cx="1231814" cy="381000"/>
           </a:xfrm>
           <a:prstGeom prst="ellipse">
@@ -10858,13 +11153,13 @@
               </a:spcAft>
             </a:pPr>
             <a:r>
-              <a:rPr lang="en-US" dirty="0" smtClean="0">
+              <a:rPr lang="en-US" sz="1600" dirty="0" err="1" smtClean="0">
                 <a:solidFill>
                   <a:prstClr val="black"/>
                 </a:solidFill>
                 <a:latin typeface="Arial" charset="0"/>
               </a:rPr>
-              <a:t>comment</a:t>
+              <a:t>timePlayed</a:t>
             </a:r>
             <a:endParaRPr lang="en-US" dirty="0">
               <a:solidFill>
@@ -10877,18 +11172,18 @@
       </p:sp>
       <p:cxnSp>
         <p:nvCxnSpPr>
-          <p:cNvPr id="281" name="AutoShape 115"/>
+          <p:cNvPr id="356" name="AutoShape 115"/>
           <p:cNvCxnSpPr>
             <a:cxnSpLocks noChangeShapeType="1"/>
-            <a:stCxn id="255" idx="1"/>
-            <a:endCxn id="280" idx="6"/>
+            <a:stCxn id="357" idx="2"/>
+            <a:endCxn id="330" idx="3"/>
           </p:cNvCxnSpPr>
           <p:nvPr/>
         </p:nvCxnSpPr>
         <p:spPr bwMode="auto">
-          <a:xfrm flipH="1">
-            <a:off x="5331189" y="3897201"/>
-            <a:ext cx="228785" cy="0"/>
+          <a:xfrm flipH="1" flipV="1">
+            <a:off x="8496326" y="2125257"/>
+            <a:ext cx="542954" cy="533912"/>
           </a:xfrm>
           <a:prstGeom prst="straightConnector1">
             <a:avLst/>
@@ -10905,6 +11200,118 @@
           <a:effectLst/>
         </p:spPr>
       </p:cxnSp>
+      <p:sp>
+        <p:nvSpPr>
+          <p:cNvPr id="357" name="Oval 114"/>
+          <p:cNvSpPr>
+            <a:spLocks noChangeArrowheads="1"/>
+          </p:cNvSpPr>
+          <p:nvPr/>
+        </p:nvSpPr>
+        <p:spPr bwMode="auto">
+          <a:xfrm>
+            <a:off x="9039280" y="2468669"/>
+            <a:ext cx="1231814" cy="381000"/>
+          </a:xfrm>
+          <a:prstGeom prst="ellipse">
+            <a:avLst/>
+          </a:prstGeom>
+          <a:solidFill>
+            <a:schemeClr val="bg1">
+              <a:lumMod val="85000"/>
+            </a:schemeClr>
+          </a:solidFill>
+          <a:ln w="9525">
+            <a:solidFill>
+              <a:schemeClr val="tx1"/>
+            </a:solidFill>
+            <a:round/>
+            <a:headEnd/>
+            <a:tailEnd/>
+          </a:ln>
+          <a:effectLst/>
+        </p:spPr>
+        <p:txBody>
+          <a:bodyPr wrap="none" anchor="ctr"/>
+          <a:lstStyle/>
+          <a:p>
+            <a:pPr algn="ctr" eaLnBrk="0" fontAlgn="base" hangingPunct="0">
+              <a:spcBef>
+                <a:spcPct val="0"/>
+              </a:spcBef>
+              <a:spcAft>
+                <a:spcPct val="0"/>
+              </a:spcAft>
+            </a:pPr>
+            <a:r>
+              <a:rPr lang="en-US" sz="1600" dirty="0" err="1" smtClean="0">
+                <a:solidFill>
+                  <a:prstClr val="black"/>
+                </a:solidFill>
+                <a:latin typeface="Arial" charset="0"/>
+              </a:rPr>
+              <a:t>datePlayed</a:t>
+            </a:r>
+            <a:endParaRPr lang="en-US" dirty="0">
+              <a:solidFill>
+                <a:prstClr val="black"/>
+              </a:solidFill>
+              <a:latin typeface="Arial" charset="0"/>
+            </a:endParaRPr>
+          </a:p>
+        </p:txBody>
+      </p:sp>
+      <p:sp>
+        <p:nvSpPr>
+          <p:cNvPr id="362" name="Text Box 149"/>
+          <p:cNvSpPr txBox="1">
+            <a:spLocks noChangeArrowheads="1"/>
+          </p:cNvSpPr>
+          <p:nvPr/>
+        </p:nvSpPr>
+        <p:spPr bwMode="auto">
+          <a:xfrm>
+            <a:off x="8440762" y="5818721"/>
+            <a:ext cx="522900" cy="307777"/>
+          </a:xfrm>
+          <a:prstGeom prst="rect">
+            <a:avLst/>
+          </a:prstGeom>
+          <a:noFill/>
+          <a:ln w="9525">
+            <a:noFill/>
+            <a:miter lim="800000"/>
+            <a:headEnd/>
+            <a:tailEnd/>
+          </a:ln>
+          <a:effectLst/>
+        </p:spPr>
+        <p:txBody>
+          <a:bodyPr wrap="none">
+            <a:spAutoFit/>
+          </a:bodyPr>
+          <a:lstStyle/>
+          <a:p>
+            <a:pPr eaLnBrk="0" fontAlgn="base" hangingPunct="0">
+              <a:spcBef>
+                <a:spcPct val="0"/>
+              </a:spcBef>
+              <a:spcAft>
+                <a:spcPct val="0"/>
+              </a:spcAft>
+            </a:pPr>
+            <a:r>
+              <a:rPr lang="en-US" sz="1400" dirty="0">
+                <a:solidFill>
+                  <a:prstClr val="black"/>
+                </a:solidFill>
+                <a:latin typeface="Arial" charset="0"/>
+              </a:rPr>
+              <a:t>{0,*}</a:t>
+            </a:r>
+          </a:p>
+        </p:txBody>
+      </p:sp>
     </p:spTree>
     <p:extLst>
       <p:ext uri="{BB962C8B-B14F-4D97-AF65-F5344CB8AC3E}">

</xml_diff>